<commit_message>
Added Elli's graphics to neural anatomy presentation.
</commit_message>
<xml_diff>
--- a/presentations/02.1_neural_anatomy.pptx
+++ b/presentations/02.1_neural_anatomy.pptx
@@ -18,12 +18,12 @@
     <p:sldId id="326" r:id="rId9"/>
     <p:sldId id="327" r:id="rId10"/>
     <p:sldId id="304" r:id="rId11"/>
-    <p:sldId id="302" r:id="rId12"/>
-    <p:sldId id="309" r:id="rId13"/>
-    <p:sldId id="305" r:id="rId14"/>
-    <p:sldId id="307" r:id="rId15"/>
-    <p:sldId id="306" r:id="rId16"/>
-    <p:sldId id="268" r:id="rId17"/>
+    <p:sldId id="328" r:id="rId12"/>
+    <p:sldId id="302" r:id="rId13"/>
+    <p:sldId id="309" r:id="rId14"/>
+    <p:sldId id="305" r:id="rId15"/>
+    <p:sldId id="307" r:id="rId16"/>
+    <p:sldId id="306" r:id="rId17"/>
   </p:sldIdLst>
   <p:sldSz cx="12192000" cy="6858000"/>
   <p:notesSz cx="6858000" cy="9144000"/>
@@ -223,7 +223,7 @@
           <a:p>
             <a:fld id="{FD93C9B2-20F6-4DB1-B471-224337D0AC79}" type="datetimeFigureOut">
               <a:rPr lang="en-US" smtClean="0"/>
-              <a:t>10/26/2021</a:t>
+              <a:t>3/24/2022</a:t>
             </a:fld>
             <a:endParaRPr lang="en-US"/>
           </a:p>
@@ -1006,7 +1006,7 @@
                 <a:effectLst/>
                 <a:latin typeface="+mn-lt"/>
               </a:rPr>
-              <a:t>(labelled y) and the output.  A more complete explanation of the error function will be discussed in our next presentation when we explain the </a:t>
+              <a:t>(labelled y) and the output.  A more complete explanation of the error function will be discussed in our next workshop when we explain the </a:t>
             </a:r>
             <a:r>
               <a:rPr lang="en-US" b="1" i="0" dirty="0">
@@ -1016,7 +1016,7 @@
                 <a:effectLst/>
                 <a:latin typeface="+mn-lt"/>
               </a:rPr>
-              <a:t>back propagation </a:t>
+              <a:t>back propagation / gradient descent </a:t>
             </a:r>
             <a:r>
               <a:rPr lang="en-US" b="0" i="0" dirty="0">
@@ -1276,17 +1276,331 @@
           <a:lstStyle/>
           <a:p>
             <a:r>
-              <a:rPr lang="en-US" sz="1200" b="0" i="0" kern="1200" dirty="0">
-                <a:solidFill>
-                  <a:schemeClr val="tx1"/>
+              <a:rPr lang="en-US" b="0" i="0" u="none" dirty="0">
+                <a:solidFill>
+                  <a:srgbClr val="3C3C3B"/>
                 </a:solidFill>
                 <a:effectLst/>
                 <a:latin typeface="+mn-lt"/>
-                <a:ea typeface="+mn-ea"/>
-                <a:cs typeface="+mn-cs"/>
-              </a:rPr>
-              <a:t>Let’s now justify and explain the existence of the bias nodes.  Technically, bias provides every node in a neural network with a trainable constant value (1 or -1).  But why do we need them?  Well – on a practical level – input from the bias node enables an activation function to be shifted to the left or right.  In this case, what looks like a sigmoid function can be shifted to the left (position A) or to the right (position C).  In addition to the adjustment of weights which occurs during backpropagation, this ‘shifting’ can be important and critical for successful learning.</a:t>
-            </a:r>
+              </a:rPr>
+              <a:t>And finally, let’s simulate the forward propagation process.  Pictured here is a complete, albeit small, neural network.  As such, it consists of an </a:t>
+            </a:r>
+            <a:r>
+              <a:rPr lang="en-US" b="1" i="0" u="none" dirty="0">
+                <a:solidFill>
+                  <a:srgbClr val="3C3C3B"/>
+                </a:solidFill>
+                <a:effectLst/>
+                <a:latin typeface="+mn-lt"/>
+              </a:rPr>
+              <a:t>input layer</a:t>
+            </a:r>
+            <a:r>
+              <a:rPr lang="en-US" b="0" i="0" u="none" dirty="0">
+                <a:solidFill>
+                  <a:srgbClr val="3C3C3B"/>
+                </a:solidFill>
+                <a:effectLst/>
+                <a:latin typeface="+mn-lt"/>
+              </a:rPr>
+              <a:t>, a single </a:t>
+            </a:r>
+            <a:r>
+              <a:rPr lang="en-US" b="1" i="0" u="none" dirty="0">
+                <a:solidFill>
+                  <a:srgbClr val="3C3C3B"/>
+                </a:solidFill>
+                <a:effectLst/>
+                <a:latin typeface="+mn-lt"/>
+              </a:rPr>
+              <a:t>hidden layer</a:t>
+            </a:r>
+            <a:r>
+              <a:rPr lang="en-US" b="0" i="0" u="none" dirty="0">
+                <a:solidFill>
+                  <a:srgbClr val="3C3C3B"/>
+                </a:solidFill>
+                <a:effectLst/>
+                <a:latin typeface="+mn-lt"/>
+              </a:rPr>
+              <a:t>, and an </a:t>
+            </a:r>
+            <a:r>
+              <a:rPr lang="en-US" b="1" i="0" u="none" dirty="0">
+                <a:solidFill>
+                  <a:srgbClr val="3C3C3B"/>
+                </a:solidFill>
+                <a:effectLst/>
+                <a:latin typeface="+mn-lt"/>
+              </a:rPr>
+              <a:t>output layer</a:t>
+            </a:r>
+            <a:r>
+              <a:rPr lang="en-US" b="0" i="0" u="none" dirty="0">
+                <a:solidFill>
+                  <a:srgbClr val="3C3C3B"/>
+                </a:solidFill>
+                <a:effectLst/>
+                <a:latin typeface="+mn-lt"/>
+              </a:rPr>
+              <a:t>.  </a:t>
+            </a:r>
+            <a:endParaRPr lang="en-US" b="0" i="0" dirty="0">
+              <a:solidFill>
+                <a:srgbClr val="3C3C3B"/>
+              </a:solidFill>
+              <a:effectLst/>
+              <a:latin typeface="+mn-lt"/>
+            </a:endParaRPr>
+          </a:p>
+          <a:p>
+            <a:endParaRPr lang="en-US" b="0" i="0" dirty="0">
+              <a:solidFill>
+                <a:srgbClr val="3C3C3B"/>
+              </a:solidFill>
+              <a:effectLst/>
+              <a:latin typeface="+mn-lt"/>
+            </a:endParaRPr>
+          </a:p>
+          <a:p>
+            <a:pPr marL="228600" indent="-228600">
+              <a:buAutoNum type="arabicPeriod"/>
+            </a:pPr>
+            <a:r>
+              <a:rPr lang="en-US" b="0" i="0" dirty="0">
+                <a:solidFill>
+                  <a:srgbClr val="3C3C3B"/>
+                </a:solidFill>
+                <a:effectLst/>
+                <a:latin typeface="+mn-lt"/>
+              </a:rPr>
+              <a:t>Each example of input data is fed through the input layer.  And depending on the size of the input example, the number of input nodes varies. The input data can be structured data (such as a CSV file) or unstructured data, such as an image.  In this example, a greyscale image of a chicken 8 pixels by 8 pixels has been converted into a vector of 64 numbers, each one representing the intensity of the color at that point.  These </a:t>
+            </a:r>
+            <a:r>
+              <a:rPr lang="en-US" b="1" i="0" u="none" dirty="0">
+                <a:solidFill>
+                  <a:srgbClr val="3C3C3B"/>
+                </a:solidFill>
+                <a:effectLst/>
+                <a:latin typeface="+mn-lt"/>
+              </a:rPr>
+              <a:t>features</a:t>
+            </a:r>
+            <a:r>
+              <a:rPr lang="en-US" b="0" i="0" u="none" dirty="0">
+                <a:solidFill>
+                  <a:srgbClr val="3C3C3B"/>
+                </a:solidFill>
+                <a:effectLst/>
+                <a:latin typeface="+mn-lt"/>
+              </a:rPr>
+              <a:t> are then fed to the input layer, one feature per node.  In this case, X sub 2 is the second value in the vector.</a:t>
+            </a:r>
+          </a:p>
+          <a:p>
+            <a:pPr marL="228600" indent="-228600">
+              <a:buAutoNum type="arabicPeriod"/>
+            </a:pPr>
+            <a:r>
+              <a:rPr lang="en-US" b="0" i="0" u="none" dirty="0">
+                <a:solidFill>
+                  <a:srgbClr val="3C3C3B"/>
+                </a:solidFill>
+                <a:effectLst/>
+                <a:latin typeface="+mn-lt"/>
+              </a:rPr>
+              <a:t>The value in X sub 2 is then multiplied by weight xf2.</a:t>
+            </a:r>
+          </a:p>
+          <a:p>
+            <a:pPr marL="228600" indent="-228600">
+              <a:buAutoNum type="arabicPeriod"/>
+            </a:pPr>
+            <a:r>
+              <a:rPr lang="en-US" b="0" i="0" u="none" dirty="0">
+                <a:solidFill>
+                  <a:srgbClr val="3C3C3B"/>
+                </a:solidFill>
+                <a:effectLst/>
+                <a:latin typeface="+mn-lt"/>
+              </a:rPr>
+              <a:t>At node F, the net input function sums up all incoming values and passes that value to its activation function which then calculates the output value.</a:t>
+            </a:r>
+          </a:p>
+          <a:p>
+            <a:pPr marL="228600" indent="-228600">
+              <a:buAutoNum type="arabicPeriod"/>
+            </a:pPr>
+            <a:r>
+              <a:rPr lang="en-US" b="0" i="0" u="none" dirty="0">
+                <a:solidFill>
+                  <a:srgbClr val="3C3C3B"/>
+                </a:solidFill>
+                <a:effectLst/>
+                <a:latin typeface="+mn-lt"/>
+              </a:rPr>
+              <a:t>The output value from node F is then multiplied by weight wfg1.</a:t>
+            </a:r>
+          </a:p>
+          <a:p>
+            <a:pPr marL="228600" indent="-228600">
+              <a:buAutoNum type="arabicPeriod"/>
+            </a:pPr>
+            <a:r>
+              <a:rPr lang="en-US" b="0" i="0" u="none" dirty="0">
+                <a:solidFill>
+                  <a:srgbClr val="3C3C3B"/>
+                </a:solidFill>
+                <a:effectLst/>
+                <a:latin typeface="+mn-lt"/>
+              </a:rPr>
+              <a:t>At node G, the net input function sums up all incoming values and passes that value to its activation function.  Because node G is the only node in the output layer, its output is the probability P() that the input image is a chicken.  That value is then passed to the loss function which compares it to the label and calculates a loss score (E).  The optimizer then takes that loss score and uses that to adjust the weights in the backpropagation phase – this is where the network “learns.” </a:t>
+            </a:r>
+          </a:p>
+          <a:p>
+            <a:endParaRPr lang="en-US" b="0" i="0" u="none" dirty="0">
+              <a:solidFill>
+                <a:srgbClr val="3C3C3B"/>
+              </a:solidFill>
+              <a:effectLst/>
+              <a:latin typeface="+mn-lt"/>
+            </a:endParaRPr>
+          </a:p>
+          <a:p>
+            <a:pPr marL="0" marR="0" lvl="0" indent="0" algn="l" defTabSz="914400" rtl="0" eaLnBrk="1" fontAlgn="auto" latinLnBrk="0" hangingPunct="1">
+              <a:lnSpc>
+                <a:spcPct val="100000"/>
+              </a:lnSpc>
+              <a:spcBef>
+                <a:spcPts val="0"/>
+              </a:spcBef>
+              <a:spcAft>
+                <a:spcPts val="0"/>
+              </a:spcAft>
+              <a:buClrTx/>
+              <a:buSzTx/>
+              <a:buFontTx/>
+              <a:buNone/>
+              <a:tabLst/>
+              <a:defRPr/>
+            </a:pPr>
+            <a:r>
+              <a:rPr lang="en-US" b="0" i="0" dirty="0">
+                <a:solidFill>
+                  <a:srgbClr val="3C3C3B"/>
+                </a:solidFill>
+                <a:effectLst/>
+                <a:latin typeface="+mn-lt"/>
+              </a:rPr>
+              <a:t>Before we end this mini-lecture, we still have a mystery to clear up.  Why does our network contain bias nodes?  What’s their purpose?  Let’s answer that question…</a:t>
+            </a:r>
+          </a:p>
+          <a:p>
+            <a:endParaRPr lang="en-US" b="0" i="0" u="none" dirty="0">
+              <a:solidFill>
+                <a:srgbClr val="3C3C3B"/>
+              </a:solidFill>
+              <a:effectLst/>
+              <a:latin typeface="+mn-lt"/>
+            </a:endParaRPr>
+          </a:p>
+          <a:p>
+            <a:r>
+              <a:rPr lang="en-US" b="0" i="0" u="none" dirty="0">
+                <a:solidFill>
+                  <a:srgbClr val="3C3C3B"/>
+                </a:solidFill>
+                <a:effectLst/>
+                <a:latin typeface="+mn-lt"/>
+              </a:rPr>
+              <a:t>====</a:t>
+            </a:r>
+          </a:p>
+          <a:p>
+            <a:endParaRPr lang="en-US" b="0" i="0" u="none" dirty="0">
+              <a:solidFill>
+                <a:srgbClr val="3C3C3B"/>
+              </a:solidFill>
+              <a:effectLst/>
+              <a:latin typeface="+mn-lt"/>
+            </a:endParaRPr>
+          </a:p>
+          <a:p>
+            <a:r>
+              <a:rPr lang="en-US" b="0" i="0" dirty="0">
+                <a:solidFill>
+                  <a:srgbClr val="3C3C3B"/>
+                </a:solidFill>
+                <a:effectLst/>
+                <a:latin typeface="+mn-lt"/>
+              </a:rPr>
+              <a:t>We note that the input layer is fully connected to the hidden layer, consisting of two nodes.  And as you can see, each weight on the connecting lines is labelled.  During forward propagation, the output from each node is multiplied by the weights before becoming input to the downstream node.  The numbers flow from left to right.  However, the flow is reversed during </a:t>
+            </a:r>
+            <a:r>
+              <a:rPr lang="en-US" b="1" i="0" dirty="0">
+                <a:solidFill>
+                  <a:srgbClr val="3C3C3B"/>
+                </a:solidFill>
+                <a:effectLst/>
+                <a:latin typeface="+mn-lt"/>
+              </a:rPr>
+              <a:t>backpropagation,</a:t>
+            </a:r>
+            <a:r>
+              <a:rPr lang="en-US" b="0" i="0" dirty="0">
+                <a:solidFill>
+                  <a:srgbClr val="3C3C3B"/>
+                </a:solidFill>
+                <a:effectLst/>
+                <a:latin typeface="+mn-lt"/>
+              </a:rPr>
+              <a:t> and this is where the neural network ‘learns.’   The backpropagation process is fully described in our next presentation, including the loss function, total error, and optimizer.</a:t>
+            </a:r>
+          </a:p>
+          <a:p>
+            <a:endParaRPr lang="en-US" b="0" i="0" dirty="0">
+              <a:solidFill>
+                <a:srgbClr val="3C3C3B"/>
+              </a:solidFill>
+              <a:effectLst/>
+              <a:latin typeface="+mn-lt"/>
+            </a:endParaRPr>
+          </a:p>
+          <a:p>
+            <a:endParaRPr lang="en-US" b="0" i="0" dirty="0">
+              <a:solidFill>
+                <a:srgbClr val="3C3C3B"/>
+              </a:solidFill>
+              <a:effectLst/>
+              <a:latin typeface="Lato"/>
+            </a:endParaRPr>
+          </a:p>
+          <a:p>
+            <a:endParaRPr lang="en-US" b="0" i="0" dirty="0">
+              <a:solidFill>
+                <a:srgbClr val="3C3C3B"/>
+              </a:solidFill>
+              <a:effectLst/>
+              <a:latin typeface="Lato"/>
+            </a:endParaRPr>
+          </a:p>
+          <a:p>
+            <a:endParaRPr lang="en-US" b="0" i="0" dirty="0">
+              <a:solidFill>
+                <a:srgbClr val="3C3C3B"/>
+              </a:solidFill>
+              <a:effectLst/>
+              <a:latin typeface="Lato"/>
+            </a:endParaRPr>
+          </a:p>
+          <a:p>
+            <a:endParaRPr lang="en-US" b="0" i="0" dirty="0">
+              <a:solidFill>
+                <a:srgbClr val="3C3C3B"/>
+              </a:solidFill>
+              <a:effectLst/>
+              <a:latin typeface="Lato"/>
+            </a:endParaRPr>
           </a:p>
         </p:txBody>
       </p:sp>
@@ -1316,7 +1630,7 @@
     </p:spTree>
     <p:extLst>
       <p:ext uri="{BB962C8B-B14F-4D97-AF65-F5344CB8AC3E}">
-        <p14:creationId xmlns:p14="http://schemas.microsoft.com/office/powerpoint/2010/main" val="131634220"/>
+        <p14:creationId xmlns:p14="http://schemas.microsoft.com/office/powerpoint/2010/main" val="3299567317"/>
       </p:ext>
     </p:extLst>
   </p:cSld>
@@ -1370,30 +1684,18 @@
           <a:bodyPr/>
           <a:lstStyle/>
           <a:p>
-            <a:pPr marL="0" marR="0" lvl="0" indent="0" algn="l" defTabSz="914400" rtl="0" eaLnBrk="1" fontAlgn="auto" latinLnBrk="0" hangingPunct="1">
-              <a:lnSpc>
-                <a:spcPct val="100000"/>
-              </a:lnSpc>
-              <a:spcBef>
-                <a:spcPts val="0"/>
-              </a:spcBef>
-              <a:spcAft>
-                <a:spcPts val="0"/>
-              </a:spcAft>
-              <a:buClrTx/>
-              <a:buSzTx/>
-              <a:buFontTx/>
-              <a:buNone/>
-              <a:tabLst/>
-              <a:defRPr/>
-            </a:pPr>
-            <a:r>
-              <a:rPr lang="en-US" dirty="0"/>
-              <a:t>The learning experience for this workshop starts on page 55 of the textbook.  For additional information, please watch the exercise 2.01 orientation video.</a:t>
-            </a:r>
-          </a:p>
-          <a:p>
-            <a:endParaRPr lang="en-US" dirty="0"/>
+            <a:r>
+              <a:rPr lang="en-US" sz="1200" b="0" i="0" kern="1200" dirty="0">
+                <a:solidFill>
+                  <a:schemeClr val="tx1"/>
+                </a:solidFill>
+                <a:effectLst/>
+                <a:latin typeface="+mn-lt"/>
+                <a:ea typeface="+mn-ea"/>
+                <a:cs typeface="+mn-cs"/>
+              </a:rPr>
+              <a:t>Let’s now justify and explain the existence of the bias nodes.  Technically, bias provides every node in a neural network with a trainable constant value (1 or -1).  But why do we need them?  Well – on a practical level – input from the bias node enables an activation function to be shifted to the left or right.  In this case, what looks like a sigmoid function can be shifted to the left (position A) or to the right (position C).  In addition to the adjustment of weights which occurs during backpropagation, this ‘shifting’ can be important and critical for successful learning.</a:t>
+            </a:r>
           </a:p>
         </p:txBody>
       </p:sp>
@@ -1423,7 +1725,7 @@
     </p:spTree>
     <p:extLst>
       <p:ext uri="{BB962C8B-B14F-4D97-AF65-F5344CB8AC3E}">
-        <p14:creationId xmlns:p14="http://schemas.microsoft.com/office/powerpoint/2010/main" val="1401395996"/>
+        <p14:creationId xmlns:p14="http://schemas.microsoft.com/office/powerpoint/2010/main" val="131634220"/>
       </p:ext>
     </p:extLst>
   </p:cSld>
@@ -1477,10 +1779,30 @@
           <a:bodyPr/>
           <a:lstStyle/>
           <a:p>
+            <a:pPr marL="0" marR="0" lvl="0" indent="0" algn="l" defTabSz="914400" rtl="0" eaLnBrk="1" fontAlgn="auto" latinLnBrk="0" hangingPunct="1">
+              <a:lnSpc>
+                <a:spcPct val="100000"/>
+              </a:lnSpc>
+              <a:spcBef>
+                <a:spcPts val="0"/>
+              </a:spcBef>
+              <a:spcAft>
+                <a:spcPts val="0"/>
+              </a:spcAft>
+              <a:buClrTx/>
+              <a:buSzTx/>
+              <a:buFontTx/>
+              <a:buNone/>
+              <a:tabLst/>
+              <a:defRPr/>
+            </a:pPr>
             <a:r>
               <a:rPr lang="en-US" dirty="0"/>
-              <a:t> </a:t>
-            </a:r>
+              <a:t>The learning experience for this workshop starts on page 55 of the textbook.  For additional information, please watch the exercise 2.01 orientation video.</a:t>
+            </a:r>
+          </a:p>
+          <a:p>
+            <a:endParaRPr lang="en-US" dirty="0"/>
           </a:p>
         </p:txBody>
       </p:sp>
@@ -1510,7 +1832,7 @@
     </p:spTree>
     <p:extLst>
       <p:ext uri="{BB962C8B-B14F-4D97-AF65-F5344CB8AC3E}">
-        <p14:creationId xmlns:p14="http://schemas.microsoft.com/office/powerpoint/2010/main" val="1974960137"/>
+        <p14:creationId xmlns:p14="http://schemas.microsoft.com/office/powerpoint/2010/main" val="1401395996"/>
       </p:ext>
     </p:extLst>
   </p:cSld>
@@ -1564,7 +1886,10 @@
           <a:bodyPr/>
           <a:lstStyle/>
           <a:p>
-            <a:endParaRPr lang="en-US" dirty="0"/>
+            <a:r>
+              <a:rPr lang="en-US" dirty="0"/>
+              <a:t> </a:t>
+            </a:r>
           </a:p>
         </p:txBody>
       </p:sp>
@@ -1594,7 +1919,7 @@
     </p:spTree>
     <p:extLst>
       <p:ext uri="{BB962C8B-B14F-4D97-AF65-F5344CB8AC3E}">
-        <p14:creationId xmlns:p14="http://schemas.microsoft.com/office/powerpoint/2010/main" val="2435178342"/>
+        <p14:creationId xmlns:p14="http://schemas.microsoft.com/office/powerpoint/2010/main" val="1974960137"/>
       </p:ext>
     </p:extLst>
   </p:cSld>
@@ -1648,99 +1973,7 @@
           <a:bodyPr/>
           <a:lstStyle/>
           <a:p>
-            <a:pPr marL="0" marR="0" lvl="0" indent="0" algn="l" defTabSz="914400" rtl="0" eaLnBrk="1" fontAlgn="auto" latinLnBrk="0" hangingPunct="1">
-              <a:lnSpc>
-                <a:spcPct val="100000"/>
-              </a:lnSpc>
-              <a:spcBef>
-                <a:spcPts val="0"/>
-              </a:spcBef>
-              <a:spcAft>
-                <a:spcPts val="0"/>
-              </a:spcAft>
-              <a:buClrTx/>
-              <a:buSzTx/>
-              <a:buFontTx/>
-              <a:buNone/>
-              <a:tabLst/>
-              <a:defRPr/>
-            </a:pPr>
-            <a:r>
-              <a:rPr lang="en-US" sz="1200" b="0" i="0" kern="1200" dirty="0">
-                <a:solidFill>
-                  <a:schemeClr val="tx1"/>
-                </a:solidFill>
-                <a:effectLst/>
-                <a:latin typeface="+mn-lt"/>
-                <a:ea typeface="+mn-ea"/>
-                <a:cs typeface="+mn-cs"/>
-              </a:rPr>
-              <a:t>As presented in an earlier slide, each node or neuron in a network is </a:t>
-            </a:r>
-            <a:r>
-              <a:rPr lang="en-US" sz="1200" b="1" i="0" kern="1200" dirty="0">
-                <a:solidFill>
-                  <a:schemeClr val="tx1"/>
-                </a:solidFill>
-                <a:effectLst/>
-                <a:latin typeface="+mn-lt"/>
-                <a:ea typeface="+mn-ea"/>
-                <a:cs typeface="+mn-cs"/>
-              </a:rPr>
-              <a:t>activated </a:t>
-            </a:r>
-            <a:r>
-              <a:rPr lang="en-US" sz="1200" b="0" i="0" kern="1200" dirty="0">
-                <a:solidFill>
-                  <a:schemeClr val="tx1"/>
-                </a:solidFill>
-                <a:effectLst/>
-                <a:latin typeface="+mn-lt"/>
-                <a:ea typeface="+mn-ea"/>
-                <a:cs typeface="+mn-cs"/>
-              </a:rPr>
-              <a:t>in a two-step process.  First, the net input function sums up the incoming input, consisting of numbers.  Here the plus sign indicates that operation, though an upper-case Sigma (Greek letter) is frequently used in the literature.  And second, </a:t>
-            </a:r>
-            <a:r>
-              <a:rPr lang="en-US" sz="1200" b="0" i="0" kern="1200" dirty="0">
-                <a:solidFill>
-                  <a:srgbClr val="3C3C3B"/>
-                </a:solidFill>
-                <a:effectLst/>
-                <a:latin typeface="Lato"/>
-                <a:ea typeface="+mn-ea"/>
-                <a:cs typeface="+mn-cs"/>
-              </a:rPr>
-              <a:t>the</a:t>
-            </a:r>
-            <a:r>
-              <a:rPr lang="en-US" b="0" i="0" dirty="0">
-                <a:solidFill>
-                  <a:srgbClr val="3C3C3B"/>
-                </a:solidFill>
-                <a:effectLst/>
-                <a:latin typeface="Lato"/>
-              </a:rPr>
-              <a:t> net input function is tightly coupled to its corresponding activation function which, in turn, produces the node’s output.  Keep in mind that an activation function can output a positive or negative number, or even zero.</a:t>
-            </a:r>
-            <a:endParaRPr lang="en-US" sz="1200" b="1" i="0" kern="1200" dirty="0">
-              <a:solidFill>
-                <a:schemeClr val="tx1"/>
-              </a:solidFill>
-              <a:effectLst/>
-              <a:latin typeface="+mn-lt"/>
-              <a:ea typeface="+mn-ea"/>
-              <a:cs typeface="+mn-cs"/>
-            </a:endParaRPr>
-          </a:p>
-          <a:p>
-            <a:endParaRPr lang="en-US" b="0" i="0" dirty="0">
-              <a:solidFill>
-                <a:srgbClr val="3C3C3B"/>
-              </a:solidFill>
-              <a:effectLst/>
-              <a:latin typeface="Lato"/>
-            </a:endParaRPr>
+            <a:endParaRPr lang="en-US" dirty="0"/>
           </a:p>
         </p:txBody>
       </p:sp>
@@ -1770,7 +2003,7 @@
     </p:spTree>
     <p:extLst>
       <p:ext uri="{BB962C8B-B14F-4D97-AF65-F5344CB8AC3E}">
-        <p14:creationId xmlns:p14="http://schemas.microsoft.com/office/powerpoint/2010/main" val="1253710314"/>
+        <p14:creationId xmlns:p14="http://schemas.microsoft.com/office/powerpoint/2010/main" val="2435178342"/>
       </p:ext>
     </p:extLst>
   </p:cSld>
@@ -1824,207 +2057,90 @@
           <a:bodyPr/>
           <a:lstStyle/>
           <a:p>
-            <a:r>
-              <a:rPr lang="en-US" b="0" i="0" u="none" dirty="0">
-                <a:solidFill>
-                  <a:srgbClr val="3C3C3B"/>
+            <a:pPr marL="0" marR="0" lvl="0" indent="0" algn="l" defTabSz="914400" rtl="0" eaLnBrk="1" fontAlgn="auto" latinLnBrk="0" hangingPunct="1">
+              <a:lnSpc>
+                <a:spcPct val="100000"/>
+              </a:lnSpc>
+              <a:spcBef>
+                <a:spcPts val="0"/>
+              </a:spcBef>
+              <a:spcAft>
+                <a:spcPts val="0"/>
+              </a:spcAft>
+              <a:buClrTx/>
+              <a:buSzTx/>
+              <a:buFontTx/>
+              <a:buNone/>
+              <a:tabLst/>
+              <a:defRPr/>
+            </a:pPr>
+            <a:r>
+              <a:rPr lang="en-US" sz="1200" b="0" i="0" kern="1200" dirty="0">
+                <a:solidFill>
+                  <a:schemeClr val="tx1"/>
                 </a:solidFill>
                 <a:effectLst/>
                 <a:latin typeface="+mn-lt"/>
-              </a:rPr>
-              <a:t>Alright – let’s put everything we’ve discussed so far into a single image / example.  </a:t>
-            </a:r>
-          </a:p>
-          <a:p>
-            <a:endParaRPr lang="en-US" b="0" i="0" u="none" dirty="0">
+                <a:ea typeface="+mn-ea"/>
+                <a:cs typeface="+mn-cs"/>
+              </a:rPr>
+              <a:t>As presented in an earlier slide, each node or neuron in a network is </a:t>
+            </a:r>
+            <a:r>
+              <a:rPr lang="en-US" sz="1200" b="1" i="0" kern="1200" dirty="0">
+                <a:solidFill>
+                  <a:schemeClr val="tx1"/>
+                </a:solidFill>
+                <a:effectLst/>
+                <a:latin typeface="+mn-lt"/>
+                <a:ea typeface="+mn-ea"/>
+                <a:cs typeface="+mn-cs"/>
+              </a:rPr>
+              <a:t>activated </a:t>
+            </a:r>
+            <a:r>
+              <a:rPr lang="en-US" sz="1200" b="0" i="0" kern="1200" dirty="0">
+                <a:solidFill>
+                  <a:schemeClr val="tx1"/>
+                </a:solidFill>
+                <a:effectLst/>
+                <a:latin typeface="+mn-lt"/>
+                <a:ea typeface="+mn-ea"/>
+                <a:cs typeface="+mn-cs"/>
+              </a:rPr>
+              <a:t>in a two-step process.  First, the net input function sums up the incoming input, consisting of numbers.  Here the plus sign indicates that operation, though an upper-case Sigma (Greek letter) is frequently used in the literature.  And second, </a:t>
+            </a:r>
+            <a:r>
+              <a:rPr lang="en-US" sz="1200" b="0" i="0" kern="1200" dirty="0">
+                <a:solidFill>
+                  <a:srgbClr val="3C3C3B"/>
+                </a:solidFill>
+                <a:effectLst/>
+                <a:latin typeface="Lato"/>
+                <a:ea typeface="+mn-ea"/>
+                <a:cs typeface="+mn-cs"/>
+              </a:rPr>
+              <a:t>the</a:t>
+            </a:r>
+            <a:r>
+              <a:rPr lang="en-US" b="0" i="0" dirty="0">
+                <a:solidFill>
+                  <a:srgbClr val="3C3C3B"/>
+                </a:solidFill>
+                <a:effectLst/>
+                <a:latin typeface="Lato"/>
+              </a:rPr>
+              <a:t> net input function is tightly coupled to its corresponding activation function which, in turn, produces the node’s output.  Keep in mind that an activation function can output a positive or negative number, or even zero.</a:t>
+            </a:r>
+            <a:endParaRPr lang="en-US" sz="1200" b="1" i="0" kern="1200" dirty="0">
               <a:solidFill>
-                <a:srgbClr val="3C3C3B"/>
+                <a:schemeClr val="tx1"/>
               </a:solidFill>
               <a:effectLst/>
               <a:latin typeface="+mn-lt"/>
+              <a:ea typeface="+mn-ea"/>
+              <a:cs typeface="+mn-cs"/>
             </a:endParaRPr>
-          </a:p>
-          <a:p>
-            <a:r>
-              <a:rPr lang="en-US" b="0" i="0" u="none" dirty="0">
-                <a:solidFill>
-                  <a:srgbClr val="3C3C3B"/>
-                </a:solidFill>
-                <a:effectLst/>
-                <a:latin typeface="+mn-lt"/>
-              </a:rPr>
-              <a:t>Pictured here is a complete, albeit small, neural network.  As such, it consists of an </a:t>
-            </a:r>
-            <a:r>
-              <a:rPr lang="en-US" b="1" i="0" u="none" dirty="0">
-                <a:solidFill>
-                  <a:srgbClr val="3C3C3B"/>
-                </a:solidFill>
-                <a:effectLst/>
-                <a:latin typeface="+mn-lt"/>
-              </a:rPr>
-              <a:t>input layer</a:t>
-            </a:r>
-            <a:r>
-              <a:rPr lang="en-US" b="0" i="0" u="none" dirty="0">
-                <a:solidFill>
-                  <a:srgbClr val="3C3C3B"/>
-                </a:solidFill>
-                <a:effectLst/>
-                <a:latin typeface="+mn-lt"/>
-              </a:rPr>
-              <a:t>, a single </a:t>
-            </a:r>
-            <a:r>
-              <a:rPr lang="en-US" b="1" i="0" u="none" dirty="0">
-                <a:solidFill>
-                  <a:srgbClr val="3C3C3B"/>
-                </a:solidFill>
-                <a:effectLst/>
-                <a:latin typeface="+mn-lt"/>
-              </a:rPr>
-              <a:t>hidden layer</a:t>
-            </a:r>
-            <a:r>
-              <a:rPr lang="en-US" b="0" i="0" u="none" dirty="0">
-                <a:solidFill>
-                  <a:srgbClr val="3C3C3B"/>
-                </a:solidFill>
-                <a:effectLst/>
-                <a:latin typeface="+mn-lt"/>
-              </a:rPr>
-              <a:t>, and an </a:t>
-            </a:r>
-            <a:r>
-              <a:rPr lang="en-US" b="1" i="0" u="none" dirty="0">
-                <a:solidFill>
-                  <a:srgbClr val="3C3C3B"/>
-                </a:solidFill>
-                <a:effectLst/>
-                <a:latin typeface="+mn-lt"/>
-              </a:rPr>
-              <a:t>output layer</a:t>
-            </a:r>
-            <a:r>
-              <a:rPr lang="en-US" b="0" i="0" u="none" dirty="0">
-                <a:solidFill>
-                  <a:srgbClr val="3C3C3B"/>
-                </a:solidFill>
-                <a:effectLst/>
-                <a:latin typeface="+mn-lt"/>
-              </a:rPr>
-              <a:t>.  </a:t>
-            </a:r>
-            <a:endParaRPr lang="en-US" b="0" i="0" dirty="0">
-              <a:solidFill>
-                <a:srgbClr val="3C3C3B"/>
-              </a:solidFill>
-              <a:effectLst/>
-              <a:latin typeface="+mn-lt"/>
-            </a:endParaRPr>
-          </a:p>
-          <a:p>
-            <a:endParaRPr lang="en-US" b="0" i="0" dirty="0">
-              <a:solidFill>
-                <a:srgbClr val="3C3C3B"/>
-              </a:solidFill>
-              <a:effectLst/>
-              <a:latin typeface="+mn-lt"/>
-            </a:endParaRPr>
-          </a:p>
-          <a:p>
-            <a:r>
-              <a:rPr lang="en-US" b="0" i="0" dirty="0">
-                <a:solidFill>
-                  <a:srgbClr val="3C3C3B"/>
-                </a:solidFill>
-                <a:effectLst/>
-                <a:latin typeface="+mn-lt"/>
-              </a:rPr>
-              <a:t>Each example of input data is fed through the input layer.  And depending on the size of the input example, the number of input nodes varies. The input data can be structured data (such as a CSV file) or unstructured data, such as an image.  In this example, a greyscale image of a chicken 8 pixels by 8 pixels has been converted into a vector of 64 numbers, each one representing the intensity of the color at that point.  These </a:t>
-            </a:r>
-            <a:r>
-              <a:rPr lang="en-US" b="1" i="0" u="none" dirty="0">
-                <a:solidFill>
-                  <a:srgbClr val="3C3C3B"/>
-                </a:solidFill>
-                <a:effectLst/>
-                <a:latin typeface="+mn-lt"/>
-              </a:rPr>
-              <a:t>features</a:t>
-            </a:r>
-            <a:r>
-              <a:rPr lang="en-US" b="0" i="0" u="none" dirty="0">
-                <a:solidFill>
-                  <a:srgbClr val="3C3C3B"/>
-                </a:solidFill>
-                <a:effectLst/>
-                <a:latin typeface="+mn-lt"/>
-              </a:rPr>
-              <a:t> are then fed into the input layer, one feature per node.  In this case, X sub n is pixel #64, with the others implied by the ellipses.</a:t>
-            </a:r>
-          </a:p>
-          <a:p>
-            <a:endParaRPr lang="en-US" b="0" i="0" u="none" dirty="0">
-              <a:solidFill>
-                <a:srgbClr val="3C3C3B"/>
-              </a:solidFill>
-              <a:effectLst/>
-              <a:latin typeface="+mn-lt"/>
-            </a:endParaRPr>
-          </a:p>
-          <a:p>
-            <a:r>
-              <a:rPr lang="en-US" b="0" i="0" dirty="0">
-                <a:solidFill>
-                  <a:srgbClr val="3C3C3B"/>
-                </a:solidFill>
-                <a:effectLst/>
-                <a:latin typeface="+mn-lt"/>
-              </a:rPr>
-              <a:t>We note that the input layer is fully connected to the hidden layer, consisting of two nodes.  And as you can see, each weight on the connecting lines is labelled.  During forward propagation, the output from each node is multiplied by the weights before becoming input to the downstream node.  The numbers flow from left to right.  However, the flow is reversed during </a:t>
-            </a:r>
-            <a:r>
-              <a:rPr lang="en-US" b="1" i="0" dirty="0">
-                <a:solidFill>
-                  <a:srgbClr val="3C3C3B"/>
-                </a:solidFill>
-                <a:effectLst/>
-                <a:latin typeface="+mn-lt"/>
-              </a:rPr>
-              <a:t>backpropagation,</a:t>
-            </a:r>
-            <a:r>
-              <a:rPr lang="en-US" b="0" i="0" dirty="0">
-                <a:solidFill>
-                  <a:srgbClr val="3C3C3B"/>
-                </a:solidFill>
-                <a:effectLst/>
-                <a:latin typeface="+mn-lt"/>
-              </a:rPr>
-              <a:t> and this is where the neural network ‘learns.’   The backpropagation process is fully described in our next presentation, including the loss function, total error, and optimizer.</a:t>
-            </a:r>
-          </a:p>
-          <a:p>
-            <a:endParaRPr lang="en-US" b="0" i="0" dirty="0">
-              <a:solidFill>
-                <a:srgbClr val="3C3C3B"/>
-              </a:solidFill>
-              <a:effectLst/>
-              <a:latin typeface="+mn-lt"/>
-            </a:endParaRPr>
-          </a:p>
-          <a:p>
-            <a:r>
-              <a:rPr lang="en-US" b="0" i="0" dirty="0">
-                <a:solidFill>
-                  <a:srgbClr val="3C3C3B"/>
-                </a:solidFill>
-                <a:effectLst/>
-                <a:latin typeface="+mn-lt"/>
-              </a:rPr>
-              <a:t>But before we end this presentation, we still have a mystery to clear up.  Why does our network contain bias nodes?  What’s their purpose?  Let’s answer that question…</a:t>
-            </a:r>
           </a:p>
           <a:p>
             <a:endParaRPr lang="en-US" b="0" i="0" dirty="0">
@@ -2035,24 +2151,6 @@
               <a:latin typeface="Lato"/>
             </a:endParaRPr>
           </a:p>
-          <a:p>
-            <a:endParaRPr lang="en-US" b="0" i="0" dirty="0">
-              <a:solidFill>
-                <a:srgbClr val="3C3C3B"/>
-              </a:solidFill>
-              <a:effectLst/>
-              <a:latin typeface="Lato"/>
-            </a:endParaRPr>
-          </a:p>
-          <a:p>
-            <a:endParaRPr lang="en-US" b="0" i="0" dirty="0">
-              <a:solidFill>
-                <a:srgbClr val="3C3C3B"/>
-              </a:solidFill>
-              <a:effectLst/>
-              <a:latin typeface="Lato"/>
-            </a:endParaRPr>
-          </a:p>
         </p:txBody>
       </p:sp>
       <p:sp>
@@ -2081,7 +2179,7 @@
     </p:spTree>
     <p:extLst>
       <p:ext uri="{BB962C8B-B14F-4D97-AF65-F5344CB8AC3E}">
-        <p14:creationId xmlns:p14="http://schemas.microsoft.com/office/powerpoint/2010/main" val="3299567317"/>
+        <p14:creationId xmlns:p14="http://schemas.microsoft.com/office/powerpoint/2010/main" val="1253710314"/>
       </p:ext>
     </p:extLst>
   </p:cSld>
@@ -3900,7 +3998,7 @@
           <a:p>
             <a:fld id="{C3F78080-8D0A-4BE8-A5B4-CB115102D524}" type="datetimeFigureOut">
               <a:rPr lang="en-US" smtClean="0"/>
-              <a:t>10/26/2021</a:t>
+              <a:t>3/24/2022</a:t>
             </a:fld>
             <a:endParaRPr lang="en-US"/>
           </a:p>
@@ -4098,7 +4196,7 @@
           <a:p>
             <a:fld id="{C3F78080-8D0A-4BE8-A5B4-CB115102D524}" type="datetimeFigureOut">
               <a:rPr lang="en-US" smtClean="0"/>
-              <a:t>10/26/2021</a:t>
+              <a:t>3/24/2022</a:t>
             </a:fld>
             <a:endParaRPr lang="en-US"/>
           </a:p>
@@ -4306,7 +4404,7 @@
           <a:p>
             <a:fld id="{C3F78080-8D0A-4BE8-A5B4-CB115102D524}" type="datetimeFigureOut">
               <a:rPr lang="en-US" smtClean="0"/>
-              <a:t>10/26/2021</a:t>
+              <a:t>3/24/2022</a:t>
             </a:fld>
             <a:endParaRPr lang="en-US"/>
           </a:p>
@@ -4504,7 +4602,7 @@
           <a:p>
             <a:fld id="{C3F78080-8D0A-4BE8-A5B4-CB115102D524}" type="datetimeFigureOut">
               <a:rPr lang="en-US" smtClean="0"/>
-              <a:t>10/26/2021</a:t>
+              <a:t>3/24/2022</a:t>
             </a:fld>
             <a:endParaRPr lang="en-US"/>
           </a:p>
@@ -4779,7 +4877,7 @@
           <a:p>
             <a:fld id="{C3F78080-8D0A-4BE8-A5B4-CB115102D524}" type="datetimeFigureOut">
               <a:rPr lang="en-US" smtClean="0"/>
-              <a:t>10/26/2021</a:t>
+              <a:t>3/24/2022</a:t>
             </a:fld>
             <a:endParaRPr lang="en-US"/>
           </a:p>
@@ -5044,7 +5142,7 @@
           <a:p>
             <a:fld id="{C3F78080-8D0A-4BE8-A5B4-CB115102D524}" type="datetimeFigureOut">
               <a:rPr lang="en-US" smtClean="0"/>
-              <a:t>10/26/2021</a:t>
+              <a:t>3/24/2022</a:t>
             </a:fld>
             <a:endParaRPr lang="en-US"/>
           </a:p>
@@ -5456,7 +5554,7 @@
           <a:p>
             <a:fld id="{C3F78080-8D0A-4BE8-A5B4-CB115102D524}" type="datetimeFigureOut">
               <a:rPr lang="en-US" smtClean="0"/>
-              <a:t>10/26/2021</a:t>
+              <a:t>3/24/2022</a:t>
             </a:fld>
             <a:endParaRPr lang="en-US"/>
           </a:p>
@@ -5597,7 +5695,7 @@
           <a:p>
             <a:fld id="{C3F78080-8D0A-4BE8-A5B4-CB115102D524}" type="datetimeFigureOut">
               <a:rPr lang="en-US" smtClean="0"/>
-              <a:t>10/26/2021</a:t>
+              <a:t>3/24/2022</a:t>
             </a:fld>
             <a:endParaRPr lang="en-US"/>
           </a:p>
@@ -5710,7 +5808,7 @@
           <a:p>
             <a:fld id="{C3F78080-8D0A-4BE8-A5B4-CB115102D524}" type="datetimeFigureOut">
               <a:rPr lang="en-US" smtClean="0"/>
-              <a:t>10/26/2021</a:t>
+              <a:t>3/24/2022</a:t>
             </a:fld>
             <a:endParaRPr lang="en-US"/>
           </a:p>
@@ -6021,7 +6119,7 @@
           <a:p>
             <a:fld id="{C3F78080-8D0A-4BE8-A5B4-CB115102D524}" type="datetimeFigureOut">
               <a:rPr lang="en-US" smtClean="0"/>
-              <a:t>10/26/2021</a:t>
+              <a:t>3/24/2022</a:t>
             </a:fld>
             <a:endParaRPr lang="en-US"/>
           </a:p>
@@ -6309,7 +6407,7 @@
           <a:p>
             <a:fld id="{C3F78080-8D0A-4BE8-A5B4-CB115102D524}" type="datetimeFigureOut">
               <a:rPr lang="en-US" smtClean="0"/>
-              <a:t>10/26/2021</a:t>
+              <a:t>3/24/2022</a:t>
             </a:fld>
             <a:endParaRPr lang="en-US"/>
           </a:p>
@@ -6550,7 +6648,7 @@
           <a:p>
             <a:fld id="{C3F78080-8D0A-4BE8-A5B4-CB115102D524}" type="datetimeFigureOut">
               <a:rPr lang="en-US" smtClean="0"/>
-              <a:t>10/26/2021</a:t>
+              <a:t>3/24/2022</a:t>
             </a:fld>
             <a:endParaRPr lang="en-US"/>
           </a:p>
@@ -7223,7 +7321,7 @@
           <a:graphicData uri="http://schemas.openxmlformats.org/presentationml/2006/ole">
             <mc:AlternateContent xmlns:mc="http://schemas.openxmlformats.org/markup-compatibility/2006">
               <mc:Choice xmlns:v="urn:schemas-microsoft-com:vml" Requires="v">
-                <p:oleObj spid="_x0000_s1075" name="Visio" r:id="rId8" imgW="2514945" imgH="1657350" progId="Visio.Drawing.15">
+                <p:oleObj spid="_x0000_s1085" name="Visio" r:id="rId8" imgW="2514945" imgH="1657350" progId="Visio.Drawing.15">
                   <p:embed/>
                 </p:oleObj>
               </mc:Choice>
@@ -7886,6 +7984,765 @@
       </p:grpSpPr>
       <p:pic>
         <p:nvPicPr>
+          <p:cNvPr id="22" name="Picture 21">
+            <a:extLst>
+              <a:ext uri="{FF2B5EF4-FFF2-40B4-BE49-F238E27FC236}">
+                <a16:creationId xmlns:a16="http://schemas.microsoft.com/office/drawing/2014/main" id="{41F357F2-B52E-488D-B6C4-6C89B613C085}"/>
+              </a:ext>
+            </a:extLst>
+          </p:cNvPr>
+          <p:cNvPicPr>
+            <a:picLocks noChangeAspect="1"/>
+          </p:cNvPicPr>
+          <p:nvPr/>
+        </p:nvPicPr>
+        <p:blipFill>
+          <a:blip r:embed="rId3"/>
+          <a:stretch>
+            <a:fillRect/>
+          </a:stretch>
+        </p:blipFill>
+        <p:spPr>
+          <a:xfrm>
+            <a:off x="427985" y="3181352"/>
+            <a:ext cx="1931640" cy="1441523"/>
+          </a:xfrm>
+          <a:prstGeom prst="rect">
+            <a:avLst/>
+          </a:prstGeom>
+        </p:spPr>
+      </p:pic>
+      <p:sp>
+        <p:nvSpPr>
+          <p:cNvPr id="5" name="TextBox 4">
+            <a:extLst>
+              <a:ext uri="{FF2B5EF4-FFF2-40B4-BE49-F238E27FC236}">
+                <a16:creationId xmlns:a16="http://schemas.microsoft.com/office/drawing/2014/main" id="{86AFA5E5-2C43-44A4-95DB-2A0A6476895C}"/>
+              </a:ext>
+            </a:extLst>
+          </p:cNvPr>
+          <p:cNvSpPr txBox="1"/>
+          <p:nvPr/>
+        </p:nvSpPr>
+        <p:spPr>
+          <a:xfrm>
+            <a:off x="0" y="6550223"/>
+            <a:ext cx="12192000" cy="307777"/>
+          </a:xfrm>
+          <a:prstGeom prst="rect">
+            <a:avLst/>
+          </a:prstGeom>
+          <a:noFill/>
+        </p:spPr>
+        <p:txBody>
+          <a:bodyPr wrap="square" rtlCol="0">
+            <a:spAutoFit/>
+          </a:bodyPr>
+          <a:lstStyle/>
+          <a:p>
+            <a:r>
+              <a:rPr lang="en-US" sz="1400" dirty="0">
+                <a:solidFill>
+                  <a:schemeClr val="tx1">
+                    <a:lumMod val="65000"/>
+                    <a:lumOff val="35000"/>
+                  </a:schemeClr>
+                </a:solidFill>
+                <a:latin typeface="+mj-lt"/>
+                <a:ea typeface="Verdana" panose="020B0604030504040204" pitchFamily="34" charset="0"/>
+              </a:rPr>
+              <a:t>Source: Taylor, M. (2017). </a:t>
+            </a:r>
+            <a:r>
+              <a:rPr lang="en-US" sz="1400" i="1" dirty="0">
+                <a:solidFill>
+                  <a:schemeClr val="tx1">
+                    <a:lumMod val="65000"/>
+                    <a:lumOff val="35000"/>
+                  </a:schemeClr>
+                </a:solidFill>
+                <a:latin typeface="+mj-lt"/>
+                <a:ea typeface="Verdana" panose="020B0604030504040204" pitchFamily="34" charset="0"/>
+              </a:rPr>
+              <a:t>Neural networks: A visual introduction for beginners</a:t>
+            </a:r>
+            <a:r>
+              <a:rPr lang="en-US" sz="1400" dirty="0">
+                <a:solidFill>
+                  <a:schemeClr val="tx1">
+                    <a:lumMod val="65000"/>
+                    <a:lumOff val="35000"/>
+                  </a:schemeClr>
+                </a:solidFill>
+                <a:latin typeface="+mj-lt"/>
+                <a:ea typeface="Verdana" panose="020B0604030504040204" pitchFamily="34" charset="0"/>
+              </a:rPr>
+              <a:t>. Vancouver, Canada</a:t>
+            </a:r>
+            <a:r>
+              <a:rPr lang="en-US" sz="1400" b="0" i="0" dirty="0">
+                <a:solidFill>
+                  <a:schemeClr val="tx1">
+                    <a:lumMod val="65000"/>
+                    <a:lumOff val="35000"/>
+                  </a:schemeClr>
+                </a:solidFill>
+                <a:effectLst/>
+                <a:latin typeface="+mj-lt"/>
+                <a:ea typeface="Verdana" panose="020B0604030504040204" pitchFamily="34" charset="0"/>
+              </a:rPr>
+              <a:t>: Blue Windmill Media</a:t>
+            </a:r>
+            <a:r>
+              <a:rPr lang="en-US" sz="1400" dirty="0">
+                <a:solidFill>
+                  <a:schemeClr val="tx1">
+                    <a:lumMod val="65000"/>
+                    <a:lumOff val="35000"/>
+                  </a:schemeClr>
+                </a:solidFill>
+                <a:latin typeface="+mj-lt"/>
+                <a:ea typeface="Verdana" panose="020B0604030504040204" pitchFamily="34" charset="0"/>
+              </a:rPr>
+              <a:t>.</a:t>
+            </a:r>
+          </a:p>
+        </p:txBody>
+      </p:sp>
+      <p:pic>
+        <p:nvPicPr>
+          <p:cNvPr id="7" name="Picture 6">
+            <a:extLst>
+              <a:ext uri="{FF2B5EF4-FFF2-40B4-BE49-F238E27FC236}">
+                <a16:creationId xmlns:a16="http://schemas.microsoft.com/office/drawing/2014/main" id="{40A80263-667F-4A46-90DC-4B62AC3AC0E8}"/>
+              </a:ext>
+            </a:extLst>
+          </p:cNvPr>
+          <p:cNvPicPr>
+            <a:picLocks noChangeAspect="1"/>
+          </p:cNvPicPr>
+          <p:nvPr/>
+        </p:nvPicPr>
+        <p:blipFill>
+          <a:blip r:embed="rId4"/>
+          <a:stretch>
+            <a:fillRect/>
+          </a:stretch>
+        </p:blipFill>
+        <p:spPr>
+          <a:xfrm>
+            <a:off x="2359625" y="266837"/>
+            <a:ext cx="8804054" cy="5829030"/>
+          </a:xfrm>
+          <a:prstGeom prst="rect">
+            <a:avLst/>
+          </a:prstGeom>
+        </p:spPr>
+      </p:pic>
+      <p:sp>
+        <p:nvSpPr>
+          <p:cNvPr id="2" name="Oval 1">
+            <a:extLst>
+              <a:ext uri="{FF2B5EF4-FFF2-40B4-BE49-F238E27FC236}">
+                <a16:creationId xmlns:a16="http://schemas.microsoft.com/office/drawing/2014/main" id="{92FE2A71-1FD4-0740-BED9-C3E7B644B461}"/>
+              </a:ext>
+            </a:extLst>
+          </p:cNvPr>
+          <p:cNvSpPr/>
+          <p:nvPr/>
+        </p:nvSpPr>
+        <p:spPr>
+          <a:xfrm>
+            <a:off x="3843970" y="3716062"/>
+            <a:ext cx="600707" cy="584471"/>
+          </a:xfrm>
+          <a:prstGeom prst="ellipse">
+            <a:avLst/>
+          </a:prstGeom>
+          <a:solidFill>
+            <a:srgbClr val="80BE63">
+              <a:alpha val="51000"/>
+            </a:srgbClr>
+          </a:solidFill>
+          <a:ln>
+            <a:noFill/>
+          </a:ln>
+        </p:spPr>
+        <p:style>
+          <a:lnRef idx="2">
+            <a:schemeClr val="accent1">
+              <a:shade val="50000"/>
+            </a:schemeClr>
+          </a:lnRef>
+          <a:fillRef idx="1">
+            <a:schemeClr val="accent1"/>
+          </a:fillRef>
+          <a:effectRef idx="0">
+            <a:schemeClr val="accent1"/>
+          </a:effectRef>
+          <a:fontRef idx="minor">
+            <a:schemeClr val="lt1"/>
+          </a:fontRef>
+        </p:style>
+        <p:txBody>
+          <a:bodyPr rtlCol="0" anchor="ctr"/>
+          <a:lstStyle/>
+          <a:p>
+            <a:pPr algn="ctr"/>
+            <a:endParaRPr lang="en-US" dirty="0"/>
+          </a:p>
+        </p:txBody>
+      </p:sp>
+      <p:sp>
+        <p:nvSpPr>
+          <p:cNvPr id="6" name="Rectangle 5">
+            <a:extLst>
+              <a:ext uri="{FF2B5EF4-FFF2-40B4-BE49-F238E27FC236}">
+                <a16:creationId xmlns:a16="http://schemas.microsoft.com/office/drawing/2014/main" id="{4C5E2381-73DF-964D-96F1-899FCEC0A6DC}"/>
+              </a:ext>
+            </a:extLst>
+          </p:cNvPr>
+          <p:cNvSpPr/>
+          <p:nvPr/>
+        </p:nvSpPr>
+        <p:spPr>
+          <a:xfrm>
+            <a:off x="4444677" y="3993266"/>
+            <a:ext cx="1088022" cy="45719"/>
+          </a:xfrm>
+          <a:prstGeom prst="rect">
+            <a:avLst/>
+          </a:prstGeom>
+          <a:solidFill>
+            <a:srgbClr val="80BE63">
+              <a:alpha val="26890"/>
+            </a:srgbClr>
+          </a:solidFill>
+          <a:ln>
+            <a:noFill/>
+          </a:ln>
+        </p:spPr>
+        <p:style>
+          <a:lnRef idx="2">
+            <a:schemeClr val="accent1">
+              <a:shade val="50000"/>
+            </a:schemeClr>
+          </a:lnRef>
+          <a:fillRef idx="1">
+            <a:schemeClr val="accent1"/>
+          </a:fillRef>
+          <a:effectRef idx="0">
+            <a:schemeClr val="accent1"/>
+          </a:effectRef>
+          <a:fontRef idx="minor">
+            <a:schemeClr val="lt1"/>
+          </a:fontRef>
+        </p:style>
+        <p:txBody>
+          <a:bodyPr rtlCol="0" anchor="ctr"/>
+          <a:lstStyle/>
+          <a:p>
+            <a:pPr algn="ctr"/>
+            <a:endParaRPr lang="en-US"/>
+          </a:p>
+        </p:txBody>
+      </p:sp>
+      <p:sp>
+        <p:nvSpPr>
+          <p:cNvPr id="9" name="Oval 8">
+            <a:extLst>
+              <a:ext uri="{FF2B5EF4-FFF2-40B4-BE49-F238E27FC236}">
+                <a16:creationId xmlns:a16="http://schemas.microsoft.com/office/drawing/2014/main" id="{F5F5B1D9-A9FA-E949-9F96-3EFED96EF9C9}"/>
+              </a:ext>
+            </a:extLst>
+          </p:cNvPr>
+          <p:cNvSpPr/>
+          <p:nvPr/>
+        </p:nvSpPr>
+        <p:spPr>
+          <a:xfrm>
+            <a:off x="5509548" y="3716062"/>
+            <a:ext cx="600707" cy="584471"/>
+          </a:xfrm>
+          <a:prstGeom prst="ellipse">
+            <a:avLst/>
+          </a:prstGeom>
+          <a:solidFill>
+            <a:srgbClr val="80BE63">
+              <a:alpha val="51000"/>
+            </a:srgbClr>
+          </a:solidFill>
+          <a:ln>
+            <a:noFill/>
+          </a:ln>
+        </p:spPr>
+        <p:style>
+          <a:lnRef idx="2">
+            <a:schemeClr val="accent1">
+              <a:shade val="50000"/>
+            </a:schemeClr>
+          </a:lnRef>
+          <a:fillRef idx="1">
+            <a:schemeClr val="accent1"/>
+          </a:fillRef>
+          <a:effectRef idx="0">
+            <a:schemeClr val="accent1"/>
+          </a:effectRef>
+          <a:fontRef idx="minor">
+            <a:schemeClr val="lt1"/>
+          </a:fontRef>
+        </p:style>
+        <p:txBody>
+          <a:bodyPr rtlCol="0" anchor="ctr"/>
+          <a:lstStyle/>
+          <a:p>
+            <a:pPr algn="ctr"/>
+            <a:endParaRPr lang="en-US" dirty="0"/>
+          </a:p>
+        </p:txBody>
+      </p:sp>
+      <p:sp>
+        <p:nvSpPr>
+          <p:cNvPr id="10" name="Rectangle 9">
+            <a:extLst>
+              <a:ext uri="{FF2B5EF4-FFF2-40B4-BE49-F238E27FC236}">
+                <a16:creationId xmlns:a16="http://schemas.microsoft.com/office/drawing/2014/main" id="{FF718551-9087-5F45-B831-BF713DB53B80}"/>
+              </a:ext>
+            </a:extLst>
+          </p:cNvPr>
+          <p:cNvSpPr/>
+          <p:nvPr/>
+        </p:nvSpPr>
+        <p:spPr>
+          <a:xfrm rot="19653014">
+            <a:off x="6043606" y="3678371"/>
+            <a:ext cx="1143107" cy="45719"/>
+          </a:xfrm>
+          <a:prstGeom prst="rect">
+            <a:avLst/>
+          </a:prstGeom>
+          <a:solidFill>
+            <a:srgbClr val="80BE63">
+              <a:alpha val="26890"/>
+            </a:srgbClr>
+          </a:solidFill>
+          <a:ln>
+            <a:noFill/>
+          </a:ln>
+        </p:spPr>
+        <p:style>
+          <a:lnRef idx="2">
+            <a:schemeClr val="accent1">
+              <a:shade val="50000"/>
+            </a:schemeClr>
+          </a:lnRef>
+          <a:fillRef idx="1">
+            <a:schemeClr val="accent1"/>
+          </a:fillRef>
+          <a:effectRef idx="0">
+            <a:schemeClr val="accent1"/>
+          </a:effectRef>
+          <a:fontRef idx="minor">
+            <a:schemeClr val="lt1"/>
+          </a:fontRef>
+        </p:style>
+        <p:txBody>
+          <a:bodyPr rtlCol="0" anchor="ctr"/>
+          <a:lstStyle/>
+          <a:p>
+            <a:pPr algn="ctr"/>
+            <a:endParaRPr lang="en-US"/>
+          </a:p>
+        </p:txBody>
+      </p:sp>
+      <p:sp>
+        <p:nvSpPr>
+          <p:cNvPr id="11" name="Oval 10">
+            <a:extLst>
+              <a:ext uri="{FF2B5EF4-FFF2-40B4-BE49-F238E27FC236}">
+                <a16:creationId xmlns:a16="http://schemas.microsoft.com/office/drawing/2014/main" id="{A3C97397-C1CD-9043-AB16-72726132626D}"/>
+              </a:ext>
+            </a:extLst>
+          </p:cNvPr>
+          <p:cNvSpPr/>
+          <p:nvPr/>
+        </p:nvSpPr>
+        <p:spPr>
+          <a:xfrm>
+            <a:off x="7109738" y="3131289"/>
+            <a:ext cx="501095" cy="530897"/>
+          </a:xfrm>
+          <a:prstGeom prst="ellipse">
+            <a:avLst/>
+          </a:prstGeom>
+          <a:solidFill>
+            <a:srgbClr val="80BE63">
+              <a:alpha val="51000"/>
+            </a:srgbClr>
+          </a:solidFill>
+          <a:ln>
+            <a:noFill/>
+          </a:ln>
+        </p:spPr>
+        <p:style>
+          <a:lnRef idx="2">
+            <a:schemeClr val="accent1">
+              <a:shade val="50000"/>
+            </a:schemeClr>
+          </a:lnRef>
+          <a:fillRef idx="1">
+            <a:schemeClr val="accent1"/>
+          </a:fillRef>
+          <a:effectRef idx="0">
+            <a:schemeClr val="accent1"/>
+          </a:effectRef>
+          <a:fontRef idx="minor">
+            <a:schemeClr val="lt1"/>
+          </a:fontRef>
+        </p:style>
+        <p:txBody>
+          <a:bodyPr rtlCol="0" anchor="ctr"/>
+          <a:lstStyle/>
+          <a:p>
+            <a:pPr algn="ctr"/>
+            <a:endParaRPr lang="en-US" dirty="0"/>
+          </a:p>
+        </p:txBody>
+      </p:sp>
+    </p:spTree>
+    <p:extLst>
+      <p:ext uri="{BB962C8B-B14F-4D97-AF65-F5344CB8AC3E}">
+        <p14:creationId xmlns:p14="http://schemas.microsoft.com/office/powerpoint/2010/main" val="3349995480"/>
+      </p:ext>
+    </p:extLst>
+  </p:cSld>
+  <p:clrMapOvr>
+    <a:masterClrMapping/>
+  </p:clrMapOvr>
+  <p:timing>
+    <p:tnLst>
+      <p:par>
+        <p:cTn id="1" dur="indefinite" restart="never" nodeType="tmRoot">
+          <p:childTnLst>
+            <p:seq concurrent="1" nextAc="seek">
+              <p:cTn id="2" dur="indefinite" nodeType="mainSeq">
+                <p:childTnLst>
+                  <p:par>
+                    <p:cTn id="3" fill="hold">
+                      <p:stCondLst>
+                        <p:cond delay="indefinite"/>
+                      </p:stCondLst>
+                      <p:childTnLst>
+                        <p:par>
+                          <p:cTn id="4" fill="hold">
+                            <p:stCondLst>
+                              <p:cond delay="0"/>
+                            </p:stCondLst>
+                            <p:childTnLst>
+                              <p:par>
+                                <p:cTn id="5" presetID="10" presetClass="entr" presetSubtype="0" fill="hold" grpId="0" nodeType="clickEffect">
+                                  <p:stCondLst>
+                                    <p:cond delay="0"/>
+                                  </p:stCondLst>
+                                  <p:childTnLst>
+                                    <p:set>
+                                      <p:cBhvr>
+                                        <p:cTn id="6" dur="1" fill="hold">
+                                          <p:stCondLst>
+                                            <p:cond delay="0"/>
+                                          </p:stCondLst>
+                                        </p:cTn>
+                                        <p:tgtEl>
+                                          <p:spTgt spid="2"/>
+                                        </p:tgtEl>
+                                        <p:attrNameLst>
+                                          <p:attrName>style.visibility</p:attrName>
+                                        </p:attrNameLst>
+                                      </p:cBhvr>
+                                      <p:to>
+                                        <p:strVal val="visible"/>
+                                      </p:to>
+                                    </p:set>
+                                    <p:animEffect transition="in" filter="fade">
+                                      <p:cBhvr>
+                                        <p:cTn id="7" dur="500"/>
+                                        <p:tgtEl>
+                                          <p:spTgt spid="2"/>
+                                        </p:tgtEl>
+                                      </p:cBhvr>
+                                    </p:animEffect>
+                                  </p:childTnLst>
+                                </p:cTn>
+                              </p:par>
+                            </p:childTnLst>
+                          </p:cTn>
+                        </p:par>
+                      </p:childTnLst>
+                    </p:cTn>
+                  </p:par>
+                  <p:par>
+                    <p:cTn id="8" fill="hold">
+                      <p:stCondLst>
+                        <p:cond delay="indefinite"/>
+                      </p:stCondLst>
+                      <p:childTnLst>
+                        <p:par>
+                          <p:cTn id="9" fill="hold">
+                            <p:stCondLst>
+                              <p:cond delay="0"/>
+                            </p:stCondLst>
+                            <p:childTnLst>
+                              <p:par>
+                                <p:cTn id="10" presetID="10" presetClass="entr" presetSubtype="0" fill="hold" grpId="0" nodeType="clickEffect">
+                                  <p:stCondLst>
+                                    <p:cond delay="0"/>
+                                  </p:stCondLst>
+                                  <p:childTnLst>
+                                    <p:set>
+                                      <p:cBhvr>
+                                        <p:cTn id="11" dur="1" fill="hold">
+                                          <p:stCondLst>
+                                            <p:cond delay="0"/>
+                                          </p:stCondLst>
+                                        </p:cTn>
+                                        <p:tgtEl>
+                                          <p:spTgt spid="6"/>
+                                        </p:tgtEl>
+                                        <p:attrNameLst>
+                                          <p:attrName>style.visibility</p:attrName>
+                                        </p:attrNameLst>
+                                      </p:cBhvr>
+                                      <p:to>
+                                        <p:strVal val="visible"/>
+                                      </p:to>
+                                    </p:set>
+                                    <p:animEffect transition="in" filter="fade">
+                                      <p:cBhvr>
+                                        <p:cTn id="12" dur="10"/>
+                                        <p:tgtEl>
+                                          <p:spTgt spid="6"/>
+                                        </p:tgtEl>
+                                      </p:cBhvr>
+                                    </p:animEffect>
+                                  </p:childTnLst>
+                                </p:cTn>
+                              </p:par>
+                            </p:childTnLst>
+                          </p:cTn>
+                        </p:par>
+                      </p:childTnLst>
+                    </p:cTn>
+                  </p:par>
+                  <p:par>
+                    <p:cTn id="13" fill="hold">
+                      <p:stCondLst>
+                        <p:cond delay="indefinite"/>
+                      </p:stCondLst>
+                      <p:childTnLst>
+                        <p:par>
+                          <p:cTn id="14" fill="hold">
+                            <p:stCondLst>
+                              <p:cond delay="0"/>
+                            </p:stCondLst>
+                            <p:childTnLst>
+                              <p:par>
+                                <p:cTn id="15" presetID="10" presetClass="entr" presetSubtype="0" fill="hold" grpId="0" nodeType="clickEffect">
+                                  <p:stCondLst>
+                                    <p:cond delay="0"/>
+                                  </p:stCondLst>
+                                  <p:childTnLst>
+                                    <p:set>
+                                      <p:cBhvr>
+                                        <p:cTn id="16" dur="1" fill="hold">
+                                          <p:stCondLst>
+                                            <p:cond delay="0"/>
+                                          </p:stCondLst>
+                                        </p:cTn>
+                                        <p:tgtEl>
+                                          <p:spTgt spid="9"/>
+                                        </p:tgtEl>
+                                        <p:attrNameLst>
+                                          <p:attrName>style.visibility</p:attrName>
+                                        </p:attrNameLst>
+                                      </p:cBhvr>
+                                      <p:to>
+                                        <p:strVal val="visible"/>
+                                      </p:to>
+                                    </p:set>
+                                    <p:animEffect transition="in" filter="fade">
+                                      <p:cBhvr>
+                                        <p:cTn id="17" dur="500"/>
+                                        <p:tgtEl>
+                                          <p:spTgt spid="9"/>
+                                        </p:tgtEl>
+                                      </p:cBhvr>
+                                    </p:animEffect>
+                                  </p:childTnLst>
+                                </p:cTn>
+                              </p:par>
+                            </p:childTnLst>
+                          </p:cTn>
+                        </p:par>
+                      </p:childTnLst>
+                    </p:cTn>
+                  </p:par>
+                  <p:par>
+                    <p:cTn id="18" fill="hold">
+                      <p:stCondLst>
+                        <p:cond delay="indefinite"/>
+                      </p:stCondLst>
+                      <p:childTnLst>
+                        <p:par>
+                          <p:cTn id="19" fill="hold">
+                            <p:stCondLst>
+                              <p:cond delay="0"/>
+                            </p:stCondLst>
+                            <p:childTnLst>
+                              <p:par>
+                                <p:cTn id="20" presetID="10" presetClass="entr" presetSubtype="0" fill="hold" grpId="0" nodeType="clickEffect">
+                                  <p:stCondLst>
+                                    <p:cond delay="0"/>
+                                  </p:stCondLst>
+                                  <p:childTnLst>
+                                    <p:set>
+                                      <p:cBhvr>
+                                        <p:cTn id="21" dur="1" fill="hold">
+                                          <p:stCondLst>
+                                            <p:cond delay="0"/>
+                                          </p:stCondLst>
+                                        </p:cTn>
+                                        <p:tgtEl>
+                                          <p:spTgt spid="10"/>
+                                        </p:tgtEl>
+                                        <p:attrNameLst>
+                                          <p:attrName>style.visibility</p:attrName>
+                                        </p:attrNameLst>
+                                      </p:cBhvr>
+                                      <p:to>
+                                        <p:strVal val="visible"/>
+                                      </p:to>
+                                    </p:set>
+                                    <p:animEffect transition="in" filter="fade">
+                                      <p:cBhvr>
+                                        <p:cTn id="22" dur="10"/>
+                                        <p:tgtEl>
+                                          <p:spTgt spid="10"/>
+                                        </p:tgtEl>
+                                      </p:cBhvr>
+                                    </p:animEffect>
+                                  </p:childTnLst>
+                                </p:cTn>
+                              </p:par>
+                            </p:childTnLst>
+                          </p:cTn>
+                        </p:par>
+                      </p:childTnLst>
+                    </p:cTn>
+                  </p:par>
+                  <p:par>
+                    <p:cTn id="23" fill="hold">
+                      <p:stCondLst>
+                        <p:cond delay="indefinite"/>
+                      </p:stCondLst>
+                      <p:childTnLst>
+                        <p:par>
+                          <p:cTn id="24" fill="hold">
+                            <p:stCondLst>
+                              <p:cond delay="0"/>
+                            </p:stCondLst>
+                            <p:childTnLst>
+                              <p:par>
+                                <p:cTn id="25" presetID="10" presetClass="entr" presetSubtype="0" fill="hold" grpId="0" nodeType="clickEffect">
+                                  <p:stCondLst>
+                                    <p:cond delay="0"/>
+                                  </p:stCondLst>
+                                  <p:childTnLst>
+                                    <p:set>
+                                      <p:cBhvr>
+                                        <p:cTn id="26" dur="1" fill="hold">
+                                          <p:stCondLst>
+                                            <p:cond delay="0"/>
+                                          </p:stCondLst>
+                                        </p:cTn>
+                                        <p:tgtEl>
+                                          <p:spTgt spid="11"/>
+                                        </p:tgtEl>
+                                        <p:attrNameLst>
+                                          <p:attrName>style.visibility</p:attrName>
+                                        </p:attrNameLst>
+                                      </p:cBhvr>
+                                      <p:to>
+                                        <p:strVal val="visible"/>
+                                      </p:to>
+                                    </p:set>
+                                    <p:animEffect transition="in" filter="fade">
+                                      <p:cBhvr>
+                                        <p:cTn id="27" dur="500"/>
+                                        <p:tgtEl>
+                                          <p:spTgt spid="11"/>
+                                        </p:tgtEl>
+                                      </p:cBhvr>
+                                    </p:animEffect>
+                                  </p:childTnLst>
+                                </p:cTn>
+                              </p:par>
+                            </p:childTnLst>
+                          </p:cTn>
+                        </p:par>
+                      </p:childTnLst>
+                    </p:cTn>
+                  </p:par>
+                </p:childTnLst>
+              </p:cTn>
+              <p:prevCondLst>
+                <p:cond evt="onPrev" delay="0">
+                  <p:tgtEl>
+                    <p:sldTgt/>
+                  </p:tgtEl>
+                </p:cond>
+              </p:prevCondLst>
+              <p:nextCondLst>
+                <p:cond evt="onNext" delay="0">
+                  <p:tgtEl>
+                    <p:sldTgt/>
+                  </p:tgtEl>
+                </p:cond>
+              </p:nextCondLst>
+            </p:seq>
+          </p:childTnLst>
+        </p:cTn>
+      </p:par>
+    </p:tnLst>
+    <p:bldLst>
+      <p:bldP spid="2" grpId="0" animBg="1"/>
+      <p:bldP spid="6" grpId="0" animBg="1"/>
+      <p:bldP spid="9" grpId="0" animBg="1"/>
+      <p:bldP spid="10" grpId="0" animBg="1"/>
+      <p:bldP spid="11" grpId="0" animBg="1"/>
+    </p:bldLst>
+  </p:timing>
+</p:sld>
+</file>
+
+<file path=ppt/slides/slide12.xml><?xml version="1.0" encoding="utf-8"?>
+<p:sld xmlns:a="http://schemas.openxmlformats.org/drawingml/2006/main" xmlns:r="http://schemas.openxmlformats.org/officeDocument/2006/relationships" xmlns:p="http://schemas.openxmlformats.org/presentationml/2006/main">
+  <p:cSld>
+    <p:spTree>
+      <p:nvGrpSpPr>
+        <p:cNvPr id="1" name=""/>
+        <p:cNvGrpSpPr/>
+        <p:nvPr/>
+      </p:nvGrpSpPr>
+      <p:grpSpPr>
+        <a:xfrm>
+          <a:off x="0" y="0"/>
+          <a:ext cx="0" cy="0"/>
+          <a:chOff x="0" y="0"/>
+          <a:chExt cx="0" cy="0"/>
+        </a:xfrm>
+      </p:grpSpPr>
+      <p:pic>
+        <p:nvPicPr>
           <p:cNvPr id="5" name="Picture 4">
             <a:extLst>
               <a:ext uri="{FF2B5EF4-FFF2-40B4-BE49-F238E27FC236}">
@@ -8042,7 +8899,7 @@
 </p:sld>
 </file>
 
-<file path=ppt/slides/slide12.xml><?xml version="1.0" encoding="utf-8"?>
+<file path=ppt/slides/slide13.xml><?xml version="1.0" encoding="utf-8"?>
 <p:sld xmlns:a="http://schemas.openxmlformats.org/drawingml/2006/main" xmlns:r="http://schemas.openxmlformats.org/officeDocument/2006/relationships" xmlns:p="http://schemas.openxmlformats.org/presentationml/2006/main">
   <p:cSld>
     <p:spTree>
@@ -8316,7 +9173,7 @@
 </p:sld>
 </file>
 
-<file path=ppt/slides/slide13.xml><?xml version="1.0" encoding="utf-8"?>
+<file path=ppt/slides/slide14.xml><?xml version="1.0" encoding="utf-8"?>
 <p:sld xmlns:a="http://schemas.openxmlformats.org/drawingml/2006/main" xmlns:r="http://schemas.openxmlformats.org/officeDocument/2006/relationships" xmlns:p="http://schemas.openxmlformats.org/presentationml/2006/main">
   <p:cSld>
     <p:spTree>
@@ -8628,7 +9485,7 @@
 </p:sld>
 </file>
 
-<file path=ppt/slides/slide14.xml><?xml version="1.0" encoding="utf-8"?>
+<file path=ppt/slides/slide15.xml><?xml version="1.0" encoding="utf-8"?>
 <p:sld xmlns:a="http://schemas.openxmlformats.org/drawingml/2006/main" xmlns:r="http://schemas.openxmlformats.org/officeDocument/2006/relationships" xmlns:p="http://schemas.openxmlformats.org/presentationml/2006/main">
   <p:cSld>
     <p:spTree>
@@ -8754,7 +9611,7 @@
 </p:sld>
 </file>
 
-<file path=ppt/slides/slide15.xml><?xml version="1.0" encoding="utf-8"?>
+<file path=ppt/slides/slide16.xml><?xml version="1.0" encoding="utf-8"?>
 <p:sld xmlns:a="http://schemas.openxmlformats.org/drawingml/2006/main" xmlns:r="http://schemas.openxmlformats.org/officeDocument/2006/relationships" xmlns:p="http://schemas.openxmlformats.org/presentationml/2006/main">
   <p:cSld>
     <p:bg>
@@ -8971,205 +9828,6 @@
       </p:par>
     </p:tnLst>
   </p:timing>
-</p:sld>
-</file>
-
-<file path=ppt/slides/slide16.xml><?xml version="1.0" encoding="utf-8"?>
-<p:sld xmlns:a="http://schemas.openxmlformats.org/drawingml/2006/main" xmlns:r="http://schemas.openxmlformats.org/officeDocument/2006/relationships" xmlns:p="http://schemas.openxmlformats.org/presentationml/2006/main">
-  <p:cSld>
-    <p:spTree>
-      <p:nvGrpSpPr>
-        <p:cNvPr id="1" name=""/>
-        <p:cNvGrpSpPr/>
-        <p:nvPr/>
-      </p:nvGrpSpPr>
-      <p:grpSpPr>
-        <a:xfrm>
-          <a:off x="0" y="0"/>
-          <a:ext cx="0" cy="0"/>
-          <a:chOff x="0" y="0"/>
-          <a:chExt cx="0" cy="0"/>
-        </a:xfrm>
-      </p:grpSpPr>
-      <p:pic>
-        <p:nvPicPr>
-          <p:cNvPr id="22" name="Picture 21">
-            <a:extLst>
-              <a:ext uri="{FF2B5EF4-FFF2-40B4-BE49-F238E27FC236}">
-                <a16:creationId xmlns:a16="http://schemas.microsoft.com/office/drawing/2014/main" id="{41F357F2-B52E-488D-B6C4-6C89B613C085}"/>
-              </a:ext>
-            </a:extLst>
-          </p:cNvPr>
-          <p:cNvPicPr>
-            <a:picLocks noChangeAspect="1"/>
-          </p:cNvPicPr>
-          <p:nvPr/>
-        </p:nvPicPr>
-        <p:blipFill>
-          <a:blip r:embed="rId3"/>
-          <a:stretch>
-            <a:fillRect/>
-          </a:stretch>
-        </p:blipFill>
-        <p:spPr>
-          <a:xfrm>
-            <a:off x="427985" y="3181352"/>
-            <a:ext cx="1931640" cy="1441523"/>
-          </a:xfrm>
-          <a:prstGeom prst="rect">
-            <a:avLst/>
-          </a:prstGeom>
-        </p:spPr>
-      </p:pic>
-      <p:sp>
-        <p:nvSpPr>
-          <p:cNvPr id="5" name="TextBox 4">
-            <a:extLst>
-              <a:ext uri="{FF2B5EF4-FFF2-40B4-BE49-F238E27FC236}">
-                <a16:creationId xmlns:a16="http://schemas.microsoft.com/office/drawing/2014/main" id="{86AFA5E5-2C43-44A4-95DB-2A0A6476895C}"/>
-              </a:ext>
-            </a:extLst>
-          </p:cNvPr>
-          <p:cNvSpPr txBox="1"/>
-          <p:nvPr/>
-        </p:nvSpPr>
-        <p:spPr>
-          <a:xfrm>
-            <a:off x="0" y="6550223"/>
-            <a:ext cx="12192000" cy="307777"/>
-          </a:xfrm>
-          <a:prstGeom prst="rect">
-            <a:avLst/>
-          </a:prstGeom>
-          <a:noFill/>
-        </p:spPr>
-        <p:txBody>
-          <a:bodyPr wrap="square" rtlCol="0">
-            <a:spAutoFit/>
-          </a:bodyPr>
-          <a:lstStyle/>
-          <a:p>
-            <a:r>
-              <a:rPr lang="en-US" sz="1400" dirty="0">
-                <a:solidFill>
-                  <a:schemeClr val="tx1">
-                    <a:lumMod val="65000"/>
-                    <a:lumOff val="35000"/>
-                  </a:schemeClr>
-                </a:solidFill>
-                <a:latin typeface="+mj-lt"/>
-                <a:ea typeface="Verdana" panose="020B0604030504040204" pitchFamily="34" charset="0"/>
-              </a:rPr>
-              <a:t>Source: Taylor, M. (2017). </a:t>
-            </a:r>
-            <a:r>
-              <a:rPr lang="en-US" sz="1400" i="1" dirty="0">
-                <a:solidFill>
-                  <a:schemeClr val="tx1">
-                    <a:lumMod val="65000"/>
-                    <a:lumOff val="35000"/>
-                  </a:schemeClr>
-                </a:solidFill>
-                <a:latin typeface="+mj-lt"/>
-                <a:ea typeface="Verdana" panose="020B0604030504040204" pitchFamily="34" charset="0"/>
-              </a:rPr>
-              <a:t>Neural networks: A visual introduction for beginners</a:t>
-            </a:r>
-            <a:r>
-              <a:rPr lang="en-US" sz="1400" dirty="0">
-                <a:solidFill>
-                  <a:schemeClr val="tx1">
-                    <a:lumMod val="65000"/>
-                    <a:lumOff val="35000"/>
-                  </a:schemeClr>
-                </a:solidFill>
-                <a:latin typeface="+mj-lt"/>
-                <a:ea typeface="Verdana" panose="020B0604030504040204" pitchFamily="34" charset="0"/>
-              </a:rPr>
-              <a:t>. Vancouver, Canada</a:t>
-            </a:r>
-            <a:r>
-              <a:rPr lang="en-US" sz="1400" b="0" i="0" dirty="0">
-                <a:solidFill>
-                  <a:schemeClr val="tx1">
-                    <a:lumMod val="65000"/>
-                    <a:lumOff val="35000"/>
-                  </a:schemeClr>
-                </a:solidFill>
-                <a:effectLst/>
-                <a:latin typeface="+mj-lt"/>
-                <a:ea typeface="Verdana" panose="020B0604030504040204" pitchFamily="34" charset="0"/>
-              </a:rPr>
-              <a:t>: Blue Windmill Media</a:t>
-            </a:r>
-            <a:r>
-              <a:rPr lang="en-US" sz="1400" dirty="0">
-                <a:solidFill>
-                  <a:schemeClr val="tx1">
-                    <a:lumMod val="65000"/>
-                    <a:lumOff val="35000"/>
-                  </a:schemeClr>
-                </a:solidFill>
-                <a:latin typeface="+mj-lt"/>
-                <a:ea typeface="Verdana" panose="020B0604030504040204" pitchFamily="34" charset="0"/>
-              </a:rPr>
-              <a:t>.</a:t>
-            </a:r>
-          </a:p>
-        </p:txBody>
-      </p:sp>
-      <p:pic>
-        <p:nvPicPr>
-          <p:cNvPr id="7" name="Picture 6">
-            <a:extLst>
-              <a:ext uri="{FF2B5EF4-FFF2-40B4-BE49-F238E27FC236}">
-                <a16:creationId xmlns:a16="http://schemas.microsoft.com/office/drawing/2014/main" id="{40A80263-667F-4A46-90DC-4B62AC3AC0E8}"/>
-              </a:ext>
-            </a:extLst>
-          </p:cNvPr>
-          <p:cNvPicPr>
-            <a:picLocks noChangeAspect="1"/>
-          </p:cNvPicPr>
-          <p:nvPr/>
-        </p:nvPicPr>
-        <p:blipFill>
-          <a:blip r:embed="rId4"/>
-          <a:stretch>
-            <a:fillRect/>
-          </a:stretch>
-        </p:blipFill>
-        <p:spPr>
-          <a:xfrm>
-            <a:off x="2359625" y="266837"/>
-            <a:ext cx="8804054" cy="5829030"/>
-          </a:xfrm>
-          <a:prstGeom prst="rect">
-            <a:avLst/>
-          </a:prstGeom>
-        </p:spPr>
-      </p:pic>
-    </p:spTree>
-    <p:extLst>
-      <p:ext uri="{BB962C8B-B14F-4D97-AF65-F5344CB8AC3E}">
-        <p14:creationId xmlns:p14="http://schemas.microsoft.com/office/powerpoint/2010/main" val="2164698082"/>
-      </p:ext>
-    </p:extLst>
-  </p:cSld>
-  <p:clrMapOvr>
-    <a:masterClrMapping/>
-  </p:clrMapOvr>
-  <mc:AlternateContent xmlns:mc="http://schemas.openxmlformats.org/markup-compatibility/2006" xmlns:p14="http://schemas.microsoft.com/office/powerpoint/2010/main">
-    <mc:Choice Requires="p14">
-      <p:transition spd="med" p14:dur="700">
-        <p:fade/>
-      </p:transition>
-    </mc:Choice>
-    <mc:Fallback xmlns="">
-      <p:transition spd="med">
-        <p:fade/>
-      </p:transition>
-    </mc:Fallback>
-  </mc:AlternateContent>
 </p:sld>
 </file>
 

</xml_diff>

<commit_message>
Presentation update from 03.28.22 practice reading.
</commit_message>
<xml_diff>
--- a/presentations/02.1_neural_anatomy.pptx
+++ b/presentations/02.1_neural_anatomy.pptx
@@ -16,12 +16,12 @@
     <p:sldId id="324" r:id="rId7"/>
     <p:sldId id="325" r:id="rId8"/>
     <p:sldId id="326" r:id="rId9"/>
-    <p:sldId id="327" r:id="rId10"/>
-    <p:sldId id="304" r:id="rId11"/>
-    <p:sldId id="328" r:id="rId12"/>
-    <p:sldId id="302" r:id="rId13"/>
-    <p:sldId id="309" r:id="rId14"/>
-    <p:sldId id="305" r:id="rId15"/>
+    <p:sldId id="281" r:id="rId10"/>
+    <p:sldId id="327" r:id="rId11"/>
+    <p:sldId id="304" r:id="rId12"/>
+    <p:sldId id="328" r:id="rId13"/>
+    <p:sldId id="302" r:id="rId14"/>
+    <p:sldId id="309" r:id="rId15"/>
     <p:sldId id="307" r:id="rId16"/>
     <p:sldId id="306" r:id="rId17"/>
   </p:sldIdLst>
@@ -223,7 +223,7 @@
           <a:p>
             <a:fld id="{FD93C9B2-20F6-4DB1-B471-224337D0AC79}" type="datetimeFigureOut">
               <a:rPr lang="en-US" smtClean="0"/>
-              <a:t>3/24/2022</a:t>
+              <a:t>3/28/2022</a:t>
             </a:fld>
             <a:endParaRPr lang="en-US"/>
           </a:p>
@@ -625,28 +625,7 @@
           <a:bodyPr/>
           <a:lstStyle/>
           <a:p>
-            <a:r>
-              <a:rPr lang="en-US" b="0" i="0" u="none" dirty="0">
-                <a:solidFill>
-                  <a:srgbClr val="3C3C3B"/>
-                </a:solidFill>
-                <a:effectLst/>
-                <a:latin typeface="+mn-lt"/>
-              </a:rPr>
-              <a:t>Alright – let’s put everything we’ve discussed so far into a single image / example.  </a:t>
-            </a:r>
-          </a:p>
-          <a:p>
-            <a:endParaRPr lang="en-US" b="0" i="0" u="none" dirty="0">
-              <a:solidFill>
-                <a:srgbClr val="3C3C3B"/>
-              </a:solidFill>
-              <a:effectLst/>
-              <a:latin typeface="+mn-lt"/>
-            </a:endParaRPr>
-          </a:p>
-          <a:p>
-            <a:pPr marL="228600" marR="0" lvl="0" indent="-228600" algn="l" defTabSz="914400" rtl="0" eaLnBrk="1" fontAlgn="auto" latinLnBrk="0" hangingPunct="1">
+            <a:pPr marL="0" marR="0" lvl="0" indent="0" algn="l" defTabSz="914400" rtl="0" eaLnBrk="1" fontAlgn="auto" latinLnBrk="0" hangingPunct="1">
               <a:lnSpc>
                 <a:spcPct val="100000"/>
               </a:lnSpc>
@@ -659,539 +638,46 @@
               <a:buClrTx/>
               <a:buSzTx/>
               <a:buFontTx/>
-              <a:buAutoNum type="arabicPeriod"/>
+              <a:buNone/>
               <a:tabLst/>
               <a:defRPr/>
             </a:pPr>
             <a:r>
-              <a:rPr lang="en-US" b="0" i="0" u="none" dirty="0">
-                <a:solidFill>
-                  <a:srgbClr val="3C3C3B"/>
+              <a:rPr lang="en-US" sz="1200" b="0" i="0" kern="1200" dirty="0">
+                <a:solidFill>
+                  <a:schemeClr val="tx1"/>
                 </a:solidFill>
                 <a:effectLst/>
                 <a:latin typeface="+mn-lt"/>
-              </a:rPr>
-              <a:t>Pictured here is a complete, albeit small, neural network.  As such, it consists of an </a:t>
-            </a:r>
-            <a:r>
-              <a:rPr lang="en-US" b="1" i="0" u="none" dirty="0">
-                <a:solidFill>
-                  <a:srgbClr val="3C3C3B"/>
+                <a:ea typeface="+mn-ea"/>
+                <a:cs typeface="+mn-cs"/>
+              </a:rPr>
+              <a:t>And finally, a fully connected layer (also called an FC, linear, or </a:t>
+            </a:r>
+            <a:r>
+              <a:rPr lang="en-US" sz="1200" b="1" i="0" kern="1200" dirty="0">
+                <a:solidFill>
+                  <a:schemeClr val="tx1"/>
                 </a:solidFill>
                 <a:effectLst/>
                 <a:latin typeface="+mn-lt"/>
-              </a:rPr>
-              <a:t>input layer</a:t>
-            </a:r>
-            <a:r>
-              <a:rPr lang="en-US" b="0" i="0" u="none" dirty="0">
-                <a:solidFill>
-                  <a:srgbClr val="3C3C3B"/>
+                <a:ea typeface="+mn-ea"/>
+                <a:cs typeface="+mn-cs"/>
+              </a:rPr>
+              <a:t>dense layer</a:t>
+            </a:r>
+            <a:r>
+              <a:rPr lang="en-US" sz="1200" b="0" i="0" kern="1200" dirty="0">
+                <a:solidFill>
+                  <a:schemeClr val="tx1"/>
                 </a:solidFill>
                 <a:effectLst/>
                 <a:latin typeface="+mn-lt"/>
-              </a:rPr>
-              <a:t>, a single </a:t>
-            </a:r>
-            <a:r>
-              <a:rPr lang="en-US" b="1" i="0" u="none" dirty="0">
-                <a:solidFill>
-                  <a:srgbClr val="3C3C3B"/>
-                </a:solidFill>
-                <a:effectLst/>
-                <a:latin typeface="+mn-lt"/>
-              </a:rPr>
-              <a:t>hidden layer</a:t>
-            </a:r>
-            <a:r>
-              <a:rPr lang="en-US" b="0" i="0" u="none" dirty="0">
-                <a:solidFill>
-                  <a:srgbClr val="3C3C3B"/>
-                </a:solidFill>
-                <a:effectLst/>
-                <a:latin typeface="+mn-lt"/>
-              </a:rPr>
-              <a:t>, and an </a:t>
-            </a:r>
-            <a:r>
-              <a:rPr lang="en-US" b="1" i="0" u="none" dirty="0">
-                <a:solidFill>
-                  <a:srgbClr val="3C3C3B"/>
-                </a:solidFill>
-                <a:effectLst/>
-                <a:latin typeface="+mn-lt"/>
-              </a:rPr>
-              <a:t>output layer</a:t>
-            </a:r>
-            <a:r>
-              <a:rPr lang="en-US" b="0" i="0" u="none" dirty="0">
-                <a:solidFill>
-                  <a:srgbClr val="3C3C3B"/>
-                </a:solidFill>
-                <a:effectLst/>
-                <a:latin typeface="+mn-lt"/>
-              </a:rPr>
-              <a:t>.  </a:t>
-            </a:r>
-          </a:p>
-          <a:p>
-            <a:pPr marL="228600" marR="0" lvl="0" indent="-228600" algn="l" defTabSz="914400" rtl="0" eaLnBrk="1" fontAlgn="auto" latinLnBrk="0" hangingPunct="1">
-              <a:lnSpc>
-                <a:spcPct val="100000"/>
-              </a:lnSpc>
-              <a:spcBef>
-                <a:spcPts val="0"/>
-              </a:spcBef>
-              <a:spcAft>
-                <a:spcPts val="0"/>
-              </a:spcAft>
-              <a:buClrTx/>
-              <a:buSzTx/>
-              <a:buFontTx/>
-              <a:buAutoNum type="arabicPeriod"/>
-              <a:tabLst/>
-              <a:defRPr/>
-            </a:pPr>
-            <a:r>
-              <a:rPr lang="en-US" b="0" i="0" dirty="0">
-                <a:solidFill>
-                  <a:srgbClr val="3C3C3B"/>
-                </a:solidFill>
-                <a:effectLst/>
-                <a:latin typeface="+mn-lt"/>
-              </a:rPr>
-              <a:t>Input </a:t>
-            </a:r>
-            <a:r>
-              <a:rPr lang="en-US" b="1" i="0" u="none" dirty="0">
-                <a:solidFill>
-                  <a:srgbClr val="3C3C3B"/>
-                </a:solidFill>
-                <a:effectLst/>
-                <a:latin typeface="+mn-lt"/>
-              </a:rPr>
-              <a:t>features</a:t>
-            </a:r>
-            <a:r>
-              <a:rPr lang="en-US" b="0" i="0" u="none" dirty="0">
-                <a:solidFill>
-                  <a:srgbClr val="3C3C3B"/>
-                </a:solidFill>
-                <a:effectLst/>
-                <a:latin typeface="+mn-lt"/>
-              </a:rPr>
-              <a:t> are fed to the input layer, one feature per node.  </a:t>
-            </a:r>
-            <a:r>
-              <a:rPr lang="en-US" b="0" i="0" dirty="0">
-                <a:solidFill>
-                  <a:srgbClr val="3C3C3B"/>
-                </a:solidFill>
-                <a:effectLst/>
-                <a:latin typeface="+mn-lt"/>
-              </a:rPr>
-              <a:t>And depending on the size of the input example, the number of input nodes varies. The input data can be structured data (such as a CSV file) or unstructured data, such as an image.  Feature engineering, as it’s called, is an important component of any deep learning project.  </a:t>
-            </a:r>
-          </a:p>
-          <a:p>
-            <a:pPr marL="228600" marR="0" lvl="0" indent="-228600" algn="l" defTabSz="914400" rtl="0" eaLnBrk="1" fontAlgn="auto" latinLnBrk="0" hangingPunct="1">
-              <a:lnSpc>
-                <a:spcPct val="100000"/>
-              </a:lnSpc>
-              <a:spcBef>
-                <a:spcPts val="0"/>
-              </a:spcBef>
-              <a:spcAft>
-                <a:spcPts val="0"/>
-              </a:spcAft>
-              <a:buClrTx/>
-              <a:buSzTx/>
-              <a:buFontTx/>
-              <a:buAutoNum type="arabicPeriod"/>
-              <a:tabLst/>
-              <a:defRPr/>
-            </a:pPr>
-            <a:r>
-              <a:rPr lang="en-US" b="0" i="0" dirty="0">
-                <a:solidFill>
-                  <a:srgbClr val="3C3C3B"/>
-                </a:solidFill>
-                <a:effectLst/>
-                <a:latin typeface="+mn-lt"/>
-              </a:rPr>
-              <a:t>During </a:t>
-            </a:r>
-            <a:r>
-              <a:rPr lang="en-US" b="1" i="0" dirty="0">
-                <a:solidFill>
-                  <a:srgbClr val="3C3C3B"/>
-                </a:solidFill>
-                <a:effectLst/>
-                <a:latin typeface="+mn-lt"/>
-              </a:rPr>
-              <a:t>forward propagation</a:t>
-            </a:r>
-            <a:r>
-              <a:rPr lang="en-US" b="0" i="0" dirty="0">
-                <a:solidFill>
-                  <a:srgbClr val="3C3C3B"/>
-                </a:solidFill>
-                <a:effectLst/>
-                <a:latin typeface="+mn-lt"/>
-              </a:rPr>
-              <a:t>, the flow of numbers is from left to right.  That flow is reversed in </a:t>
-            </a:r>
-            <a:r>
-              <a:rPr lang="en-US" b="1" i="0" dirty="0">
-                <a:solidFill>
-                  <a:srgbClr val="3C3C3B"/>
-                </a:solidFill>
-                <a:effectLst/>
-                <a:latin typeface="+mn-lt"/>
-              </a:rPr>
-              <a:t>back propagation</a:t>
-            </a:r>
-            <a:r>
-              <a:rPr lang="en-US" b="0" i="0" dirty="0">
-                <a:solidFill>
-                  <a:srgbClr val="3C3C3B"/>
-                </a:solidFill>
-                <a:effectLst/>
-                <a:latin typeface="+mn-lt"/>
-              </a:rPr>
-              <a:t>, to be discussed in our next presentation.</a:t>
-            </a:r>
-          </a:p>
-          <a:p>
-            <a:pPr marL="228600" marR="0" lvl="0" indent="-228600" algn="l" defTabSz="914400" rtl="0" eaLnBrk="1" fontAlgn="auto" latinLnBrk="0" hangingPunct="1">
-              <a:lnSpc>
-                <a:spcPct val="100000"/>
-              </a:lnSpc>
-              <a:spcBef>
-                <a:spcPts val="0"/>
-              </a:spcBef>
-              <a:spcAft>
-                <a:spcPts val="0"/>
-              </a:spcAft>
-              <a:buClrTx/>
-              <a:buSzTx/>
-              <a:buFontTx/>
-              <a:buAutoNum type="arabicPeriod"/>
-              <a:tabLst/>
-              <a:defRPr/>
-            </a:pPr>
-            <a:r>
-              <a:rPr lang="en-US" b="0" i="0" dirty="0">
-                <a:solidFill>
-                  <a:srgbClr val="3C3C3B"/>
-                </a:solidFill>
-                <a:effectLst/>
-                <a:latin typeface="+mn-lt"/>
-              </a:rPr>
-              <a:t>We now label each of our weights.  During forward propagation, the output from each node is multiplied by its corresponding weight before becoming input to the downstream node.  So, for example, the output from (G) is multiplied by weight Wgf1 before becoming input to node (F).  </a:t>
-            </a:r>
-          </a:p>
-          <a:p>
-            <a:pPr marL="228600" marR="0" lvl="0" indent="-228600" algn="l" defTabSz="914400" rtl="0" eaLnBrk="1" fontAlgn="auto" latinLnBrk="0" hangingPunct="1">
-              <a:lnSpc>
-                <a:spcPct val="100000"/>
-              </a:lnSpc>
-              <a:spcBef>
-                <a:spcPts val="0"/>
-              </a:spcBef>
-              <a:spcAft>
-                <a:spcPts val="0"/>
-              </a:spcAft>
-              <a:buClrTx/>
-              <a:buSzTx/>
-              <a:buFontTx/>
-              <a:buAutoNum type="arabicPeriod"/>
-              <a:tabLst/>
-              <a:defRPr/>
-            </a:pPr>
-            <a:r>
-              <a:rPr lang="en-US" b="0" i="0" dirty="0">
-                <a:solidFill>
-                  <a:srgbClr val="3C3C3B"/>
-                </a:solidFill>
-                <a:effectLst/>
-                <a:latin typeface="+mn-lt"/>
-              </a:rPr>
-              <a:t>A </a:t>
-            </a:r>
-            <a:r>
-              <a:rPr lang="en-US" b="1" i="0" dirty="0">
-                <a:solidFill>
-                  <a:srgbClr val="3C3C3B"/>
-                </a:solidFill>
-                <a:effectLst/>
-                <a:latin typeface="+mn-lt"/>
-              </a:rPr>
-              <a:t>bias node </a:t>
-            </a:r>
-            <a:r>
-              <a:rPr lang="en-US" b="0" i="0" dirty="0">
-                <a:solidFill>
-                  <a:srgbClr val="3C3C3B"/>
-                </a:solidFill>
-                <a:effectLst/>
-                <a:latin typeface="+mn-lt"/>
-              </a:rPr>
-              <a:t>is typically associated with each layer – the function of bias nodes will be discussed in just a few minutes.</a:t>
-            </a:r>
-          </a:p>
-          <a:p>
-            <a:pPr marL="228600" marR="0" lvl="0" indent="-228600" algn="l" defTabSz="914400" rtl="0" eaLnBrk="1" fontAlgn="auto" latinLnBrk="0" hangingPunct="1">
-              <a:lnSpc>
-                <a:spcPct val="100000"/>
-              </a:lnSpc>
-              <a:spcBef>
-                <a:spcPts val="0"/>
-              </a:spcBef>
-              <a:spcAft>
-                <a:spcPts val="0"/>
-              </a:spcAft>
-              <a:buClrTx/>
-              <a:buSzTx/>
-              <a:buFontTx/>
-              <a:buAutoNum type="arabicPeriod"/>
-              <a:tabLst/>
-              <a:defRPr/>
-            </a:pPr>
-            <a:r>
-              <a:rPr lang="en-US" b="0" i="0" dirty="0">
-                <a:solidFill>
-                  <a:srgbClr val="3C3C3B"/>
-                </a:solidFill>
-                <a:effectLst/>
-                <a:latin typeface="+mn-lt"/>
-              </a:rPr>
-              <a:t>In this example, the network’s output is passed from node (F) to an error function which calculates the network’s </a:t>
-            </a:r>
-            <a:r>
-              <a:rPr lang="en-US" b="1" i="0" dirty="0">
-                <a:solidFill>
-                  <a:srgbClr val="3C3C3B"/>
-                </a:solidFill>
-                <a:effectLst/>
-                <a:latin typeface="+mn-lt"/>
-              </a:rPr>
-              <a:t>total error</a:t>
-            </a:r>
-            <a:r>
-              <a:rPr lang="en-US" b="0" i="0" dirty="0">
-                <a:solidFill>
-                  <a:srgbClr val="3C3C3B"/>
-                </a:solidFill>
-                <a:effectLst/>
-                <a:latin typeface="+mn-lt"/>
-              </a:rPr>
-              <a:t>, the difference between </a:t>
-            </a:r>
-            <a:r>
-              <a:rPr lang="en-US" b="1" i="0" dirty="0">
-                <a:solidFill>
-                  <a:srgbClr val="3C3C3B"/>
-                </a:solidFill>
-                <a:effectLst/>
-                <a:latin typeface="+mn-lt"/>
-              </a:rPr>
-              <a:t>ground truth </a:t>
-            </a:r>
-            <a:r>
-              <a:rPr lang="en-US" b="0" i="0" dirty="0">
-                <a:solidFill>
-                  <a:srgbClr val="3C3C3B"/>
-                </a:solidFill>
-                <a:effectLst/>
-                <a:latin typeface="+mn-lt"/>
-              </a:rPr>
-              <a:t>(labelled y) and the output.  A more complete explanation of the error function will be discussed in our next workshop when we explain the </a:t>
-            </a:r>
-            <a:r>
-              <a:rPr lang="en-US" b="1" i="0" dirty="0">
-                <a:solidFill>
-                  <a:srgbClr val="3C3C3B"/>
-                </a:solidFill>
-                <a:effectLst/>
-                <a:latin typeface="+mn-lt"/>
-              </a:rPr>
-              <a:t>back propagation / gradient descent </a:t>
-            </a:r>
-            <a:r>
-              <a:rPr lang="en-US" b="0" i="0" dirty="0">
-                <a:solidFill>
-                  <a:srgbClr val="3C3C3B"/>
-                </a:solidFill>
-                <a:effectLst/>
-                <a:latin typeface="+mn-lt"/>
-              </a:rPr>
-              <a:t>process.</a:t>
-            </a:r>
-            <a:endParaRPr lang="en-US" b="1" i="0" dirty="0">
-              <a:solidFill>
-                <a:srgbClr val="3C3C3B"/>
-              </a:solidFill>
-              <a:effectLst/>
-              <a:latin typeface="+mn-lt"/>
-            </a:endParaRPr>
-          </a:p>
-          <a:p>
-            <a:pPr marL="228600" marR="0" lvl="0" indent="-228600" algn="l" defTabSz="914400" rtl="0" eaLnBrk="1" fontAlgn="auto" latinLnBrk="0" hangingPunct="1">
-              <a:lnSpc>
-                <a:spcPct val="100000"/>
-              </a:lnSpc>
-              <a:spcBef>
-                <a:spcPts val="0"/>
-              </a:spcBef>
-              <a:spcAft>
-                <a:spcPts val="0"/>
-              </a:spcAft>
-              <a:buClrTx/>
-              <a:buSzTx/>
-              <a:buFontTx/>
-              <a:buAutoNum type="arabicPeriod"/>
-              <a:tabLst/>
-              <a:defRPr/>
-            </a:pPr>
-            <a:endParaRPr lang="en-US" b="1" i="0" dirty="0">
-              <a:solidFill>
-                <a:srgbClr val="3C3C3B"/>
-              </a:solidFill>
-              <a:effectLst/>
-              <a:latin typeface="+mn-lt"/>
-            </a:endParaRPr>
-          </a:p>
-          <a:p>
-            <a:pPr marL="228600" marR="0" lvl="0" indent="-228600" algn="l" defTabSz="914400" rtl="0" eaLnBrk="1" fontAlgn="auto" latinLnBrk="0" hangingPunct="1">
-              <a:lnSpc>
-                <a:spcPct val="100000"/>
-              </a:lnSpc>
-              <a:spcBef>
-                <a:spcPts val="0"/>
-              </a:spcBef>
-              <a:spcAft>
-                <a:spcPts val="0"/>
-              </a:spcAft>
-              <a:buClrTx/>
-              <a:buSzTx/>
-              <a:buFontTx/>
-              <a:buAutoNum type="arabicPeriod"/>
-              <a:tabLst/>
-              <a:defRPr/>
-            </a:pPr>
-            <a:endParaRPr lang="en-US" b="0" i="0" dirty="0">
-              <a:solidFill>
-                <a:srgbClr val="3C3C3B"/>
-              </a:solidFill>
-              <a:effectLst/>
-              <a:latin typeface="+mn-lt"/>
-            </a:endParaRPr>
-          </a:p>
-          <a:p>
-            <a:pPr marL="228600" marR="0" lvl="0" indent="-228600" algn="l" defTabSz="914400" rtl="0" eaLnBrk="1" fontAlgn="auto" latinLnBrk="0" hangingPunct="1">
-              <a:lnSpc>
-                <a:spcPct val="100000"/>
-              </a:lnSpc>
-              <a:spcBef>
-                <a:spcPts val="0"/>
-              </a:spcBef>
-              <a:spcAft>
-                <a:spcPts val="0"/>
-              </a:spcAft>
-              <a:buClrTx/>
-              <a:buSzTx/>
-              <a:buFontTx/>
-              <a:buAutoNum type="arabicPeriod"/>
-              <a:tabLst/>
-              <a:defRPr/>
-            </a:pPr>
-            <a:endParaRPr lang="en-US" b="0" i="0" u="none" dirty="0">
-              <a:solidFill>
-                <a:srgbClr val="3C3C3B"/>
-              </a:solidFill>
-              <a:effectLst/>
-              <a:latin typeface="+mn-lt"/>
-            </a:endParaRPr>
-          </a:p>
-          <a:p>
-            <a:pPr marL="228600" marR="0" lvl="0" indent="-228600" algn="l" defTabSz="914400" rtl="0" eaLnBrk="1" fontAlgn="auto" latinLnBrk="0" hangingPunct="1">
-              <a:lnSpc>
-                <a:spcPct val="100000"/>
-              </a:lnSpc>
-              <a:spcBef>
-                <a:spcPts val="0"/>
-              </a:spcBef>
-              <a:spcAft>
-                <a:spcPts val="0"/>
-              </a:spcAft>
-              <a:buClrTx/>
-              <a:buSzTx/>
-              <a:buFontTx/>
-              <a:buAutoNum type="arabicPeriod"/>
-              <a:tabLst/>
-              <a:defRPr/>
-            </a:pPr>
-            <a:endParaRPr lang="en-US" b="0" i="0" u="none" dirty="0">
-              <a:solidFill>
-                <a:srgbClr val="3C3C3B"/>
-              </a:solidFill>
-              <a:effectLst/>
-              <a:latin typeface="+mn-lt"/>
-            </a:endParaRPr>
-          </a:p>
-          <a:p>
-            <a:pPr marL="228600" marR="0" lvl="0" indent="-228600" algn="l" defTabSz="914400" rtl="0" eaLnBrk="1" fontAlgn="auto" latinLnBrk="0" hangingPunct="1">
-              <a:lnSpc>
-                <a:spcPct val="100000"/>
-              </a:lnSpc>
-              <a:spcBef>
-                <a:spcPts val="0"/>
-              </a:spcBef>
-              <a:spcAft>
-                <a:spcPts val="0"/>
-              </a:spcAft>
-              <a:buClrTx/>
-              <a:buSzTx/>
-              <a:buFontTx/>
-              <a:buAutoNum type="arabicPeriod"/>
-              <a:tabLst/>
-              <a:defRPr/>
-            </a:pPr>
-            <a:endParaRPr lang="en-US" b="0" i="0" dirty="0">
-              <a:solidFill>
-                <a:srgbClr val="3C3C3B"/>
-              </a:solidFill>
-              <a:effectLst/>
-              <a:latin typeface="+mn-lt"/>
-            </a:endParaRPr>
-          </a:p>
-          <a:p>
-            <a:endParaRPr lang="en-US" b="0" i="0" u="none" dirty="0">
-              <a:solidFill>
-                <a:srgbClr val="3C3C3B"/>
-              </a:solidFill>
-              <a:effectLst/>
-              <a:latin typeface="+mn-lt"/>
-            </a:endParaRPr>
-          </a:p>
-          <a:p>
-            <a:endParaRPr lang="en-US" b="0" i="0" u="none" dirty="0">
-              <a:solidFill>
-                <a:srgbClr val="3C3C3B"/>
-              </a:solidFill>
-              <a:effectLst/>
-              <a:latin typeface="+mn-lt"/>
-            </a:endParaRPr>
-          </a:p>
-          <a:p>
-            <a:endParaRPr lang="en-US" b="0" i="0" u="none" dirty="0">
-              <a:solidFill>
-                <a:srgbClr val="3C3C3B"/>
-              </a:solidFill>
-              <a:effectLst/>
-              <a:latin typeface="+mn-lt"/>
-            </a:endParaRPr>
+                <a:ea typeface="+mn-ea"/>
+                <a:cs typeface="+mn-cs"/>
+              </a:rPr>
+              <a:t>) is a set of neurons that each receive an input from every neuron in the previous layer. For example, if there are three neurons in a dense layer, and four neurons in the preceding layer (as pictured here), then each neuron in the dense layer has four inputs, one from each neuron in the preceding layer, for a total of 3 × 4 = 12 connections.</a:t>
+            </a:r>
           </a:p>
         </p:txBody>
       </p:sp>
@@ -1221,7 +707,7 @@
     </p:spTree>
     <p:extLst>
       <p:ext uri="{BB962C8B-B14F-4D97-AF65-F5344CB8AC3E}">
-        <p14:creationId xmlns:p14="http://schemas.microsoft.com/office/powerpoint/2010/main" val="419363754"/>
+        <p14:creationId xmlns:p14="http://schemas.microsoft.com/office/powerpoint/2010/main" val="4136970845"/>
       </p:ext>
     </p:extLst>
   </p:cSld>
@@ -1283,178 +769,7 @@
                 <a:effectLst/>
                 <a:latin typeface="+mn-lt"/>
               </a:rPr>
-              <a:t>And finally, let’s simulate the forward propagation process.  Pictured here is a complete, albeit small, neural network.  As such, it consists of an </a:t>
-            </a:r>
-            <a:r>
-              <a:rPr lang="en-US" b="1" i="0" u="none" dirty="0">
-                <a:solidFill>
-                  <a:srgbClr val="3C3C3B"/>
-                </a:solidFill>
-                <a:effectLst/>
-                <a:latin typeface="+mn-lt"/>
-              </a:rPr>
-              <a:t>input layer</a:t>
-            </a:r>
-            <a:r>
-              <a:rPr lang="en-US" b="0" i="0" u="none" dirty="0">
-                <a:solidFill>
-                  <a:srgbClr val="3C3C3B"/>
-                </a:solidFill>
-                <a:effectLst/>
-                <a:latin typeface="+mn-lt"/>
-              </a:rPr>
-              <a:t>, a single </a:t>
-            </a:r>
-            <a:r>
-              <a:rPr lang="en-US" b="1" i="0" u="none" dirty="0">
-                <a:solidFill>
-                  <a:srgbClr val="3C3C3B"/>
-                </a:solidFill>
-                <a:effectLst/>
-                <a:latin typeface="+mn-lt"/>
-              </a:rPr>
-              <a:t>hidden layer</a:t>
-            </a:r>
-            <a:r>
-              <a:rPr lang="en-US" b="0" i="0" u="none" dirty="0">
-                <a:solidFill>
-                  <a:srgbClr val="3C3C3B"/>
-                </a:solidFill>
-                <a:effectLst/>
-                <a:latin typeface="+mn-lt"/>
-              </a:rPr>
-              <a:t>, and an </a:t>
-            </a:r>
-            <a:r>
-              <a:rPr lang="en-US" b="1" i="0" u="none" dirty="0">
-                <a:solidFill>
-                  <a:srgbClr val="3C3C3B"/>
-                </a:solidFill>
-                <a:effectLst/>
-                <a:latin typeface="+mn-lt"/>
-              </a:rPr>
-              <a:t>output layer</a:t>
-            </a:r>
-            <a:r>
-              <a:rPr lang="en-US" b="0" i="0" u="none" dirty="0">
-                <a:solidFill>
-                  <a:srgbClr val="3C3C3B"/>
-                </a:solidFill>
-                <a:effectLst/>
-                <a:latin typeface="+mn-lt"/>
-              </a:rPr>
-              <a:t>.  </a:t>
-            </a:r>
-            <a:endParaRPr lang="en-US" b="0" i="0" dirty="0">
-              <a:solidFill>
-                <a:srgbClr val="3C3C3B"/>
-              </a:solidFill>
-              <a:effectLst/>
-              <a:latin typeface="+mn-lt"/>
-            </a:endParaRPr>
-          </a:p>
-          <a:p>
-            <a:endParaRPr lang="en-US" b="0" i="0" dirty="0">
-              <a:solidFill>
-                <a:srgbClr val="3C3C3B"/>
-              </a:solidFill>
-              <a:effectLst/>
-              <a:latin typeface="+mn-lt"/>
-            </a:endParaRPr>
-          </a:p>
-          <a:p>
-            <a:pPr marL="228600" indent="-228600">
-              <a:buAutoNum type="arabicPeriod"/>
-            </a:pPr>
-            <a:r>
-              <a:rPr lang="en-US" b="0" i="0" dirty="0">
-                <a:solidFill>
-                  <a:srgbClr val="3C3C3B"/>
-                </a:solidFill>
-                <a:effectLst/>
-                <a:latin typeface="+mn-lt"/>
-              </a:rPr>
-              <a:t>Each example of input data is fed through the input layer.  And depending on the size of the input example, the number of input nodes varies. The input data can be structured data (such as a CSV file) or unstructured data, such as an image.  In this example, a greyscale image of a chicken 8 pixels by 8 pixels has been converted into a vector of 64 numbers, each one representing the intensity of the color at that point.  These </a:t>
-            </a:r>
-            <a:r>
-              <a:rPr lang="en-US" b="1" i="0" u="none" dirty="0">
-                <a:solidFill>
-                  <a:srgbClr val="3C3C3B"/>
-                </a:solidFill>
-                <a:effectLst/>
-                <a:latin typeface="+mn-lt"/>
-              </a:rPr>
-              <a:t>features</a:t>
-            </a:r>
-            <a:r>
-              <a:rPr lang="en-US" b="0" i="0" u="none" dirty="0">
-                <a:solidFill>
-                  <a:srgbClr val="3C3C3B"/>
-                </a:solidFill>
-                <a:effectLst/>
-                <a:latin typeface="+mn-lt"/>
-              </a:rPr>
-              <a:t> are then fed to the input layer, one feature per node.  In this case, X sub 2 is the second value in the vector.</a:t>
-            </a:r>
-          </a:p>
-          <a:p>
-            <a:pPr marL="228600" indent="-228600">
-              <a:buAutoNum type="arabicPeriod"/>
-            </a:pPr>
-            <a:r>
-              <a:rPr lang="en-US" b="0" i="0" u="none" dirty="0">
-                <a:solidFill>
-                  <a:srgbClr val="3C3C3B"/>
-                </a:solidFill>
-                <a:effectLst/>
-                <a:latin typeface="+mn-lt"/>
-              </a:rPr>
-              <a:t>The value in X sub 2 is then multiplied by weight xf2.</a:t>
-            </a:r>
-          </a:p>
-          <a:p>
-            <a:pPr marL="228600" indent="-228600">
-              <a:buAutoNum type="arabicPeriod"/>
-            </a:pPr>
-            <a:r>
-              <a:rPr lang="en-US" b="0" i="0" u="none" dirty="0">
-                <a:solidFill>
-                  <a:srgbClr val="3C3C3B"/>
-                </a:solidFill>
-                <a:effectLst/>
-                <a:latin typeface="+mn-lt"/>
-              </a:rPr>
-              <a:t>At node F, the net input function sums up all incoming values and passes that value to its activation function which then calculates the output value.</a:t>
-            </a:r>
-          </a:p>
-          <a:p>
-            <a:pPr marL="228600" indent="-228600">
-              <a:buAutoNum type="arabicPeriod"/>
-            </a:pPr>
-            <a:r>
-              <a:rPr lang="en-US" b="0" i="0" u="none" dirty="0">
-                <a:solidFill>
-                  <a:srgbClr val="3C3C3B"/>
-                </a:solidFill>
-                <a:effectLst/>
-                <a:latin typeface="+mn-lt"/>
-              </a:rPr>
-              <a:t>The output value from node F is then multiplied by weight wfg1.</a:t>
-            </a:r>
-          </a:p>
-          <a:p>
-            <a:pPr marL="228600" indent="-228600">
-              <a:buAutoNum type="arabicPeriod"/>
-            </a:pPr>
-            <a:r>
-              <a:rPr lang="en-US" b="0" i="0" u="none" dirty="0">
-                <a:solidFill>
-                  <a:srgbClr val="3C3C3B"/>
-                </a:solidFill>
-                <a:effectLst/>
-                <a:latin typeface="+mn-lt"/>
-              </a:rPr>
-              <a:t>At node G, the net input function sums up all incoming values and passes that value to its activation function.  Because node G is the only node in the output layer, its output is the probability P() that the input image is a chicken.  That value is then passed to the loss function which compares it to the label and calculates a loss score (E).  The optimizer then takes that loss score and uses that to adjust the weights in the backpropagation phase – this is where the network “learns.” </a:t>
+              <a:t>Alright – let’s put everything we’ve discussed so far into a single image / example.  </a:t>
             </a:r>
           </a:p>
           <a:p>
@@ -1467,7 +782,7 @@
             </a:endParaRPr>
           </a:p>
           <a:p>
-            <a:pPr marL="0" marR="0" lvl="0" indent="0" algn="l" defTabSz="914400" rtl="0" eaLnBrk="1" fontAlgn="auto" latinLnBrk="0" hangingPunct="1">
+            <a:pPr marL="228600" marR="0" lvl="0" indent="-228600" algn="l" defTabSz="914400" rtl="0" eaLnBrk="1" fontAlgn="auto" latinLnBrk="0" hangingPunct="1">
               <a:lnSpc>
                 <a:spcPct val="100000"/>
               </a:lnSpc>
@@ -1480,22 +795,453 @@
               <a:buClrTx/>
               <a:buSzTx/>
               <a:buFontTx/>
-              <a:buNone/>
+              <a:buAutoNum type="arabicPeriod"/>
               <a:tabLst/>
               <a:defRPr/>
             </a:pPr>
             <a:r>
-              <a:rPr lang="en-US" b="0" i="0" dirty="0">
+              <a:rPr lang="en-US" b="0" i="0" u="none" dirty="0">
                 <a:solidFill>
                   <a:srgbClr val="3C3C3B"/>
                 </a:solidFill>
                 <a:effectLst/>
                 <a:latin typeface="+mn-lt"/>
               </a:rPr>
-              <a:t>Before we end this mini-lecture, we still have a mystery to clear up.  Why does our network contain bias nodes?  What’s their purpose?  Let’s answer that question…</a:t>
-            </a:r>
-          </a:p>
-          <a:p>
+              <a:t>Pictured here is a complete, albeit small, neural network.  As such, it consists of an </a:t>
+            </a:r>
+            <a:r>
+              <a:rPr lang="en-US" b="1" i="0" u="none" dirty="0">
+                <a:solidFill>
+                  <a:srgbClr val="3C3C3B"/>
+                </a:solidFill>
+                <a:effectLst/>
+                <a:latin typeface="+mn-lt"/>
+              </a:rPr>
+              <a:t>input layer</a:t>
+            </a:r>
+            <a:r>
+              <a:rPr lang="en-US" b="0" i="0" u="none" dirty="0">
+                <a:solidFill>
+                  <a:srgbClr val="3C3C3B"/>
+                </a:solidFill>
+                <a:effectLst/>
+                <a:latin typeface="+mn-lt"/>
+              </a:rPr>
+              <a:t>, a single </a:t>
+            </a:r>
+            <a:r>
+              <a:rPr lang="en-US" b="1" i="0" u="none" dirty="0">
+                <a:solidFill>
+                  <a:srgbClr val="3C3C3B"/>
+                </a:solidFill>
+                <a:effectLst/>
+                <a:latin typeface="+mn-lt"/>
+              </a:rPr>
+              <a:t>hidden layer</a:t>
+            </a:r>
+            <a:r>
+              <a:rPr lang="en-US" b="0" i="0" u="none" dirty="0">
+                <a:solidFill>
+                  <a:srgbClr val="3C3C3B"/>
+                </a:solidFill>
+                <a:effectLst/>
+                <a:latin typeface="+mn-lt"/>
+              </a:rPr>
+              <a:t>, and an </a:t>
+            </a:r>
+            <a:r>
+              <a:rPr lang="en-US" b="1" i="0" u="none" dirty="0">
+                <a:solidFill>
+                  <a:srgbClr val="3C3C3B"/>
+                </a:solidFill>
+                <a:effectLst/>
+                <a:latin typeface="+mn-lt"/>
+              </a:rPr>
+              <a:t>output layer</a:t>
+            </a:r>
+            <a:r>
+              <a:rPr lang="en-US" b="0" i="0" u="none" dirty="0">
+                <a:solidFill>
+                  <a:srgbClr val="3C3C3B"/>
+                </a:solidFill>
+                <a:effectLst/>
+                <a:latin typeface="+mn-lt"/>
+              </a:rPr>
+              <a:t>.  </a:t>
+            </a:r>
+          </a:p>
+          <a:p>
+            <a:pPr marL="228600" marR="0" lvl="0" indent="-228600" algn="l" defTabSz="914400" rtl="0" eaLnBrk="1" fontAlgn="auto" latinLnBrk="0" hangingPunct="1">
+              <a:lnSpc>
+                <a:spcPct val="100000"/>
+              </a:lnSpc>
+              <a:spcBef>
+                <a:spcPts val="0"/>
+              </a:spcBef>
+              <a:spcAft>
+                <a:spcPts val="0"/>
+              </a:spcAft>
+              <a:buClrTx/>
+              <a:buSzTx/>
+              <a:buFontTx/>
+              <a:buAutoNum type="arabicPeriod"/>
+              <a:tabLst/>
+              <a:defRPr/>
+            </a:pPr>
+            <a:r>
+              <a:rPr lang="en-US" b="0" i="0" dirty="0">
+                <a:solidFill>
+                  <a:srgbClr val="3C3C3B"/>
+                </a:solidFill>
+                <a:effectLst/>
+                <a:latin typeface="+mn-lt"/>
+              </a:rPr>
+              <a:t>Input </a:t>
+            </a:r>
+            <a:r>
+              <a:rPr lang="en-US" b="1" i="0" u="none" dirty="0">
+                <a:solidFill>
+                  <a:srgbClr val="3C3C3B"/>
+                </a:solidFill>
+                <a:effectLst/>
+                <a:latin typeface="+mn-lt"/>
+              </a:rPr>
+              <a:t>features</a:t>
+            </a:r>
+            <a:r>
+              <a:rPr lang="en-US" b="0" i="0" u="none" dirty="0">
+                <a:solidFill>
+                  <a:srgbClr val="3C3C3B"/>
+                </a:solidFill>
+                <a:effectLst/>
+                <a:latin typeface="+mn-lt"/>
+              </a:rPr>
+              <a:t> are fed to the input layer, one feature per node.  </a:t>
+            </a:r>
+            <a:r>
+              <a:rPr lang="en-US" b="0" i="0" dirty="0">
+                <a:solidFill>
+                  <a:srgbClr val="3C3C3B"/>
+                </a:solidFill>
+                <a:effectLst/>
+                <a:latin typeface="+mn-lt"/>
+              </a:rPr>
+              <a:t>And depending on the size of the input example, the number of input nodes varies. The input data can be structured data (such as a CSV file) or unstructured data, such as an image.  Feature engineering, as it’s called, is an important component of any deep learning project.  </a:t>
+            </a:r>
+          </a:p>
+          <a:p>
+            <a:pPr marL="228600" marR="0" lvl="0" indent="-228600" algn="l" defTabSz="914400" rtl="0" eaLnBrk="1" fontAlgn="auto" latinLnBrk="0" hangingPunct="1">
+              <a:lnSpc>
+                <a:spcPct val="100000"/>
+              </a:lnSpc>
+              <a:spcBef>
+                <a:spcPts val="0"/>
+              </a:spcBef>
+              <a:spcAft>
+                <a:spcPts val="0"/>
+              </a:spcAft>
+              <a:buClrTx/>
+              <a:buSzTx/>
+              <a:buFontTx/>
+              <a:buAutoNum type="arabicPeriod"/>
+              <a:tabLst/>
+              <a:defRPr/>
+            </a:pPr>
+            <a:r>
+              <a:rPr lang="en-US" b="0" i="0" dirty="0">
+                <a:solidFill>
+                  <a:srgbClr val="3C3C3B"/>
+                </a:solidFill>
+                <a:effectLst/>
+                <a:latin typeface="+mn-lt"/>
+              </a:rPr>
+              <a:t>During </a:t>
+            </a:r>
+            <a:r>
+              <a:rPr lang="en-US" b="1" i="0" dirty="0">
+                <a:solidFill>
+                  <a:srgbClr val="3C3C3B"/>
+                </a:solidFill>
+                <a:effectLst/>
+                <a:latin typeface="+mn-lt"/>
+              </a:rPr>
+              <a:t>forward propagation</a:t>
+            </a:r>
+            <a:r>
+              <a:rPr lang="en-US" b="0" i="0" dirty="0">
+                <a:solidFill>
+                  <a:srgbClr val="3C3C3B"/>
+                </a:solidFill>
+                <a:effectLst/>
+                <a:latin typeface="+mn-lt"/>
+              </a:rPr>
+              <a:t>, the flow of numbers is from left to right.  That flow is reversed in </a:t>
+            </a:r>
+            <a:r>
+              <a:rPr lang="en-US" b="1" i="0" dirty="0">
+                <a:solidFill>
+                  <a:srgbClr val="3C3C3B"/>
+                </a:solidFill>
+                <a:effectLst/>
+                <a:latin typeface="+mn-lt"/>
+              </a:rPr>
+              <a:t>back propagation</a:t>
+            </a:r>
+            <a:r>
+              <a:rPr lang="en-US" b="0" i="0" dirty="0">
+                <a:solidFill>
+                  <a:srgbClr val="3C3C3B"/>
+                </a:solidFill>
+                <a:effectLst/>
+                <a:latin typeface="+mn-lt"/>
+              </a:rPr>
+              <a:t>, to be discussed in our next presentation.</a:t>
+            </a:r>
+          </a:p>
+          <a:p>
+            <a:pPr marL="228600" marR="0" lvl="0" indent="-228600" algn="l" defTabSz="914400" rtl="0" eaLnBrk="1" fontAlgn="auto" latinLnBrk="0" hangingPunct="1">
+              <a:lnSpc>
+                <a:spcPct val="100000"/>
+              </a:lnSpc>
+              <a:spcBef>
+                <a:spcPts val="0"/>
+              </a:spcBef>
+              <a:spcAft>
+                <a:spcPts val="0"/>
+              </a:spcAft>
+              <a:buClrTx/>
+              <a:buSzTx/>
+              <a:buFontTx/>
+              <a:buAutoNum type="arabicPeriod"/>
+              <a:tabLst/>
+              <a:defRPr/>
+            </a:pPr>
+            <a:r>
+              <a:rPr lang="en-US" b="0" i="0" dirty="0">
+                <a:solidFill>
+                  <a:srgbClr val="3C3C3B"/>
+                </a:solidFill>
+                <a:effectLst/>
+                <a:latin typeface="+mn-lt"/>
+              </a:rPr>
+              <a:t>We now label each of our weights.  During forward propagation, the output from each node is multiplied by its corresponding weight before becoming input to the downstream node.  So, for example, the output from (G) is multiplied by weight Wgf1 before becoming input to node (F).  </a:t>
+            </a:r>
+          </a:p>
+          <a:p>
+            <a:pPr marL="228600" marR="0" lvl="0" indent="-228600" algn="l" defTabSz="914400" rtl="0" eaLnBrk="1" fontAlgn="auto" latinLnBrk="0" hangingPunct="1">
+              <a:lnSpc>
+                <a:spcPct val="100000"/>
+              </a:lnSpc>
+              <a:spcBef>
+                <a:spcPts val="0"/>
+              </a:spcBef>
+              <a:spcAft>
+                <a:spcPts val="0"/>
+              </a:spcAft>
+              <a:buClrTx/>
+              <a:buSzTx/>
+              <a:buFontTx/>
+              <a:buAutoNum type="arabicPeriod"/>
+              <a:tabLst/>
+              <a:defRPr/>
+            </a:pPr>
+            <a:r>
+              <a:rPr lang="en-US" b="0" i="0" dirty="0">
+                <a:solidFill>
+                  <a:srgbClr val="3C3C3B"/>
+                </a:solidFill>
+                <a:effectLst/>
+                <a:latin typeface="+mn-lt"/>
+              </a:rPr>
+              <a:t>A </a:t>
+            </a:r>
+            <a:r>
+              <a:rPr lang="en-US" b="1" i="0" dirty="0">
+                <a:solidFill>
+                  <a:srgbClr val="3C3C3B"/>
+                </a:solidFill>
+                <a:effectLst/>
+                <a:latin typeface="+mn-lt"/>
+              </a:rPr>
+              <a:t>bias node </a:t>
+            </a:r>
+            <a:r>
+              <a:rPr lang="en-US" b="0" i="0" dirty="0">
+                <a:solidFill>
+                  <a:srgbClr val="3C3C3B"/>
+                </a:solidFill>
+                <a:effectLst/>
+                <a:latin typeface="+mn-lt"/>
+              </a:rPr>
+              <a:t>is typically associated with each layer – the function of bias nodes will be discussed in just a few minutes.</a:t>
+            </a:r>
+          </a:p>
+          <a:p>
+            <a:pPr marL="228600" marR="0" lvl="0" indent="-228600" algn="l" defTabSz="914400" rtl="0" eaLnBrk="1" fontAlgn="auto" latinLnBrk="0" hangingPunct="1">
+              <a:lnSpc>
+                <a:spcPct val="100000"/>
+              </a:lnSpc>
+              <a:spcBef>
+                <a:spcPts val="0"/>
+              </a:spcBef>
+              <a:spcAft>
+                <a:spcPts val="0"/>
+              </a:spcAft>
+              <a:buClrTx/>
+              <a:buSzTx/>
+              <a:buFontTx/>
+              <a:buAutoNum type="arabicPeriod"/>
+              <a:tabLst/>
+              <a:defRPr/>
+            </a:pPr>
+            <a:r>
+              <a:rPr lang="en-US" b="0" i="0" dirty="0">
+                <a:solidFill>
+                  <a:srgbClr val="3C3C3B"/>
+                </a:solidFill>
+                <a:effectLst/>
+                <a:latin typeface="+mn-lt"/>
+              </a:rPr>
+              <a:t>In this example, the network’s output is passed from node (F) to an error function which calculates the network’s </a:t>
+            </a:r>
+            <a:r>
+              <a:rPr lang="en-US" b="1" i="0" dirty="0">
+                <a:solidFill>
+                  <a:srgbClr val="3C3C3B"/>
+                </a:solidFill>
+                <a:effectLst/>
+                <a:latin typeface="+mn-lt"/>
+              </a:rPr>
+              <a:t>total error</a:t>
+            </a:r>
+            <a:r>
+              <a:rPr lang="en-US" b="0" i="0" dirty="0">
+                <a:solidFill>
+                  <a:srgbClr val="3C3C3B"/>
+                </a:solidFill>
+                <a:effectLst/>
+                <a:latin typeface="+mn-lt"/>
+              </a:rPr>
+              <a:t>, the difference between </a:t>
+            </a:r>
+            <a:r>
+              <a:rPr lang="en-US" b="1" i="0" dirty="0">
+                <a:solidFill>
+                  <a:srgbClr val="3C3C3B"/>
+                </a:solidFill>
+                <a:effectLst/>
+                <a:latin typeface="+mn-lt"/>
+              </a:rPr>
+              <a:t>ground truth </a:t>
+            </a:r>
+            <a:r>
+              <a:rPr lang="en-US" b="0" i="0" dirty="0">
+                <a:solidFill>
+                  <a:srgbClr val="3C3C3B"/>
+                </a:solidFill>
+                <a:effectLst/>
+                <a:latin typeface="+mn-lt"/>
+              </a:rPr>
+              <a:t>(labelled y) and the output.  A more complete explanation of the error function will be discussed in our next workshop when we explain the </a:t>
+            </a:r>
+            <a:r>
+              <a:rPr lang="en-US" b="1" i="0" dirty="0">
+                <a:solidFill>
+                  <a:srgbClr val="3C3C3B"/>
+                </a:solidFill>
+                <a:effectLst/>
+                <a:latin typeface="+mn-lt"/>
+              </a:rPr>
+              <a:t>back propagation / gradient descent </a:t>
+            </a:r>
+            <a:r>
+              <a:rPr lang="en-US" b="0" i="0" dirty="0">
+                <a:solidFill>
+                  <a:srgbClr val="3C3C3B"/>
+                </a:solidFill>
+                <a:effectLst/>
+                <a:latin typeface="+mn-lt"/>
+              </a:rPr>
+              <a:t>process.</a:t>
+            </a:r>
+            <a:endParaRPr lang="en-US" b="1" i="0" dirty="0">
+              <a:solidFill>
+                <a:srgbClr val="3C3C3B"/>
+              </a:solidFill>
+              <a:effectLst/>
+              <a:latin typeface="+mn-lt"/>
+            </a:endParaRPr>
+          </a:p>
+          <a:p>
+            <a:pPr marL="228600" marR="0" lvl="0" indent="-228600" algn="l" defTabSz="914400" rtl="0" eaLnBrk="1" fontAlgn="auto" latinLnBrk="0" hangingPunct="1">
+              <a:lnSpc>
+                <a:spcPct val="100000"/>
+              </a:lnSpc>
+              <a:spcBef>
+                <a:spcPts val="0"/>
+              </a:spcBef>
+              <a:spcAft>
+                <a:spcPts val="0"/>
+              </a:spcAft>
+              <a:buClrTx/>
+              <a:buSzTx/>
+              <a:buFontTx/>
+              <a:buAutoNum type="arabicPeriod"/>
+              <a:tabLst/>
+              <a:defRPr/>
+            </a:pPr>
+            <a:endParaRPr lang="en-US" b="1" i="0" dirty="0">
+              <a:solidFill>
+                <a:srgbClr val="3C3C3B"/>
+              </a:solidFill>
+              <a:effectLst/>
+              <a:latin typeface="+mn-lt"/>
+            </a:endParaRPr>
+          </a:p>
+          <a:p>
+            <a:pPr marL="228600" marR="0" lvl="0" indent="-228600" algn="l" defTabSz="914400" rtl="0" eaLnBrk="1" fontAlgn="auto" latinLnBrk="0" hangingPunct="1">
+              <a:lnSpc>
+                <a:spcPct val="100000"/>
+              </a:lnSpc>
+              <a:spcBef>
+                <a:spcPts val="0"/>
+              </a:spcBef>
+              <a:spcAft>
+                <a:spcPts val="0"/>
+              </a:spcAft>
+              <a:buClrTx/>
+              <a:buSzTx/>
+              <a:buFontTx/>
+              <a:buAutoNum type="arabicPeriod"/>
+              <a:tabLst/>
+              <a:defRPr/>
+            </a:pPr>
+            <a:endParaRPr lang="en-US" b="0" i="0" dirty="0">
+              <a:solidFill>
+                <a:srgbClr val="3C3C3B"/>
+              </a:solidFill>
+              <a:effectLst/>
+              <a:latin typeface="+mn-lt"/>
+            </a:endParaRPr>
+          </a:p>
+          <a:p>
+            <a:pPr marL="228600" marR="0" lvl="0" indent="-228600" algn="l" defTabSz="914400" rtl="0" eaLnBrk="1" fontAlgn="auto" latinLnBrk="0" hangingPunct="1">
+              <a:lnSpc>
+                <a:spcPct val="100000"/>
+              </a:lnSpc>
+              <a:spcBef>
+                <a:spcPts val="0"/>
+              </a:spcBef>
+              <a:spcAft>
+                <a:spcPts val="0"/>
+              </a:spcAft>
+              <a:buClrTx/>
+              <a:buSzTx/>
+              <a:buFontTx/>
+              <a:buAutoNum type="arabicPeriod"/>
+              <a:tabLst/>
+              <a:defRPr/>
+            </a:pPr>
             <a:endParaRPr lang="en-US" b="0" i="0" u="none" dirty="0">
               <a:solidFill>
                 <a:srgbClr val="3C3C3B"/>
@@ -1505,18 +1251,23 @@
             </a:endParaRPr>
           </a:p>
           <a:p>
-            <a:r>
-              <a:rPr lang="en-US" b="0" i="0" u="none" dirty="0">
-                <a:solidFill>
-                  <a:srgbClr val="3C3C3B"/>
-                </a:solidFill>
-                <a:effectLst/>
-                <a:latin typeface="+mn-lt"/>
-              </a:rPr>
-              <a:t>====</a:t>
-            </a:r>
-          </a:p>
-          <a:p>
+            <a:pPr marL="228600" marR="0" lvl="0" indent="-228600" algn="l" defTabSz="914400" rtl="0" eaLnBrk="1" fontAlgn="auto" latinLnBrk="0" hangingPunct="1">
+              <a:lnSpc>
+                <a:spcPct val="100000"/>
+              </a:lnSpc>
+              <a:spcBef>
+                <a:spcPts val="0"/>
+              </a:spcBef>
+              <a:spcAft>
+                <a:spcPts val="0"/>
+              </a:spcAft>
+              <a:buClrTx/>
+              <a:buSzTx/>
+              <a:buFontTx/>
+              <a:buAutoNum type="arabicPeriod"/>
+              <a:tabLst/>
+              <a:defRPr/>
+            </a:pPr>
             <a:endParaRPr lang="en-US" b="0" i="0" u="none" dirty="0">
               <a:solidFill>
                 <a:srgbClr val="3C3C3B"/>
@@ -1526,38 +1277,23 @@
             </a:endParaRPr>
           </a:p>
           <a:p>
-            <a:r>
-              <a:rPr lang="en-US" b="0" i="0" dirty="0">
-                <a:solidFill>
-                  <a:srgbClr val="3C3C3B"/>
-                </a:solidFill>
-                <a:effectLst/>
-                <a:latin typeface="+mn-lt"/>
-              </a:rPr>
-              <a:t>We note that the input layer is fully connected to the hidden layer, consisting of two nodes.  And as you can see, each weight on the connecting lines is labelled.  During forward propagation, the output from each node is multiplied by the weights before becoming input to the downstream node.  The numbers flow from left to right.  However, the flow is reversed during </a:t>
-            </a:r>
-            <a:r>
-              <a:rPr lang="en-US" b="1" i="0" dirty="0">
-                <a:solidFill>
-                  <a:srgbClr val="3C3C3B"/>
-                </a:solidFill>
-                <a:effectLst/>
-                <a:latin typeface="+mn-lt"/>
-              </a:rPr>
-              <a:t>backpropagation,</a:t>
-            </a:r>
-            <a:r>
-              <a:rPr lang="en-US" b="0" i="0" dirty="0">
-                <a:solidFill>
-                  <a:srgbClr val="3C3C3B"/>
-                </a:solidFill>
-                <a:effectLst/>
-                <a:latin typeface="+mn-lt"/>
-              </a:rPr>
-              <a:t> and this is where the neural network ‘learns.’   The backpropagation process is fully described in our next presentation, including the loss function, total error, and optimizer.</a:t>
-            </a:r>
-          </a:p>
-          <a:p>
+            <a:pPr marL="228600" marR="0" lvl="0" indent="-228600" algn="l" defTabSz="914400" rtl="0" eaLnBrk="1" fontAlgn="auto" latinLnBrk="0" hangingPunct="1">
+              <a:lnSpc>
+                <a:spcPct val="100000"/>
+              </a:lnSpc>
+              <a:spcBef>
+                <a:spcPts val="0"/>
+              </a:spcBef>
+              <a:spcAft>
+                <a:spcPts val="0"/>
+              </a:spcAft>
+              <a:buClrTx/>
+              <a:buSzTx/>
+              <a:buFontTx/>
+              <a:buAutoNum type="arabicPeriod"/>
+              <a:tabLst/>
+              <a:defRPr/>
+            </a:pPr>
             <a:endParaRPr lang="en-US" b="0" i="0" dirty="0">
               <a:solidFill>
                 <a:srgbClr val="3C3C3B"/>
@@ -1567,39 +1303,30 @@
             </a:endParaRPr>
           </a:p>
           <a:p>
-            <a:endParaRPr lang="en-US" b="0" i="0" dirty="0">
+            <a:endParaRPr lang="en-US" b="0" i="0" u="none" dirty="0">
               <a:solidFill>
                 <a:srgbClr val="3C3C3B"/>
               </a:solidFill>
               <a:effectLst/>
-              <a:latin typeface="Lato"/>
+              <a:latin typeface="+mn-lt"/>
             </a:endParaRPr>
           </a:p>
           <a:p>
-            <a:endParaRPr lang="en-US" b="0" i="0" dirty="0">
+            <a:endParaRPr lang="en-US" b="0" i="0" u="none" dirty="0">
               <a:solidFill>
                 <a:srgbClr val="3C3C3B"/>
               </a:solidFill>
               <a:effectLst/>
-              <a:latin typeface="Lato"/>
+              <a:latin typeface="+mn-lt"/>
             </a:endParaRPr>
           </a:p>
           <a:p>
-            <a:endParaRPr lang="en-US" b="0" i="0" dirty="0">
+            <a:endParaRPr lang="en-US" b="0" i="0" u="none" dirty="0">
               <a:solidFill>
                 <a:srgbClr val="3C3C3B"/>
               </a:solidFill>
               <a:effectLst/>
-              <a:latin typeface="Lato"/>
-            </a:endParaRPr>
-          </a:p>
-          <a:p>
-            <a:endParaRPr lang="en-US" b="0" i="0" dirty="0">
-              <a:solidFill>
-                <a:srgbClr val="3C3C3B"/>
-              </a:solidFill>
-              <a:effectLst/>
-              <a:latin typeface="Lato"/>
+              <a:latin typeface="+mn-lt"/>
             </a:endParaRPr>
           </a:p>
         </p:txBody>
@@ -1630,7 +1357,7 @@
     </p:spTree>
     <p:extLst>
       <p:ext uri="{BB962C8B-B14F-4D97-AF65-F5344CB8AC3E}">
-        <p14:creationId xmlns:p14="http://schemas.microsoft.com/office/powerpoint/2010/main" val="3299567317"/>
+        <p14:creationId xmlns:p14="http://schemas.microsoft.com/office/powerpoint/2010/main" val="419363754"/>
       </p:ext>
     </p:extLst>
   </p:cSld>
@@ -1685,17 +1412,331 @@
           <a:lstStyle/>
           <a:p>
             <a:r>
-              <a:rPr lang="en-US" sz="1200" b="0" i="0" kern="1200" dirty="0">
-                <a:solidFill>
-                  <a:schemeClr val="tx1"/>
+              <a:rPr lang="en-US" b="0" i="0" u="none" dirty="0">
+                <a:solidFill>
+                  <a:srgbClr val="3C3C3B"/>
                 </a:solidFill>
                 <a:effectLst/>
                 <a:latin typeface="+mn-lt"/>
-                <a:ea typeface="+mn-ea"/>
-                <a:cs typeface="+mn-cs"/>
-              </a:rPr>
-              <a:t>Let’s now justify and explain the existence of the bias nodes.  Technically, bias provides every node in a neural network with a trainable constant value (1 or -1).  But why do we need them?  Well – on a practical level – input from the bias node enables an activation function to be shifted to the left or right.  In this case, what looks like a sigmoid function can be shifted to the left (position A) or to the right (position C).  In addition to the adjustment of weights which occurs during backpropagation, this ‘shifting’ can be important and critical for successful learning.</a:t>
-            </a:r>
+              </a:rPr>
+              <a:t>And finally, let’s simulate the forward propagation process with another simple example.  Here we feed an image to a small neural network, and it outputs the probability that the image is a chicken.  Again, this network consists of an </a:t>
+            </a:r>
+            <a:r>
+              <a:rPr lang="en-US" b="1" i="0" u="none" dirty="0">
+                <a:solidFill>
+                  <a:srgbClr val="3C3C3B"/>
+                </a:solidFill>
+                <a:effectLst/>
+                <a:latin typeface="+mn-lt"/>
+              </a:rPr>
+              <a:t>input layer</a:t>
+            </a:r>
+            <a:r>
+              <a:rPr lang="en-US" b="0" i="0" u="none" dirty="0">
+                <a:solidFill>
+                  <a:srgbClr val="3C3C3B"/>
+                </a:solidFill>
+                <a:effectLst/>
+                <a:latin typeface="+mn-lt"/>
+              </a:rPr>
+              <a:t>, a single </a:t>
+            </a:r>
+            <a:r>
+              <a:rPr lang="en-US" b="1" i="0" u="none" dirty="0">
+                <a:solidFill>
+                  <a:srgbClr val="3C3C3B"/>
+                </a:solidFill>
+                <a:effectLst/>
+                <a:latin typeface="+mn-lt"/>
+              </a:rPr>
+              <a:t>hidden layer</a:t>
+            </a:r>
+            <a:r>
+              <a:rPr lang="en-US" b="0" i="0" u="none" dirty="0">
+                <a:solidFill>
+                  <a:srgbClr val="3C3C3B"/>
+                </a:solidFill>
+                <a:effectLst/>
+                <a:latin typeface="+mn-lt"/>
+              </a:rPr>
+              <a:t>, and an </a:t>
+            </a:r>
+            <a:r>
+              <a:rPr lang="en-US" b="1" i="0" u="none" dirty="0">
+                <a:solidFill>
+                  <a:srgbClr val="3C3C3B"/>
+                </a:solidFill>
+                <a:effectLst/>
+                <a:latin typeface="+mn-lt"/>
+              </a:rPr>
+              <a:t>output layer</a:t>
+            </a:r>
+            <a:r>
+              <a:rPr lang="en-US" b="0" i="0" u="none" dirty="0">
+                <a:solidFill>
+                  <a:srgbClr val="3C3C3B"/>
+                </a:solidFill>
+                <a:effectLst/>
+                <a:latin typeface="+mn-lt"/>
+              </a:rPr>
+              <a:t>.  </a:t>
+            </a:r>
+            <a:endParaRPr lang="en-US" b="0" i="0" dirty="0">
+              <a:solidFill>
+                <a:srgbClr val="3C3C3B"/>
+              </a:solidFill>
+              <a:effectLst/>
+              <a:latin typeface="+mn-lt"/>
+            </a:endParaRPr>
+          </a:p>
+          <a:p>
+            <a:endParaRPr lang="en-US" b="0" i="0" dirty="0">
+              <a:solidFill>
+                <a:srgbClr val="3C3C3B"/>
+              </a:solidFill>
+              <a:effectLst/>
+              <a:latin typeface="+mn-lt"/>
+            </a:endParaRPr>
+          </a:p>
+          <a:p>
+            <a:pPr marL="228600" indent="-228600">
+              <a:buAutoNum type="arabicPeriod"/>
+            </a:pPr>
+            <a:r>
+              <a:rPr lang="en-US" b="0" i="0" dirty="0">
+                <a:solidFill>
+                  <a:srgbClr val="3C3C3B"/>
+                </a:solidFill>
+                <a:effectLst/>
+                <a:latin typeface="+mn-lt"/>
+              </a:rPr>
+              <a:t>Each example of input data is fed to the input layer.  In this example, a greyscale image of a chicken 8 pixels by 8 pixels has been converted into a vector of 64 numbers, each one representing the intensity of the color at that point.  These </a:t>
+            </a:r>
+            <a:r>
+              <a:rPr lang="en-US" b="1" i="0" u="none" dirty="0">
+                <a:solidFill>
+                  <a:srgbClr val="3C3C3B"/>
+                </a:solidFill>
+                <a:effectLst/>
+                <a:latin typeface="+mn-lt"/>
+              </a:rPr>
+              <a:t>features</a:t>
+            </a:r>
+            <a:r>
+              <a:rPr lang="en-US" b="0" i="0" u="none" dirty="0">
+                <a:solidFill>
+                  <a:srgbClr val="3C3C3B"/>
+                </a:solidFill>
+                <a:effectLst/>
+                <a:latin typeface="+mn-lt"/>
+              </a:rPr>
+              <a:t> are then fed to the input layer, one feature per node.  In this case, X sub 2 is the second value in the vector.</a:t>
+            </a:r>
+          </a:p>
+          <a:p>
+            <a:pPr marL="228600" indent="-228600">
+              <a:buAutoNum type="arabicPeriod"/>
+            </a:pPr>
+            <a:r>
+              <a:rPr lang="en-US" b="0" i="0" u="none" dirty="0">
+                <a:solidFill>
+                  <a:srgbClr val="3C3C3B"/>
+                </a:solidFill>
+                <a:effectLst/>
+                <a:latin typeface="+mn-lt"/>
+              </a:rPr>
+              <a:t>The value in X sub 2 is then multiplied by weight xf2.</a:t>
+            </a:r>
+          </a:p>
+          <a:p>
+            <a:pPr marL="228600" indent="-228600">
+              <a:buAutoNum type="arabicPeriod"/>
+            </a:pPr>
+            <a:r>
+              <a:rPr lang="en-US" b="0" i="0" u="none" dirty="0">
+                <a:solidFill>
+                  <a:srgbClr val="3C3C3B"/>
+                </a:solidFill>
+                <a:effectLst/>
+                <a:latin typeface="+mn-lt"/>
+              </a:rPr>
+              <a:t>At node F, the net input function sums up all incoming values and passes that value to its activation function which then calculates the output value.</a:t>
+            </a:r>
+          </a:p>
+          <a:p>
+            <a:pPr marL="228600" indent="-228600">
+              <a:buAutoNum type="arabicPeriod"/>
+            </a:pPr>
+            <a:r>
+              <a:rPr lang="en-US" b="0" i="0" u="none" dirty="0">
+                <a:solidFill>
+                  <a:srgbClr val="3C3C3B"/>
+                </a:solidFill>
+                <a:effectLst/>
+                <a:latin typeface="+mn-lt"/>
+              </a:rPr>
+              <a:t>The output value from node F is then multiplied by weight wfg1.</a:t>
+            </a:r>
+          </a:p>
+          <a:p>
+            <a:pPr marL="228600" indent="-228600">
+              <a:buAutoNum type="arabicPeriod"/>
+            </a:pPr>
+            <a:r>
+              <a:rPr lang="en-US" b="0" i="0" u="none" dirty="0">
+                <a:solidFill>
+                  <a:srgbClr val="3C3C3B"/>
+                </a:solidFill>
+                <a:effectLst/>
+                <a:latin typeface="+mn-lt"/>
+              </a:rPr>
+              <a:t>At node G, the net input function sums up all incoming values and passes that value to its activation function.  Because node G is the only node in the output layer, its output is the probability P() that the input image is a chicken.  That value is then passed to the loss function which compares it to the label and calculates a loss score (E).  The optimizer then takes that loss score and uses that to adjust the weights in the backpropagation phase – this is where the network “learns.” </a:t>
+            </a:r>
+          </a:p>
+          <a:p>
+            <a:endParaRPr lang="en-US" b="0" i="0" u="none" dirty="0">
+              <a:solidFill>
+                <a:srgbClr val="3C3C3B"/>
+              </a:solidFill>
+              <a:effectLst/>
+              <a:latin typeface="+mn-lt"/>
+            </a:endParaRPr>
+          </a:p>
+          <a:p>
+            <a:pPr marL="0" marR="0" lvl="0" indent="0" algn="l" defTabSz="914400" rtl="0" eaLnBrk="1" fontAlgn="auto" latinLnBrk="0" hangingPunct="1">
+              <a:lnSpc>
+                <a:spcPct val="100000"/>
+              </a:lnSpc>
+              <a:spcBef>
+                <a:spcPts val="0"/>
+              </a:spcBef>
+              <a:spcAft>
+                <a:spcPts val="0"/>
+              </a:spcAft>
+              <a:buClrTx/>
+              <a:buSzTx/>
+              <a:buFontTx/>
+              <a:buNone/>
+              <a:tabLst/>
+              <a:defRPr/>
+            </a:pPr>
+            <a:r>
+              <a:rPr lang="en-US" b="0" i="0" dirty="0">
+                <a:solidFill>
+                  <a:srgbClr val="3C3C3B"/>
+                </a:solidFill>
+                <a:effectLst/>
+                <a:latin typeface="+mn-lt"/>
+              </a:rPr>
+              <a:t>Before we end this mini-lecture, we still have a mystery to clear up.  Why does our network contain bias nodes?  What’s their purpose?  Let’s answer that question…</a:t>
+            </a:r>
+          </a:p>
+          <a:p>
+            <a:endParaRPr lang="en-US" b="0" i="0" u="none" dirty="0">
+              <a:solidFill>
+                <a:srgbClr val="3C3C3B"/>
+              </a:solidFill>
+              <a:effectLst/>
+              <a:latin typeface="+mn-lt"/>
+            </a:endParaRPr>
+          </a:p>
+          <a:p>
+            <a:r>
+              <a:rPr lang="en-US" b="0" i="0" u="none" dirty="0">
+                <a:solidFill>
+                  <a:srgbClr val="3C3C3B"/>
+                </a:solidFill>
+                <a:effectLst/>
+                <a:latin typeface="+mn-lt"/>
+              </a:rPr>
+              <a:t>====</a:t>
+            </a:r>
+          </a:p>
+          <a:p>
+            <a:endParaRPr lang="en-US" b="0" i="0" u="none" dirty="0">
+              <a:solidFill>
+                <a:srgbClr val="3C3C3B"/>
+              </a:solidFill>
+              <a:effectLst/>
+              <a:latin typeface="+mn-lt"/>
+            </a:endParaRPr>
+          </a:p>
+          <a:p>
+            <a:r>
+              <a:rPr lang="en-US" b="0" i="0" dirty="0">
+                <a:solidFill>
+                  <a:srgbClr val="3C3C3B"/>
+                </a:solidFill>
+                <a:effectLst/>
+                <a:latin typeface="+mn-lt"/>
+              </a:rPr>
+              <a:t>We note that the input layer is fully connected to the hidden layer, consisting of two nodes.  And as you can see, each weight on the connecting lines is labelled.  During forward propagation, the output from each node is multiplied by the weights before becoming input to the downstream node.  The numbers flow from left to right.  However, the flow is reversed during </a:t>
+            </a:r>
+            <a:r>
+              <a:rPr lang="en-US" b="1" i="0" dirty="0">
+                <a:solidFill>
+                  <a:srgbClr val="3C3C3B"/>
+                </a:solidFill>
+                <a:effectLst/>
+                <a:latin typeface="+mn-lt"/>
+              </a:rPr>
+              <a:t>backpropagation,</a:t>
+            </a:r>
+            <a:r>
+              <a:rPr lang="en-US" b="0" i="0" dirty="0">
+                <a:solidFill>
+                  <a:srgbClr val="3C3C3B"/>
+                </a:solidFill>
+                <a:effectLst/>
+                <a:latin typeface="+mn-lt"/>
+              </a:rPr>
+              <a:t> and this is where the neural network ‘learns.’   The backpropagation process is fully described in our next presentation, including the loss function, total error, and optimizer.</a:t>
+            </a:r>
+          </a:p>
+          <a:p>
+            <a:endParaRPr lang="en-US" b="0" i="0" dirty="0">
+              <a:solidFill>
+                <a:srgbClr val="3C3C3B"/>
+              </a:solidFill>
+              <a:effectLst/>
+              <a:latin typeface="+mn-lt"/>
+            </a:endParaRPr>
+          </a:p>
+          <a:p>
+            <a:endParaRPr lang="en-US" b="0" i="0" dirty="0">
+              <a:solidFill>
+                <a:srgbClr val="3C3C3B"/>
+              </a:solidFill>
+              <a:effectLst/>
+              <a:latin typeface="Lato"/>
+            </a:endParaRPr>
+          </a:p>
+          <a:p>
+            <a:endParaRPr lang="en-US" b="0" i="0" dirty="0">
+              <a:solidFill>
+                <a:srgbClr val="3C3C3B"/>
+              </a:solidFill>
+              <a:effectLst/>
+              <a:latin typeface="Lato"/>
+            </a:endParaRPr>
+          </a:p>
+          <a:p>
+            <a:endParaRPr lang="en-US" b="0" i="0" dirty="0">
+              <a:solidFill>
+                <a:srgbClr val="3C3C3B"/>
+              </a:solidFill>
+              <a:effectLst/>
+              <a:latin typeface="Lato"/>
+            </a:endParaRPr>
+          </a:p>
+          <a:p>
+            <a:endParaRPr lang="en-US" b="0" i="0" dirty="0">
+              <a:solidFill>
+                <a:srgbClr val="3C3C3B"/>
+              </a:solidFill>
+              <a:effectLst/>
+              <a:latin typeface="Lato"/>
+            </a:endParaRPr>
           </a:p>
         </p:txBody>
       </p:sp>
@@ -1725,7 +1766,7 @@
     </p:spTree>
     <p:extLst>
       <p:ext uri="{BB962C8B-B14F-4D97-AF65-F5344CB8AC3E}">
-        <p14:creationId xmlns:p14="http://schemas.microsoft.com/office/powerpoint/2010/main" val="131634220"/>
+        <p14:creationId xmlns:p14="http://schemas.microsoft.com/office/powerpoint/2010/main" val="3299567317"/>
       </p:ext>
     </p:extLst>
   </p:cSld>
@@ -1779,30 +1820,18 @@
           <a:bodyPr/>
           <a:lstStyle/>
           <a:p>
-            <a:pPr marL="0" marR="0" lvl="0" indent="0" algn="l" defTabSz="914400" rtl="0" eaLnBrk="1" fontAlgn="auto" latinLnBrk="0" hangingPunct="1">
-              <a:lnSpc>
-                <a:spcPct val="100000"/>
-              </a:lnSpc>
-              <a:spcBef>
-                <a:spcPts val="0"/>
-              </a:spcBef>
-              <a:spcAft>
-                <a:spcPts val="0"/>
-              </a:spcAft>
-              <a:buClrTx/>
-              <a:buSzTx/>
-              <a:buFontTx/>
-              <a:buNone/>
-              <a:tabLst/>
-              <a:defRPr/>
-            </a:pPr>
-            <a:r>
-              <a:rPr lang="en-US" dirty="0"/>
-              <a:t>The learning experience for this workshop starts on page 55 of the textbook.  For additional information, please watch the exercise 2.01 orientation video.</a:t>
-            </a:r>
-          </a:p>
-          <a:p>
-            <a:endParaRPr lang="en-US" dirty="0"/>
+            <a:r>
+              <a:rPr lang="en-US" sz="1200" b="0" i="0" kern="1200" dirty="0">
+                <a:solidFill>
+                  <a:schemeClr val="tx1"/>
+                </a:solidFill>
+                <a:effectLst/>
+                <a:latin typeface="+mn-lt"/>
+                <a:ea typeface="+mn-ea"/>
+                <a:cs typeface="+mn-cs"/>
+              </a:rPr>
+              <a:t>Let’s now justify and explain the existence of the bias nodes.  Technically, bias provides every node in a neural network with a trainable constant value (1 or -1).  But why do we need them?  Well – on a practical level – input from the bias node enables an activation function to be shifted to the left or right.  In this case, what looks like a sigmoid function can be shifted to the left (position A) or to the right (position C).  In addition to the adjustment of weights which occurs during backpropagation, this ‘shifting’ can be important and critical for successful learning.</a:t>
+            </a:r>
           </a:p>
         </p:txBody>
       </p:sp>
@@ -1832,7 +1861,7 @@
     </p:spTree>
     <p:extLst>
       <p:ext uri="{BB962C8B-B14F-4D97-AF65-F5344CB8AC3E}">
-        <p14:creationId xmlns:p14="http://schemas.microsoft.com/office/powerpoint/2010/main" val="1401395996"/>
+        <p14:creationId xmlns:p14="http://schemas.microsoft.com/office/powerpoint/2010/main" val="131634220"/>
       </p:ext>
     </p:extLst>
   </p:cSld>
@@ -1886,10 +1915,30 @@
           <a:bodyPr/>
           <a:lstStyle/>
           <a:p>
+            <a:pPr marL="0" marR="0" lvl="0" indent="0" algn="l" defTabSz="914400" rtl="0" eaLnBrk="1" fontAlgn="auto" latinLnBrk="0" hangingPunct="1">
+              <a:lnSpc>
+                <a:spcPct val="100000"/>
+              </a:lnSpc>
+              <a:spcBef>
+                <a:spcPts val="0"/>
+              </a:spcBef>
+              <a:spcAft>
+                <a:spcPts val="0"/>
+              </a:spcAft>
+              <a:buClrTx/>
+              <a:buSzTx/>
+              <a:buFontTx/>
+              <a:buNone/>
+              <a:tabLst/>
+              <a:defRPr/>
+            </a:pPr>
             <a:r>
               <a:rPr lang="en-US" dirty="0"/>
-              <a:t> </a:t>
-            </a:r>
+              <a:t>The learning experience for this workshop starts on page 55 of the textbook.  For additional information, please watch the exercise 2.01 orientation video.</a:t>
+            </a:r>
+          </a:p>
+          <a:p>
+            <a:endParaRPr lang="en-US" dirty="0"/>
           </a:p>
         </p:txBody>
       </p:sp>
@@ -1919,7 +1968,7 @@
     </p:spTree>
     <p:extLst>
       <p:ext uri="{BB962C8B-B14F-4D97-AF65-F5344CB8AC3E}">
-        <p14:creationId xmlns:p14="http://schemas.microsoft.com/office/powerpoint/2010/main" val="1974960137"/>
+        <p14:creationId xmlns:p14="http://schemas.microsoft.com/office/powerpoint/2010/main" val="1401395996"/>
       </p:ext>
     </p:extLst>
   </p:cSld>
@@ -3332,66 +3381,7 @@
                 <a:ea typeface="+mn-ea"/>
                 <a:cs typeface="+mn-cs"/>
               </a:rPr>
-              <a:t>Like real neurons, artificial neurons can be wired up in networks, where each input comes from the output of another neuron. When we connect neurons together into networks, we draw “wires” to connect one neuron’s output to one or more other neurons’ inputs, as shown here.</a:t>
-            </a:r>
-          </a:p>
-          <a:p>
-            <a:pPr marL="0" marR="0" lvl="0" indent="0" algn="l" defTabSz="914400" rtl="0" eaLnBrk="1" fontAlgn="auto" latinLnBrk="0" hangingPunct="1">
-              <a:lnSpc>
-                <a:spcPct val="100000"/>
-              </a:lnSpc>
-              <a:spcBef>
-                <a:spcPts val="0"/>
-              </a:spcBef>
-              <a:spcAft>
-                <a:spcPts val="0"/>
-              </a:spcAft>
-              <a:buClrTx/>
-              <a:buSzTx/>
-              <a:buFontTx/>
-              <a:buNone/>
-              <a:tabLst/>
-              <a:defRPr/>
-            </a:pPr>
-            <a:endParaRPr lang="en-US" sz="1200" b="0" i="0" kern="1200" dirty="0">
-              <a:solidFill>
-                <a:schemeClr val="tx1"/>
-              </a:solidFill>
-              <a:effectLst/>
-              <a:latin typeface="+mn-lt"/>
-              <a:ea typeface="+mn-ea"/>
-              <a:cs typeface="+mn-cs"/>
-            </a:endParaRPr>
-          </a:p>
-          <a:p>
-            <a:pPr marL="0" marR="0" lvl="0" indent="0" algn="l" defTabSz="914400" rtl="0" eaLnBrk="1" fontAlgn="auto" latinLnBrk="0" hangingPunct="1">
-              <a:lnSpc>
-                <a:spcPct val="100000"/>
-              </a:lnSpc>
-              <a:spcBef>
-                <a:spcPts val="0"/>
-              </a:spcBef>
-              <a:spcAft>
-                <a:spcPts val="0"/>
-              </a:spcAft>
-              <a:buClrTx/>
-              <a:buSzTx/>
-              <a:buFontTx/>
-              <a:buNone/>
-              <a:tabLst/>
-              <a:defRPr/>
-            </a:pPr>
-            <a:r>
-              <a:rPr lang="en-US" sz="1200" b="0" i="0" kern="1200" dirty="0">
-                <a:solidFill>
-                  <a:schemeClr val="tx1"/>
-                </a:solidFill>
-                <a:effectLst/>
-                <a:latin typeface="+mn-lt"/>
-                <a:ea typeface="+mn-ea"/>
-                <a:cs typeface="+mn-cs"/>
-              </a:rPr>
-              <a:t>This is a neural network. Usually, the goal of a network like the one pictured here is to produce one or more values as outputs. </a:t>
+              <a:t>Like real neurons, artificial neurons can be wired up into networks, where each input comes from the output of another neuron. When we connect neurons together into networks, we draw lines to connect one neuron’s output to one or more other neurons’ inputs, as shown here.  The goal of a network like the one pictured here is to produce one or more values as outputs. </a:t>
             </a:r>
           </a:p>
         </p:txBody>
@@ -3615,7 +3605,7 @@
                 <a:ea typeface="+mn-ea"/>
                 <a:cs typeface="+mn-cs"/>
               </a:rPr>
-              <a:t>Of the many possible ways to organize neurons in a network, placing them in a series of layers has proven to be both flexible and extremely powerful. Typically, neurons within a layer aren’t connected to one another. Their inputs come from the previous layer, and their outputs go to the next layer.</a:t>
+              <a:t>Of the many possible ways to organize neurons in a network, placing them in a series of layers has proven to be both flexible and extremely powerful. Typically, neurons within a layer aren’t connected to one another. Their inputs come from the previous layer, and their outputs go to the next layer. In fact, the phrase deep learning comes from this structure.</a:t>
             </a:r>
           </a:p>
           <a:p>
@@ -3645,37 +3635,6 @@
               <a:ea typeface="+mn-ea"/>
               <a:cs typeface="+mn-cs"/>
             </a:endParaRPr>
-          </a:p>
-          <a:p>
-            <a:pPr marL="0" marR="0" lvl="0" indent="0" algn="l" defTabSz="914400" rtl="0" eaLnBrk="1" fontAlgn="auto" latinLnBrk="0" hangingPunct="1">
-              <a:lnSpc>
-                <a:spcPct val="100000"/>
-              </a:lnSpc>
-              <a:spcBef>
-                <a:spcPts val="0"/>
-              </a:spcBef>
-              <a:spcAft>
-                <a:spcPts val="0"/>
-              </a:spcAft>
-              <a:buClrTx/>
-              <a:buSzTx/>
-              <a:buFontTx/>
-              <a:buNone/>
-              <a:tabLst/>
-              <a:defRPr/>
-            </a:pPr>
-            <a:r>
-              <a:rPr lang="en-US" sz="1200" b="0" i="0" kern="1200" dirty="0">
-                <a:solidFill>
-                  <a:schemeClr val="tx1"/>
-                </a:solidFill>
-                <a:effectLst/>
-                <a:latin typeface="+mn-lt"/>
-                <a:ea typeface="+mn-ea"/>
-                <a:cs typeface="+mn-cs"/>
-              </a:rPr>
-              <a:t>In fact, the phrase deep learning comes from this structure. If we imagine many layers drawn side by side, we might call the network “wide.” If they were drawn vertically and we stood at the bottom looking up, we might call it “tall.” If we stood at the top and looked down, we might call it “deep.” And that’s all that deep learning means: a network made of a series of layers that we often draw vertically.</a:t>
-            </a:r>
           </a:p>
         </p:txBody>
       </p:sp>
@@ -3786,10 +3745,10 @@
                 <a:ea typeface="+mn-ea"/>
                 <a:cs typeface="+mn-cs"/>
               </a:rPr>
-              <a:t>And finally, a fully connected layer (also called an FC, linear, or </a:t>
-            </a:r>
-            <a:r>
-              <a:rPr lang="en-US" sz="1200" b="1" i="0" kern="1200" dirty="0">
+              <a:t>Consider a layered cake.  If we lay the cake on its side, with many layers side-by-side, we might call the network </a:t>
+            </a:r>
+            <a:r>
+              <a:rPr lang="en-US" sz="1200" b="0" i="0" u="sng" kern="1200" dirty="0">
                 <a:solidFill>
                   <a:schemeClr val="tx1"/>
                 </a:solidFill>
@@ -3798,7 +3757,7 @@
                 <a:ea typeface="+mn-ea"/>
                 <a:cs typeface="+mn-cs"/>
               </a:rPr>
-              <a:t>dense layer</a:t>
+              <a:t>wide</a:t>
             </a:r>
             <a:r>
               <a:rPr lang="en-US" sz="1200" b="0" i="0" kern="1200" dirty="0">
@@ -3810,8 +3769,103 @@
                 <a:ea typeface="+mn-ea"/>
                 <a:cs typeface="+mn-cs"/>
               </a:rPr>
-              <a:t>) is a set of neurons that each receive an input from every neuron in the previous layer. For example, if there are three neurons in a dense layer, and four neurons in the preceding layer, then each neuron in the dense layer has four inputs, one from each neuron in the preceding layer, for a total of 3 × 4 = 12 connections, each with an associated weight.</a:t>
-            </a:r>
+              <a:t>.  But if we stand the cake up and look at it from above, we might call it </a:t>
+            </a:r>
+            <a:r>
+              <a:rPr lang="en-US" sz="1200" b="0" i="0" u="sng" kern="1200" dirty="0">
+                <a:solidFill>
+                  <a:schemeClr val="tx1"/>
+                </a:solidFill>
+                <a:effectLst/>
+                <a:latin typeface="+mn-lt"/>
+                <a:ea typeface="+mn-ea"/>
+                <a:cs typeface="+mn-cs"/>
+              </a:rPr>
+              <a:t>deep</a:t>
+            </a:r>
+            <a:r>
+              <a:rPr lang="en-US" sz="1200" b="0" i="0" kern="1200" dirty="0">
+                <a:solidFill>
+                  <a:schemeClr val="tx1"/>
+                </a:solidFill>
+                <a:effectLst/>
+                <a:latin typeface="+mn-lt"/>
+                <a:ea typeface="+mn-ea"/>
+                <a:cs typeface="+mn-cs"/>
+              </a:rPr>
+              <a:t>.  And that’s what </a:t>
+            </a:r>
+            <a:r>
+              <a:rPr lang="en-US" sz="1200" b="1" i="0" kern="1200" dirty="0">
+                <a:solidFill>
+                  <a:schemeClr val="tx1"/>
+                </a:solidFill>
+                <a:effectLst/>
+                <a:latin typeface="+mn-lt"/>
+                <a:ea typeface="+mn-ea"/>
+                <a:cs typeface="+mn-cs"/>
+              </a:rPr>
+              <a:t>deep learning </a:t>
+            </a:r>
+            <a:r>
+              <a:rPr lang="en-US" sz="1200" b="0" i="0" kern="1200" dirty="0">
+                <a:solidFill>
+                  <a:schemeClr val="tx1"/>
+                </a:solidFill>
+                <a:effectLst/>
+                <a:latin typeface="+mn-lt"/>
+                <a:ea typeface="+mn-ea"/>
+                <a:cs typeface="+mn-cs"/>
+              </a:rPr>
+              <a:t>means: a network composed of a series of layers – often drawn vertically.</a:t>
+            </a:r>
+          </a:p>
+          <a:p>
+            <a:pPr marL="0" indent="0">
+              <a:buNone/>
+            </a:pPr>
+            <a:endParaRPr lang="en-US" sz="1200" b="0" i="0" kern="1200" dirty="0">
+              <a:solidFill>
+                <a:schemeClr val="tx1"/>
+              </a:solidFill>
+              <a:effectLst/>
+              <a:latin typeface="+mn-lt"/>
+              <a:ea typeface="+mn-ea"/>
+              <a:cs typeface="+mn-cs"/>
+            </a:endParaRPr>
+          </a:p>
+          <a:p>
+            <a:endParaRPr lang="en-US" sz="1200" b="0" i="0" kern="1200" dirty="0">
+              <a:solidFill>
+                <a:schemeClr val="tx1"/>
+              </a:solidFill>
+              <a:effectLst/>
+              <a:latin typeface="+mn-lt"/>
+              <a:ea typeface="+mn-ea"/>
+              <a:cs typeface="+mn-cs"/>
+            </a:endParaRPr>
+          </a:p>
+          <a:p>
+            <a:endParaRPr lang="en-US" sz="1200" b="0" i="0" kern="1200" dirty="0">
+              <a:solidFill>
+                <a:schemeClr val="tx1"/>
+              </a:solidFill>
+              <a:effectLst/>
+              <a:latin typeface="+mn-lt"/>
+              <a:ea typeface="+mn-ea"/>
+              <a:cs typeface="+mn-cs"/>
+            </a:endParaRPr>
+          </a:p>
+          <a:p>
+            <a:endParaRPr lang="en-US" sz="1200" b="0" i="0" kern="1200" dirty="0">
+              <a:solidFill>
+                <a:schemeClr val="tx1"/>
+              </a:solidFill>
+              <a:effectLst/>
+              <a:latin typeface="+mn-lt"/>
+              <a:ea typeface="+mn-ea"/>
+              <a:cs typeface="+mn-cs"/>
+            </a:endParaRPr>
           </a:p>
         </p:txBody>
       </p:sp>
@@ -3841,7 +3895,7 @@
     </p:spTree>
     <p:extLst>
       <p:ext uri="{BB962C8B-B14F-4D97-AF65-F5344CB8AC3E}">
-        <p14:creationId xmlns:p14="http://schemas.microsoft.com/office/powerpoint/2010/main" val="4136970845"/>
+        <p14:creationId xmlns:p14="http://schemas.microsoft.com/office/powerpoint/2010/main" val="658380389"/>
       </p:ext>
     </p:extLst>
   </p:cSld>
@@ -3998,7 +4052,7 @@
           <a:p>
             <a:fld id="{C3F78080-8D0A-4BE8-A5B4-CB115102D524}" type="datetimeFigureOut">
               <a:rPr lang="en-US" smtClean="0"/>
-              <a:t>3/24/2022</a:t>
+              <a:t>3/28/2022</a:t>
             </a:fld>
             <a:endParaRPr lang="en-US"/>
           </a:p>
@@ -4196,7 +4250,7 @@
           <a:p>
             <a:fld id="{C3F78080-8D0A-4BE8-A5B4-CB115102D524}" type="datetimeFigureOut">
               <a:rPr lang="en-US" smtClean="0"/>
-              <a:t>3/24/2022</a:t>
+              <a:t>3/28/2022</a:t>
             </a:fld>
             <a:endParaRPr lang="en-US"/>
           </a:p>
@@ -4404,7 +4458,7 @@
           <a:p>
             <a:fld id="{C3F78080-8D0A-4BE8-A5B4-CB115102D524}" type="datetimeFigureOut">
               <a:rPr lang="en-US" smtClean="0"/>
-              <a:t>3/24/2022</a:t>
+              <a:t>3/28/2022</a:t>
             </a:fld>
             <a:endParaRPr lang="en-US"/>
           </a:p>
@@ -4602,7 +4656,7 @@
           <a:p>
             <a:fld id="{C3F78080-8D0A-4BE8-A5B4-CB115102D524}" type="datetimeFigureOut">
               <a:rPr lang="en-US" smtClean="0"/>
-              <a:t>3/24/2022</a:t>
+              <a:t>3/28/2022</a:t>
             </a:fld>
             <a:endParaRPr lang="en-US"/>
           </a:p>
@@ -4877,7 +4931,7 @@
           <a:p>
             <a:fld id="{C3F78080-8D0A-4BE8-A5B4-CB115102D524}" type="datetimeFigureOut">
               <a:rPr lang="en-US" smtClean="0"/>
-              <a:t>3/24/2022</a:t>
+              <a:t>3/28/2022</a:t>
             </a:fld>
             <a:endParaRPr lang="en-US"/>
           </a:p>
@@ -5142,7 +5196,7 @@
           <a:p>
             <a:fld id="{C3F78080-8D0A-4BE8-A5B4-CB115102D524}" type="datetimeFigureOut">
               <a:rPr lang="en-US" smtClean="0"/>
-              <a:t>3/24/2022</a:t>
+              <a:t>3/28/2022</a:t>
             </a:fld>
             <a:endParaRPr lang="en-US"/>
           </a:p>
@@ -5554,7 +5608,7 @@
           <a:p>
             <a:fld id="{C3F78080-8D0A-4BE8-A5B4-CB115102D524}" type="datetimeFigureOut">
               <a:rPr lang="en-US" smtClean="0"/>
-              <a:t>3/24/2022</a:t>
+              <a:t>3/28/2022</a:t>
             </a:fld>
             <a:endParaRPr lang="en-US"/>
           </a:p>
@@ -5695,7 +5749,7 @@
           <a:p>
             <a:fld id="{C3F78080-8D0A-4BE8-A5B4-CB115102D524}" type="datetimeFigureOut">
               <a:rPr lang="en-US" smtClean="0"/>
-              <a:t>3/24/2022</a:t>
+              <a:t>3/28/2022</a:t>
             </a:fld>
             <a:endParaRPr lang="en-US"/>
           </a:p>
@@ -5808,7 +5862,7 @@
           <a:p>
             <a:fld id="{C3F78080-8D0A-4BE8-A5B4-CB115102D524}" type="datetimeFigureOut">
               <a:rPr lang="en-US" smtClean="0"/>
-              <a:t>3/24/2022</a:t>
+              <a:t>3/28/2022</a:t>
             </a:fld>
             <a:endParaRPr lang="en-US"/>
           </a:p>
@@ -6119,7 +6173,7 @@
           <a:p>
             <a:fld id="{C3F78080-8D0A-4BE8-A5B4-CB115102D524}" type="datetimeFigureOut">
               <a:rPr lang="en-US" smtClean="0"/>
-              <a:t>3/24/2022</a:t>
+              <a:t>3/28/2022</a:t>
             </a:fld>
             <a:endParaRPr lang="en-US"/>
           </a:p>
@@ -6407,7 +6461,7 @@
           <a:p>
             <a:fld id="{C3F78080-8D0A-4BE8-A5B4-CB115102D524}" type="datetimeFigureOut">
               <a:rPr lang="en-US" smtClean="0"/>
-              <a:t>3/24/2022</a:t>
+              <a:t>3/28/2022</a:t>
             </a:fld>
             <a:endParaRPr lang="en-US"/>
           </a:p>
@@ -6648,7 +6702,7 @@
           <a:p>
             <a:fld id="{C3F78080-8D0A-4BE8-A5B4-CB115102D524}" type="datetimeFigureOut">
               <a:rPr lang="en-US" smtClean="0"/>
-              <a:t>3/24/2022</a:t>
+              <a:t>3/28/2022</a:t>
             </a:fld>
             <a:endParaRPr lang="en-US"/>
           </a:p>
@@ -7179,6 +7233,178 @@
           <a:chExt cx="0" cy="0"/>
         </a:xfrm>
       </p:grpSpPr>
+      <p:sp>
+        <p:nvSpPr>
+          <p:cNvPr id="26" name="TextBox 25">
+            <a:extLst>
+              <a:ext uri="{FF2B5EF4-FFF2-40B4-BE49-F238E27FC236}">
+                <a16:creationId xmlns:a16="http://schemas.microsoft.com/office/drawing/2014/main" id="{C53A25A6-F70B-4315-9230-0220EC84A470}"/>
+              </a:ext>
+            </a:extLst>
+          </p:cNvPr>
+          <p:cNvSpPr txBox="1"/>
+          <p:nvPr/>
+        </p:nvSpPr>
+        <p:spPr>
+          <a:xfrm>
+            <a:off x="0" y="6550223"/>
+            <a:ext cx="12192000" cy="307777"/>
+          </a:xfrm>
+          <a:prstGeom prst="rect">
+            <a:avLst/>
+          </a:prstGeom>
+          <a:noFill/>
+        </p:spPr>
+        <p:txBody>
+          <a:bodyPr wrap="square" rtlCol="0">
+            <a:spAutoFit/>
+          </a:bodyPr>
+          <a:lstStyle/>
+          <a:p>
+            <a:r>
+              <a:rPr lang="en-US" sz="1400" dirty="0">
+                <a:solidFill>
+                  <a:schemeClr val="tx1">
+                    <a:lumMod val="65000"/>
+                    <a:lumOff val="35000"/>
+                  </a:schemeClr>
+                </a:solidFill>
+                <a:latin typeface="+mj-lt"/>
+                <a:ea typeface="Verdana" panose="020B0604030504040204" pitchFamily="34" charset="0"/>
+              </a:rPr>
+              <a:t>Source: Glassner, A. (2021). </a:t>
+            </a:r>
+            <a:r>
+              <a:rPr lang="en-US" sz="1400" i="1" dirty="0">
+                <a:solidFill>
+                  <a:schemeClr val="tx1">
+                    <a:lumMod val="65000"/>
+                    <a:lumOff val="35000"/>
+                  </a:schemeClr>
+                </a:solidFill>
+                <a:latin typeface="+mj-lt"/>
+                <a:ea typeface="Verdana" panose="020B0604030504040204" pitchFamily="34" charset="0"/>
+              </a:rPr>
+              <a:t>Deep learning: A visual approach</a:t>
+            </a:r>
+            <a:r>
+              <a:rPr lang="en-US" sz="1400" dirty="0">
+                <a:solidFill>
+                  <a:schemeClr val="tx1">
+                    <a:lumMod val="65000"/>
+                    <a:lumOff val="35000"/>
+                  </a:schemeClr>
+                </a:solidFill>
+                <a:latin typeface="+mj-lt"/>
+                <a:ea typeface="Verdana" panose="020B0604030504040204" pitchFamily="34" charset="0"/>
+              </a:rPr>
+              <a:t>. </a:t>
+            </a:r>
+            <a:r>
+              <a:rPr lang="en-US" sz="1400" b="0" i="0" dirty="0">
+                <a:solidFill>
+                  <a:schemeClr val="tx1">
+                    <a:lumMod val="65000"/>
+                    <a:lumOff val="35000"/>
+                  </a:schemeClr>
+                </a:solidFill>
+                <a:effectLst/>
+                <a:latin typeface="+mj-lt"/>
+                <a:ea typeface="Verdana" panose="020B0604030504040204" pitchFamily="34" charset="0"/>
+              </a:rPr>
+              <a:t>San Francisco, CA: No Starch Press. (Chapter 13)</a:t>
+            </a:r>
+            <a:endParaRPr lang="en-US" sz="1400" dirty="0">
+              <a:solidFill>
+                <a:schemeClr val="tx1">
+                  <a:lumMod val="65000"/>
+                  <a:lumOff val="35000"/>
+                </a:schemeClr>
+              </a:solidFill>
+              <a:latin typeface="+mj-lt"/>
+              <a:ea typeface="Verdana" panose="020B0604030504040204" pitchFamily="34" charset="0"/>
+            </a:endParaRPr>
+          </a:p>
+        </p:txBody>
+      </p:sp>
+      <p:pic>
+        <p:nvPicPr>
+          <p:cNvPr id="3" name="Picture 2" descr="A picture containing diagram&#10;&#10;Description automatically generated">
+            <a:extLst>
+              <a:ext uri="{FF2B5EF4-FFF2-40B4-BE49-F238E27FC236}">
+                <a16:creationId xmlns:a16="http://schemas.microsoft.com/office/drawing/2014/main" id="{0FC5C259-97A3-4400-A831-7D1728FF5396}"/>
+              </a:ext>
+            </a:extLst>
+          </p:cNvPr>
+          <p:cNvPicPr>
+            <a:picLocks noChangeAspect="1"/>
+          </p:cNvPicPr>
+          <p:nvPr/>
+        </p:nvPicPr>
+        <p:blipFill>
+          <a:blip r:embed="rId3">
+            <a:extLst>
+              <a:ext uri="{28A0092B-C50C-407E-A947-70E740481C1C}">
+                <a14:useLocalDpi xmlns:a14="http://schemas.microsoft.com/office/drawing/2010/main" val="0"/>
+              </a:ext>
+            </a:extLst>
+          </a:blip>
+          <a:stretch>
+            <a:fillRect/>
+          </a:stretch>
+        </p:blipFill>
+        <p:spPr>
+          <a:xfrm>
+            <a:off x="3987126" y="1969953"/>
+            <a:ext cx="4217748" cy="2918094"/>
+          </a:xfrm>
+          <a:prstGeom prst="rect">
+            <a:avLst/>
+          </a:prstGeom>
+        </p:spPr>
+      </p:pic>
+    </p:spTree>
+    <p:extLst>
+      <p:ext uri="{BB962C8B-B14F-4D97-AF65-F5344CB8AC3E}">
+        <p14:creationId xmlns:p14="http://schemas.microsoft.com/office/powerpoint/2010/main" val="2014009550"/>
+      </p:ext>
+    </p:extLst>
+  </p:cSld>
+  <p:clrMapOvr>
+    <a:masterClrMapping/>
+  </p:clrMapOvr>
+  <mc:AlternateContent xmlns:mc="http://schemas.openxmlformats.org/markup-compatibility/2006" xmlns:p14="http://schemas.microsoft.com/office/powerpoint/2010/main">
+    <mc:Choice Requires="p14">
+      <p:transition spd="med" p14:dur="700">
+        <p:fade/>
+      </p:transition>
+    </mc:Choice>
+    <mc:Fallback xmlns="">
+      <p:transition spd="med">
+        <p:fade/>
+      </p:transition>
+    </mc:Fallback>
+  </mc:AlternateContent>
+</p:sld>
+</file>
+
+<file path=ppt/slides/slide11.xml><?xml version="1.0" encoding="utf-8"?>
+<p:sld xmlns:a="http://schemas.openxmlformats.org/drawingml/2006/main" xmlns:r="http://schemas.openxmlformats.org/officeDocument/2006/relationships" xmlns:p="http://schemas.openxmlformats.org/presentationml/2006/main">
+  <p:cSld>
+    <p:spTree>
+      <p:nvGrpSpPr>
+        <p:cNvPr id="1" name=""/>
+        <p:cNvGrpSpPr/>
+        <p:nvPr/>
+      </p:nvGrpSpPr>
+      <p:grpSpPr>
+        <a:xfrm>
+          <a:off x="0" y="0"/>
+          <a:ext cx="0" cy="0"/>
+          <a:chOff x="0" y="0"/>
+          <a:chExt cx="0" cy="0"/>
+        </a:xfrm>
+      </p:grpSpPr>
       <p:pic>
         <p:nvPicPr>
           <p:cNvPr id="7" name="Picture 6">
@@ -7321,7 +7547,7 @@
           <a:graphicData uri="http://schemas.openxmlformats.org/presentationml/2006/ole">
             <mc:AlternateContent xmlns:mc="http://schemas.openxmlformats.org/markup-compatibility/2006">
               <mc:Choice xmlns:v="urn:schemas-microsoft-com:vml" Requires="v">
-                <p:oleObj spid="_x0000_s1085" name="Visio" r:id="rId8" imgW="2514945" imgH="1657350" progId="Visio.Drawing.15">
+                <p:oleObj spid="_x0000_s1102" name="Visio" r:id="rId8" imgW="2514945" imgH="1657350" progId="Visio.Drawing.15">
                   <p:embed/>
                 </p:oleObj>
               </mc:Choice>
@@ -7965,7 +8191,7 @@
 </p:sld>
 </file>
 
-<file path=ppt/slides/slide11.xml><?xml version="1.0" encoding="utf-8"?>
+<file path=ppt/slides/slide12.xml><?xml version="1.0" encoding="utf-8"?>
 <p:sld xmlns:a="http://schemas.openxmlformats.org/drawingml/2006/main" xmlns:r="http://schemas.openxmlformats.org/officeDocument/2006/relationships" xmlns:p="http://schemas.openxmlformats.org/presentationml/2006/main">
   <p:cSld>
     <p:spTree>
@@ -8724,7 +8950,7 @@
 </p:sld>
 </file>
 
-<file path=ppt/slides/slide12.xml><?xml version="1.0" encoding="utf-8"?>
+<file path=ppt/slides/slide13.xml><?xml version="1.0" encoding="utf-8"?>
 <p:sld xmlns:a="http://schemas.openxmlformats.org/drawingml/2006/main" xmlns:r="http://schemas.openxmlformats.org/officeDocument/2006/relationships" xmlns:p="http://schemas.openxmlformats.org/presentationml/2006/main">
   <p:cSld>
     <p:spTree>
@@ -8878,280 +9104,6 @@
     <p:extLst>
       <p:ext uri="{BB962C8B-B14F-4D97-AF65-F5344CB8AC3E}">
         <p14:creationId xmlns:p14="http://schemas.microsoft.com/office/powerpoint/2010/main" val="2077674142"/>
-      </p:ext>
-    </p:extLst>
-  </p:cSld>
-  <p:clrMapOvr>
-    <a:masterClrMapping/>
-  </p:clrMapOvr>
-  <mc:AlternateContent xmlns:mc="http://schemas.openxmlformats.org/markup-compatibility/2006" xmlns:p14="http://schemas.microsoft.com/office/powerpoint/2010/main">
-    <mc:Choice Requires="p14">
-      <p:transition spd="med" p14:dur="700">
-        <p:fade/>
-      </p:transition>
-    </mc:Choice>
-    <mc:Fallback xmlns="">
-      <p:transition spd="med">
-        <p:fade/>
-      </p:transition>
-    </mc:Fallback>
-  </mc:AlternateContent>
-</p:sld>
-</file>
-
-<file path=ppt/slides/slide13.xml><?xml version="1.0" encoding="utf-8"?>
-<p:sld xmlns:a="http://schemas.openxmlformats.org/drawingml/2006/main" xmlns:r="http://schemas.openxmlformats.org/officeDocument/2006/relationships" xmlns:p="http://schemas.openxmlformats.org/presentationml/2006/main">
-  <p:cSld>
-    <p:spTree>
-      <p:nvGrpSpPr>
-        <p:cNvPr id="1" name=""/>
-        <p:cNvGrpSpPr/>
-        <p:nvPr/>
-      </p:nvGrpSpPr>
-      <p:grpSpPr>
-        <a:xfrm>
-          <a:off x="0" y="0"/>
-          <a:ext cx="0" cy="0"/>
-          <a:chOff x="0" y="0"/>
-          <a:chExt cx="0" cy="0"/>
-        </a:xfrm>
-      </p:grpSpPr>
-      <p:sp>
-        <p:nvSpPr>
-          <p:cNvPr id="2" name="Title 1">
-            <a:extLst>
-              <a:ext uri="{FF2B5EF4-FFF2-40B4-BE49-F238E27FC236}">
-                <a16:creationId xmlns:a16="http://schemas.microsoft.com/office/drawing/2014/main" id="{0F853981-B13F-4917-804F-EBF0D4819E7E}"/>
-              </a:ext>
-            </a:extLst>
-          </p:cNvPr>
-          <p:cNvSpPr>
-            <a:spLocks noGrp="1"/>
-          </p:cNvSpPr>
-          <p:nvPr>
-            <p:ph type="title"/>
-          </p:nvPr>
-        </p:nvSpPr>
-        <p:spPr>
-          <a:xfrm>
-            <a:off x="0" y="3099643"/>
-            <a:ext cx="12192000" cy="805143"/>
-          </a:xfrm>
-          <a:noFill/>
-        </p:spPr>
-        <p:txBody>
-          <a:bodyPr>
-            <a:noAutofit/>
-          </a:bodyPr>
-          <a:lstStyle/>
-          <a:p>
-            <a:pPr algn="ctr"/>
-            <a:br>
-              <a:rPr lang="en-US" sz="3600" dirty="0">
-                <a:solidFill>
-                  <a:schemeClr val="tx1">
-                    <a:lumMod val="65000"/>
-                    <a:lumOff val="35000"/>
-                  </a:schemeClr>
-                </a:solidFill>
-                <a:latin typeface="Palatino Linotype" panose="02040502050505030304" pitchFamily="18" charset="0"/>
-              </a:rPr>
-            </a:br>
-            <a:br>
-              <a:rPr lang="en-US" sz="3600" dirty="0">
-                <a:solidFill>
-                  <a:schemeClr val="tx1">
-                    <a:lumMod val="65000"/>
-                    <a:lumOff val="35000"/>
-                  </a:schemeClr>
-                </a:solidFill>
-                <a:latin typeface="Palatino Linotype" panose="02040502050505030304" pitchFamily="18" charset="0"/>
-              </a:rPr>
-            </a:br>
-            <a:br>
-              <a:rPr lang="en-US" sz="3600" dirty="0">
-                <a:solidFill>
-                  <a:schemeClr val="tx1">
-                    <a:lumMod val="65000"/>
-                    <a:lumOff val="35000"/>
-                  </a:schemeClr>
-                </a:solidFill>
-                <a:latin typeface="Palatino Linotype" panose="02040502050505030304" pitchFamily="18" charset="0"/>
-              </a:rPr>
-            </a:br>
-            <a:br>
-              <a:rPr lang="en-US" sz="3600" dirty="0">
-                <a:solidFill>
-                  <a:schemeClr val="tx1">
-                    <a:lumMod val="65000"/>
-                    <a:lumOff val="35000"/>
-                  </a:schemeClr>
-                </a:solidFill>
-                <a:latin typeface="Palatino Linotype" panose="02040502050505030304" pitchFamily="18" charset="0"/>
-              </a:rPr>
-            </a:br>
-            <a:br>
-              <a:rPr lang="en-US" sz="3600" dirty="0">
-                <a:solidFill>
-                  <a:schemeClr val="tx1">
-                    <a:lumMod val="65000"/>
-                    <a:lumOff val="35000"/>
-                  </a:schemeClr>
-                </a:solidFill>
-                <a:latin typeface="Palatino Linotype" panose="02040502050505030304" pitchFamily="18" charset="0"/>
-              </a:rPr>
-            </a:br>
-            <a:br>
-              <a:rPr lang="en-US" sz="3600" dirty="0">
-                <a:solidFill>
-                  <a:schemeClr val="tx1">
-                    <a:lumMod val="65000"/>
-                    <a:lumOff val="35000"/>
-                  </a:schemeClr>
-                </a:solidFill>
-                <a:latin typeface="Palatino Linotype" panose="02040502050505030304" pitchFamily="18" charset="0"/>
-              </a:rPr>
-            </a:br>
-            <a:br>
-              <a:rPr lang="en-US" sz="3600" dirty="0">
-                <a:solidFill>
-                  <a:schemeClr val="tx1">
-                    <a:lumMod val="65000"/>
-                    <a:lumOff val="35000"/>
-                  </a:schemeClr>
-                </a:solidFill>
-                <a:latin typeface="Palatino Linotype" panose="02040502050505030304" pitchFamily="18" charset="0"/>
-              </a:rPr>
-            </a:br>
-            <a:br>
-              <a:rPr lang="en-US" sz="3600" dirty="0">
-                <a:solidFill>
-                  <a:schemeClr val="tx1">
-                    <a:lumMod val="65000"/>
-                    <a:lumOff val="35000"/>
-                  </a:schemeClr>
-                </a:solidFill>
-                <a:latin typeface="Palatino Linotype" panose="02040502050505030304" pitchFamily="18" charset="0"/>
-              </a:rPr>
-            </a:br>
-            <a:r>
-              <a:rPr lang="en-US" sz="3600" dirty="0">
-                <a:solidFill>
-                  <a:schemeClr val="tx1">
-                    <a:lumMod val="65000"/>
-                    <a:lumOff val="35000"/>
-                  </a:schemeClr>
-                </a:solidFill>
-                <a:latin typeface="Palatino Linotype" panose="02040502050505030304" pitchFamily="18" charset="0"/>
-              </a:rPr>
-              <a:t>     2.01 (Perceptron Implementation)</a:t>
-            </a:r>
-            <a:endParaRPr lang="en-US" sz="3600" dirty="0">
-              <a:solidFill>
-                <a:schemeClr val="tx1">
-                  <a:lumMod val="65000"/>
-                  <a:lumOff val="35000"/>
-                </a:schemeClr>
-              </a:solidFill>
-              <a:latin typeface="Palatino Linotype" panose="02040502050505030304" pitchFamily="18" charset="0"/>
-              <a:cs typeface="Segoe UI Light" panose="020B0502040204020203" pitchFamily="34" charset="0"/>
-            </a:endParaRPr>
-          </a:p>
-        </p:txBody>
-      </p:sp>
-      <p:sp>
-        <p:nvSpPr>
-          <p:cNvPr id="3" name="Text Placeholder 2">
-            <a:extLst>
-              <a:ext uri="{FF2B5EF4-FFF2-40B4-BE49-F238E27FC236}">
-                <a16:creationId xmlns:a16="http://schemas.microsoft.com/office/drawing/2014/main" id="{098BC2D2-CCF7-4C63-8489-B46BF394FCA2}"/>
-              </a:ext>
-            </a:extLst>
-          </p:cNvPr>
-          <p:cNvSpPr>
-            <a:spLocks noGrp="1"/>
-          </p:cNvSpPr>
-          <p:nvPr>
-            <p:ph type="body" idx="1"/>
-          </p:nvPr>
-        </p:nvSpPr>
-        <p:spPr>
-          <a:xfrm>
-            <a:off x="0" y="4285400"/>
-            <a:ext cx="12192000" cy="518830"/>
-          </a:xfrm>
-        </p:spPr>
-        <p:txBody>
-          <a:bodyPr>
-            <a:normAutofit/>
-          </a:bodyPr>
-          <a:lstStyle/>
-          <a:p>
-            <a:endParaRPr lang="en-US" dirty="0">
-              <a:latin typeface="Palatino Linotype" panose="02040502050505030304" pitchFamily="18" charset="0"/>
-              <a:cs typeface="Segoe UI" panose="020B0502040204020203" pitchFamily="34" charset="0"/>
-            </a:endParaRPr>
-          </a:p>
-          <a:p>
-            <a:endParaRPr lang="en-US" dirty="0">
-              <a:latin typeface="Palatino Linotype" panose="02040502050505030304" pitchFamily="18" charset="0"/>
-              <a:cs typeface="Segoe UI" panose="020B0502040204020203" pitchFamily="34" charset="0"/>
-            </a:endParaRPr>
-          </a:p>
-          <a:p>
-            <a:endParaRPr lang="en-US" dirty="0">
-              <a:latin typeface="Palatino Linotype" panose="02040502050505030304" pitchFamily="18" charset="0"/>
-              <a:cs typeface="Segoe UI" panose="020B0502040204020203" pitchFamily="34" charset="0"/>
-            </a:endParaRPr>
-          </a:p>
-          <a:p>
-            <a:endParaRPr lang="en-US" dirty="0">
-              <a:latin typeface="Palatino Linotype" panose="02040502050505030304" pitchFamily="18" charset="0"/>
-              <a:cs typeface="Segoe UI" panose="020B0502040204020203" pitchFamily="34" charset="0"/>
-            </a:endParaRPr>
-          </a:p>
-          <a:p>
-            <a:endParaRPr lang="en-US" dirty="0">
-              <a:latin typeface="Palatino Linotype" panose="02040502050505030304" pitchFamily="18" charset="0"/>
-              <a:cs typeface="Segoe UI" panose="020B0502040204020203" pitchFamily="34" charset="0"/>
-            </a:endParaRPr>
-          </a:p>
-        </p:txBody>
-      </p:sp>
-      <p:pic>
-        <p:nvPicPr>
-          <p:cNvPr id="4" name="Picture 3">
-            <a:extLst>
-              <a:ext uri="{FF2B5EF4-FFF2-40B4-BE49-F238E27FC236}">
-                <a16:creationId xmlns:a16="http://schemas.microsoft.com/office/drawing/2014/main" id="{BF227EC8-F25E-46CD-8CAE-24E18DBDE5CC}"/>
-              </a:ext>
-            </a:extLst>
-          </p:cNvPr>
-          <p:cNvPicPr>
-            <a:picLocks noChangeAspect="1"/>
-          </p:cNvPicPr>
-          <p:nvPr/>
-        </p:nvPicPr>
-        <p:blipFill>
-          <a:blip r:embed="rId3"/>
-          <a:stretch>
-            <a:fillRect/>
-          </a:stretch>
-        </p:blipFill>
-        <p:spPr>
-          <a:xfrm>
-            <a:off x="0" y="365760"/>
-            <a:ext cx="3233668" cy="805144"/>
-          </a:xfrm>
-          <a:prstGeom prst="rect">
-            <a:avLst/>
-          </a:prstGeom>
-        </p:spPr>
-      </p:pic>
-    </p:spTree>
-    <p:extLst>
-      <p:ext uri="{BB962C8B-B14F-4D97-AF65-F5344CB8AC3E}">
-        <p14:creationId xmlns:p14="http://schemas.microsoft.com/office/powerpoint/2010/main" val="4096204018"/>
       </p:ext>
     </p:extLst>
   </p:cSld>
@@ -9192,52 +9144,34 @@
       </p:grpSpPr>
       <p:sp>
         <p:nvSpPr>
-          <p:cNvPr id="9" name="Title 1">
+          <p:cNvPr id="2" name="Title 1">
             <a:extLst>
               <a:ext uri="{FF2B5EF4-FFF2-40B4-BE49-F238E27FC236}">
-                <a16:creationId xmlns:a16="http://schemas.microsoft.com/office/drawing/2014/main" id="{C8D12608-18B4-4935-A051-D1A1193F0AD7}"/>
+                <a16:creationId xmlns:a16="http://schemas.microsoft.com/office/drawing/2014/main" id="{0F853981-B13F-4917-804F-EBF0D4819E7E}"/>
               </a:ext>
             </a:extLst>
           </p:cNvPr>
-          <p:cNvSpPr txBox="1">
-            <a:spLocks/>
-          </p:cNvSpPr>
-          <p:nvPr/>
+          <p:cNvSpPr>
+            <a:spLocks noGrp="1"/>
+          </p:cNvSpPr>
+          <p:nvPr>
+            <p:ph type="title"/>
+          </p:nvPr>
         </p:nvSpPr>
         <p:spPr>
           <a:xfrm>
-            <a:off x="0" y="3900578"/>
-            <a:ext cx="12192000" cy="685983"/>
+            <a:off x="0" y="3099643"/>
+            <a:ext cx="12192000" cy="805143"/>
           </a:xfrm>
-          <a:prstGeom prst="rect">
-            <a:avLst/>
-          </a:prstGeom>
           <a:noFill/>
         </p:spPr>
         <p:txBody>
-          <a:bodyPr vert="horz" lIns="91440" tIns="45720" rIns="91440" bIns="45720" rtlCol="0" anchor="b">
+          <a:bodyPr>
             <a:noAutofit/>
           </a:bodyPr>
-          <a:lstStyle>
-            <a:lvl1pPr algn="l" defTabSz="914400" rtl="0" eaLnBrk="1" latinLnBrk="0" hangingPunct="1">
-              <a:lnSpc>
-                <a:spcPct val="90000"/>
-              </a:lnSpc>
-              <a:spcBef>
-                <a:spcPct val="0"/>
-              </a:spcBef>
-              <a:buNone/>
-              <a:defRPr sz="6000" kern="1200">
-                <a:solidFill>
-                  <a:schemeClr val="tx1"/>
-                </a:solidFill>
-                <a:latin typeface="+mj-lt"/>
-                <a:ea typeface="+mj-ea"/>
-                <a:cs typeface="+mj-cs"/>
-              </a:defRPr>
-            </a:lvl1pPr>
-          </a:lstStyle>
-          <a:p>
+          <a:lstStyle/>
+          <a:p>
+            <a:pPr algn="ctr"/>
             <a:br>
               <a:rPr lang="en-US" sz="3600" dirty="0">
                 <a:solidFill>
@@ -9336,32 +9270,7 @@
                 </a:solidFill>
                 <a:latin typeface="Palatino Linotype" panose="02040502050505030304" pitchFamily="18" charset="0"/>
               </a:rPr>
-              <a:t>	2.03 (</a:t>
-            </a:r>
-            <a:r>
-              <a:rPr lang="en-US" sz="3600" b="0" i="0" dirty="0">
-                <a:solidFill>
-                  <a:schemeClr val="tx1">
-                    <a:lumMod val="65000"/>
-                    <a:lumOff val="35000"/>
-                  </a:schemeClr>
-                </a:solidFill>
-                <a:effectLst/>
-                <a:latin typeface="Palatino Linotype" panose="02040502050505030304" pitchFamily="18" charset="0"/>
-              </a:rPr>
-              <a:t>Multi-class Classification Using a Perceptron</a:t>
-            </a:r>
-            <a:r>
-              <a:rPr lang="en-US" sz="3600" dirty="0">
-                <a:solidFill>
-                  <a:schemeClr val="tx1">
-                    <a:lumMod val="65000"/>
-                    <a:lumOff val="35000"/>
-                  </a:schemeClr>
-                </a:solidFill>
-                <a:latin typeface="Palatino Linotype" panose="02040502050505030304" pitchFamily="18" charset="0"/>
-              </a:rPr>
-              <a:t>)</a:t>
+              <a:t>     2.01 (Perceptron Implementation)</a:t>
             </a:r>
             <a:endParaRPr lang="en-US" sz="3600" dirty="0">
               <a:solidFill>
@@ -9376,12 +9285,71 @@
           </a:p>
         </p:txBody>
       </p:sp>
+      <p:sp>
+        <p:nvSpPr>
+          <p:cNvPr id="3" name="Text Placeholder 2">
+            <a:extLst>
+              <a:ext uri="{FF2B5EF4-FFF2-40B4-BE49-F238E27FC236}">
+                <a16:creationId xmlns:a16="http://schemas.microsoft.com/office/drawing/2014/main" id="{098BC2D2-CCF7-4C63-8489-B46BF394FCA2}"/>
+              </a:ext>
+            </a:extLst>
+          </p:cNvPr>
+          <p:cNvSpPr>
+            <a:spLocks noGrp="1"/>
+          </p:cNvSpPr>
+          <p:nvPr>
+            <p:ph type="body" idx="1"/>
+          </p:nvPr>
+        </p:nvSpPr>
+        <p:spPr>
+          <a:xfrm>
+            <a:off x="0" y="4285400"/>
+            <a:ext cx="12192000" cy="518830"/>
+          </a:xfrm>
+        </p:spPr>
+        <p:txBody>
+          <a:bodyPr>
+            <a:normAutofit/>
+          </a:bodyPr>
+          <a:lstStyle/>
+          <a:p>
+            <a:endParaRPr lang="en-US" dirty="0">
+              <a:latin typeface="Palatino Linotype" panose="02040502050505030304" pitchFamily="18" charset="0"/>
+              <a:cs typeface="Segoe UI" panose="020B0502040204020203" pitchFamily="34" charset="0"/>
+            </a:endParaRPr>
+          </a:p>
+          <a:p>
+            <a:endParaRPr lang="en-US" dirty="0">
+              <a:latin typeface="Palatino Linotype" panose="02040502050505030304" pitchFamily="18" charset="0"/>
+              <a:cs typeface="Segoe UI" panose="020B0502040204020203" pitchFamily="34" charset="0"/>
+            </a:endParaRPr>
+          </a:p>
+          <a:p>
+            <a:endParaRPr lang="en-US" dirty="0">
+              <a:latin typeface="Palatino Linotype" panose="02040502050505030304" pitchFamily="18" charset="0"/>
+              <a:cs typeface="Segoe UI" panose="020B0502040204020203" pitchFamily="34" charset="0"/>
+            </a:endParaRPr>
+          </a:p>
+          <a:p>
+            <a:endParaRPr lang="en-US" dirty="0">
+              <a:latin typeface="Palatino Linotype" panose="02040502050505030304" pitchFamily="18" charset="0"/>
+              <a:cs typeface="Segoe UI" panose="020B0502040204020203" pitchFamily="34" charset="0"/>
+            </a:endParaRPr>
+          </a:p>
+          <a:p>
+            <a:endParaRPr lang="en-US" dirty="0">
+              <a:latin typeface="Palatino Linotype" panose="02040502050505030304" pitchFamily="18" charset="0"/>
+              <a:cs typeface="Segoe UI" panose="020B0502040204020203" pitchFamily="34" charset="0"/>
+            </a:endParaRPr>
+          </a:p>
+        </p:txBody>
+      </p:sp>
       <p:pic>
         <p:nvPicPr>
-          <p:cNvPr id="3" name="Picture 2">
+          <p:cNvPr id="4" name="Picture 3">
             <a:extLst>
               <a:ext uri="{FF2B5EF4-FFF2-40B4-BE49-F238E27FC236}">
-                <a16:creationId xmlns:a16="http://schemas.microsoft.com/office/drawing/2014/main" id="{239D0A82-7D34-4E48-BE20-B982B3990537}"/>
+                <a16:creationId xmlns:a16="http://schemas.microsoft.com/office/drawing/2014/main" id="{BF227EC8-F25E-46CD-8CAE-24E18DBDE5CC}"/>
               </a:ext>
             </a:extLst>
           </p:cNvPr>
@@ -9398,72 +9366,18 @@
         </p:blipFill>
         <p:spPr>
           <a:xfrm>
-            <a:off x="0" y="324192"/>
-            <a:ext cx="3233668" cy="840754"/>
+            <a:off x="0" y="365760"/>
+            <a:ext cx="3233668" cy="805144"/>
           </a:xfrm>
           <a:prstGeom prst="rect">
             <a:avLst/>
           </a:prstGeom>
         </p:spPr>
       </p:pic>
-      <p:sp>
-        <p:nvSpPr>
-          <p:cNvPr id="8" name="Title 1">
-            <a:extLst>
-              <a:ext uri="{FF2B5EF4-FFF2-40B4-BE49-F238E27FC236}">
-                <a16:creationId xmlns:a16="http://schemas.microsoft.com/office/drawing/2014/main" id="{6F128DD7-C643-44B7-803E-11F67E24E0DE}"/>
-              </a:ext>
-            </a:extLst>
-          </p:cNvPr>
-          <p:cNvSpPr>
-            <a:spLocks noGrp="1"/>
-          </p:cNvSpPr>
-          <p:nvPr>
-            <p:ph type="title"/>
-          </p:nvPr>
-        </p:nvSpPr>
-        <p:spPr>
-          <a:xfrm>
-            <a:off x="0" y="2957422"/>
-            <a:ext cx="12192000" cy="685982"/>
-          </a:xfrm>
-          <a:noFill/>
-        </p:spPr>
-        <p:txBody>
-          <a:bodyPr>
-            <a:noAutofit/>
-          </a:bodyPr>
-          <a:lstStyle/>
-          <a:p>
-            <a:r>
-              <a:rPr lang="en-US" sz="3600" dirty="0">
-                <a:solidFill>
-                  <a:schemeClr val="tx1">
-                    <a:lumMod val="65000"/>
-                    <a:lumOff val="35000"/>
-                  </a:schemeClr>
-                </a:solidFill>
-                <a:latin typeface="Palatino Linotype" panose="02040502050505030304" pitchFamily="18" charset="0"/>
-              </a:rPr>
-              <a:t>	2.02 (Perceptron as Binary Classifier)</a:t>
-            </a:r>
-            <a:endParaRPr lang="en-US" sz="3600" dirty="0">
-              <a:solidFill>
-                <a:schemeClr val="tx1">
-                  <a:lumMod val="65000"/>
-                  <a:lumOff val="35000"/>
-                </a:schemeClr>
-              </a:solidFill>
-              <a:latin typeface="Palatino Linotype" panose="02040502050505030304" pitchFamily="18" charset="0"/>
-              <a:cs typeface="Segoe UI Light" panose="020B0502040204020203" pitchFamily="34" charset="0"/>
-            </a:endParaRPr>
-          </a:p>
-        </p:txBody>
-      </p:sp>
     </p:spTree>
     <p:extLst>
       <p:ext uri="{BB962C8B-B14F-4D97-AF65-F5344CB8AC3E}">
-        <p14:creationId xmlns:p14="http://schemas.microsoft.com/office/powerpoint/2010/main" val="994788979"/>
+        <p14:creationId xmlns:p14="http://schemas.microsoft.com/office/powerpoint/2010/main" val="4096204018"/>
       </p:ext>
     </p:extLst>
   </p:cSld>
@@ -11139,10 +11053,10 @@
       </p:grpSpPr>
       <p:sp>
         <p:nvSpPr>
-          <p:cNvPr id="26" name="TextBox 25">
+          <p:cNvPr id="4" name="TextBox 3">
             <a:extLst>
               <a:ext uri="{FF2B5EF4-FFF2-40B4-BE49-F238E27FC236}">
-                <a16:creationId xmlns:a16="http://schemas.microsoft.com/office/drawing/2014/main" id="{C53A25A6-F70B-4315-9230-0220EC84A470}"/>
+                <a16:creationId xmlns:a16="http://schemas.microsoft.com/office/drawing/2014/main" id="{0B25E44E-8C42-4246-94DF-CC612E8605BA}"/>
               </a:ext>
             </a:extLst>
           </p:cNvPr>
@@ -11176,10 +11090,13 @@
                 <a:latin typeface="+mj-lt"/>
                 <a:ea typeface="Verdana" panose="020B0604030504040204" pitchFamily="34" charset="0"/>
               </a:rPr>
-              <a:t>Source: Glassner, A. (2021). </a:t>
-            </a:r>
-            <a:r>
-              <a:rPr lang="en-US" sz="1400" i="1" dirty="0">
+              <a:t>Image Credit: </a:t>
+            </a:r>
+            <a:r>
+              <a:rPr lang="en-US" sz="1400" b="0" i="0" u="none" strike="noStrike" kern="1200" cap="none" dirty="0">
+                <a:ln>
+                  <a:noFill/>
+                </a:ln>
                 <a:solidFill>
                   <a:schemeClr val="tx1">
                     <a:lumMod val="65000"/>
@@ -11187,36 +11104,10 @@
                   </a:schemeClr>
                 </a:solidFill>
                 <a:latin typeface="+mj-lt"/>
-                <a:ea typeface="Verdana" panose="020B0604030504040204" pitchFamily="34" charset="0"/>
-              </a:rPr>
-              <a:t>Deep learning: A visual approach</a:t>
-            </a:r>
-            <a:r>
-              <a:rPr lang="en-US" sz="1400" dirty="0">
-                <a:solidFill>
-                  <a:schemeClr val="tx1">
-                    <a:lumMod val="65000"/>
-                    <a:lumOff val="35000"/>
-                  </a:schemeClr>
-                </a:solidFill>
-                <a:latin typeface="+mj-lt"/>
-                <a:ea typeface="Verdana" panose="020B0604030504040204" pitchFamily="34" charset="0"/>
-              </a:rPr>
-              <a:t>. </a:t>
-            </a:r>
-            <a:r>
-              <a:rPr lang="en-US" sz="1400" b="0" i="0" dirty="0">
-                <a:solidFill>
-                  <a:schemeClr val="tx1">
-                    <a:lumMod val="65000"/>
-                    <a:lumOff val="35000"/>
-                  </a:schemeClr>
-                </a:solidFill>
-                <a:effectLst/>
-                <a:latin typeface="+mj-lt"/>
-                <a:ea typeface="Verdana" panose="020B0604030504040204" pitchFamily="34" charset="0"/>
-              </a:rPr>
-              <a:t>San Francisco, CA: No Starch Press. (Chapter 13)</a:t>
+                <a:ea typeface="Arial" pitchFamily="34"/>
+                <a:cs typeface="Arial" pitchFamily="34"/>
+              </a:rPr>
+              <a:t>https://sugargeekshow.com/recipe/rainbow-cake/</a:t>
             </a:r>
             <a:endParaRPr lang="en-US" sz="1400" dirty="0">
               <a:solidFill>
@@ -11233,10 +11124,10 @@
       </p:sp>
       <p:pic>
         <p:nvPicPr>
-          <p:cNvPr id="3" name="Picture 2" descr="A picture containing diagram&#10;&#10;Description automatically generated">
+          <p:cNvPr id="5" name="Picture 4" descr="A picture containing cake, fabric&#10;&#10;Description automatically generated">
             <a:extLst>
               <a:ext uri="{FF2B5EF4-FFF2-40B4-BE49-F238E27FC236}">
-                <a16:creationId xmlns:a16="http://schemas.microsoft.com/office/drawing/2014/main" id="{0FC5C259-97A3-4400-A831-7D1728FF5396}"/>
+                <a16:creationId xmlns:a16="http://schemas.microsoft.com/office/drawing/2014/main" id="{29D2698F-7604-4D1A-83E8-BD2126AD16DF}"/>
               </a:ext>
             </a:extLst>
           </p:cNvPr>
@@ -11258,19 +11149,254 @@
           </a:stretch>
         </p:blipFill>
         <p:spPr>
-          <a:xfrm>
-            <a:off x="3987126" y="1969953"/>
-            <a:ext cx="4217748" cy="2918094"/>
+          <a:xfrm rot="16200000">
+            <a:off x="2747185" y="1670463"/>
+            <a:ext cx="2030506" cy="3688062"/>
           </a:xfrm>
           <a:prstGeom prst="rect">
             <a:avLst/>
           </a:prstGeom>
+          <a:ln w="3175">
+            <a:solidFill>
+              <a:schemeClr val="tx1">
+                <a:lumMod val="65000"/>
+                <a:lumOff val="35000"/>
+              </a:schemeClr>
+            </a:solidFill>
+          </a:ln>
+          <a:effectLst>
+            <a:outerShdw blurRad="50800" dist="38100" dir="2700000" algn="tl" rotWithShape="0">
+              <a:prstClr val="black">
+                <a:alpha val="40000"/>
+              </a:prstClr>
+            </a:outerShdw>
+          </a:effectLst>
         </p:spPr>
       </p:pic>
+      <p:pic>
+        <p:nvPicPr>
+          <p:cNvPr id="7" name="Picture 6" descr="A picture containing cake, fabric&#10;&#10;Description automatically generated">
+            <a:extLst>
+              <a:ext uri="{FF2B5EF4-FFF2-40B4-BE49-F238E27FC236}">
+                <a16:creationId xmlns:a16="http://schemas.microsoft.com/office/drawing/2014/main" id="{14A5ED6A-F513-47FA-A7CD-DC60B01D9114}"/>
+              </a:ext>
+            </a:extLst>
+          </p:cNvPr>
+          <p:cNvPicPr>
+            <a:picLocks noChangeAspect="1"/>
+          </p:cNvPicPr>
+          <p:nvPr/>
+        </p:nvPicPr>
+        <p:blipFill>
+          <a:blip r:embed="rId3">
+            <a:extLst>
+              <a:ext uri="{28A0092B-C50C-407E-A947-70E740481C1C}">
+                <a14:useLocalDpi xmlns:a14="http://schemas.microsoft.com/office/drawing/2010/main" val="0"/>
+              </a:ext>
+            </a:extLst>
+          </a:blip>
+          <a:stretch>
+            <a:fillRect/>
+          </a:stretch>
+        </p:blipFill>
+        <p:spPr>
+          <a:xfrm>
+            <a:off x="7324440" y="1670463"/>
+            <a:ext cx="2030506" cy="3688062"/>
+          </a:xfrm>
+          <a:prstGeom prst="rect">
+            <a:avLst/>
+          </a:prstGeom>
+          <a:ln w="3175">
+            <a:solidFill>
+              <a:schemeClr val="tx1">
+                <a:lumMod val="75000"/>
+                <a:lumOff val="25000"/>
+              </a:schemeClr>
+            </a:solidFill>
+          </a:ln>
+          <a:effectLst>
+            <a:outerShdw blurRad="50800" dist="38100" dir="2700000" algn="tl" rotWithShape="0">
+              <a:prstClr val="black">
+                <a:alpha val="40000"/>
+              </a:prstClr>
+            </a:outerShdw>
+          </a:effectLst>
+        </p:spPr>
+      </p:pic>
+      <p:cxnSp>
+        <p:nvCxnSpPr>
+          <p:cNvPr id="8" name="Straight Connector 7">
+            <a:extLst>
+              <a:ext uri="{FF2B5EF4-FFF2-40B4-BE49-F238E27FC236}">
+                <a16:creationId xmlns:a16="http://schemas.microsoft.com/office/drawing/2014/main" id="{99562EC8-0C82-47CB-808E-87B2275F84E6}"/>
+              </a:ext>
+            </a:extLst>
+          </p:cNvPr>
+          <p:cNvCxnSpPr>
+            <a:cxnSpLocks/>
+          </p:cNvCxnSpPr>
+          <p:nvPr/>
+        </p:nvCxnSpPr>
+        <p:spPr>
+          <a:xfrm>
+            <a:off x="9629775" y="1670463"/>
+            <a:ext cx="0" cy="3688062"/>
+          </a:xfrm>
+          <a:prstGeom prst="line">
+            <a:avLst/>
+          </a:prstGeom>
+          <a:ln>
+            <a:solidFill>
+              <a:schemeClr val="tx1">
+                <a:lumMod val="50000"/>
+                <a:lumOff val="50000"/>
+              </a:schemeClr>
+            </a:solidFill>
+            <a:tailEnd type="triangle" w="lg" len="lg"/>
+          </a:ln>
+        </p:spPr>
+        <p:style>
+          <a:lnRef idx="1">
+            <a:schemeClr val="accent1"/>
+          </a:lnRef>
+          <a:fillRef idx="0">
+            <a:schemeClr val="accent1"/>
+          </a:fillRef>
+          <a:effectRef idx="0">
+            <a:schemeClr val="accent1"/>
+          </a:effectRef>
+          <a:fontRef idx="minor">
+            <a:schemeClr val="tx1"/>
+          </a:fontRef>
+        </p:style>
+      </p:cxnSp>
+      <p:cxnSp>
+        <p:nvCxnSpPr>
+          <p:cNvPr id="11" name="Straight Connector 10">
+            <a:extLst>
+              <a:ext uri="{FF2B5EF4-FFF2-40B4-BE49-F238E27FC236}">
+                <a16:creationId xmlns:a16="http://schemas.microsoft.com/office/drawing/2014/main" id="{3490718E-A854-4870-8D07-8A4530F52B51}"/>
+              </a:ext>
+            </a:extLst>
+          </p:cNvPr>
+          <p:cNvCxnSpPr>
+            <a:cxnSpLocks/>
+          </p:cNvCxnSpPr>
+          <p:nvPr/>
+        </p:nvCxnSpPr>
+        <p:spPr>
+          <a:xfrm>
+            <a:off x="1918406" y="4879202"/>
+            <a:ext cx="3688063" cy="0"/>
+          </a:xfrm>
+          <a:prstGeom prst="line">
+            <a:avLst/>
+          </a:prstGeom>
+          <a:ln>
+            <a:solidFill>
+              <a:schemeClr val="tx1">
+                <a:lumMod val="50000"/>
+                <a:lumOff val="50000"/>
+              </a:schemeClr>
+            </a:solidFill>
+            <a:headEnd type="triangle" w="lg" len="lg"/>
+            <a:tailEnd type="triangle" w="lg" len="lg"/>
+          </a:ln>
+        </p:spPr>
+        <p:style>
+          <a:lnRef idx="1">
+            <a:schemeClr val="accent1"/>
+          </a:lnRef>
+          <a:fillRef idx="0">
+            <a:schemeClr val="accent1"/>
+          </a:fillRef>
+          <a:effectRef idx="0">
+            <a:schemeClr val="accent1"/>
+          </a:effectRef>
+          <a:fontRef idx="minor">
+            <a:schemeClr val="tx1"/>
+          </a:fontRef>
+        </p:style>
+      </p:cxnSp>
+      <p:sp>
+        <p:nvSpPr>
+          <p:cNvPr id="13" name="TextBox 12">
+            <a:extLst>
+              <a:ext uri="{FF2B5EF4-FFF2-40B4-BE49-F238E27FC236}">
+                <a16:creationId xmlns:a16="http://schemas.microsoft.com/office/drawing/2014/main" id="{FFE13E73-80CD-4604-95BF-312C9AEBF20A}"/>
+              </a:ext>
+            </a:extLst>
+          </p:cNvPr>
+          <p:cNvSpPr txBox="1"/>
+          <p:nvPr/>
+        </p:nvSpPr>
+        <p:spPr>
+          <a:xfrm>
+            <a:off x="9880600" y="3467100"/>
+            <a:ext cx="679994" cy="369332"/>
+          </a:xfrm>
+          <a:prstGeom prst="rect">
+            <a:avLst/>
+          </a:prstGeom>
+          <a:noFill/>
+        </p:spPr>
+        <p:txBody>
+          <a:bodyPr wrap="none" rtlCol="0">
+            <a:spAutoFit/>
+          </a:bodyPr>
+          <a:lstStyle/>
+          <a:p>
+            <a:r>
+              <a:rPr lang="en-US" dirty="0">
+                <a:latin typeface="Garamond" panose="02020404030301010803" pitchFamily="18" charset="0"/>
+              </a:rPr>
+              <a:t>Deep</a:t>
+            </a:r>
+          </a:p>
+        </p:txBody>
+      </p:sp>
+      <p:sp>
+        <p:nvSpPr>
+          <p:cNvPr id="15" name="TextBox 14">
+            <a:extLst>
+              <a:ext uri="{FF2B5EF4-FFF2-40B4-BE49-F238E27FC236}">
+                <a16:creationId xmlns:a16="http://schemas.microsoft.com/office/drawing/2014/main" id="{274D1E66-A7EB-4ED0-8889-069DD8D9FA81}"/>
+              </a:ext>
+            </a:extLst>
+          </p:cNvPr>
+          <p:cNvSpPr txBox="1"/>
+          <p:nvPr/>
+        </p:nvSpPr>
+        <p:spPr>
+          <a:xfrm>
+            <a:off x="3436065" y="5011615"/>
+            <a:ext cx="652743" cy="369332"/>
+          </a:xfrm>
+          <a:prstGeom prst="rect">
+            <a:avLst/>
+          </a:prstGeom>
+          <a:noFill/>
+        </p:spPr>
+        <p:txBody>
+          <a:bodyPr wrap="none" rtlCol="0">
+            <a:spAutoFit/>
+          </a:bodyPr>
+          <a:lstStyle/>
+          <a:p>
+            <a:r>
+              <a:rPr lang="en-US" dirty="0">
+                <a:latin typeface="Garamond" panose="02020404030301010803" pitchFamily="18" charset="0"/>
+              </a:rPr>
+              <a:t>Wide</a:t>
+            </a:r>
+          </a:p>
+        </p:txBody>
+      </p:sp>
     </p:spTree>
     <p:extLst>
       <p:ext uri="{BB962C8B-B14F-4D97-AF65-F5344CB8AC3E}">
-        <p14:creationId xmlns:p14="http://schemas.microsoft.com/office/powerpoint/2010/main" val="2014009550"/>
+        <p14:creationId xmlns:p14="http://schemas.microsoft.com/office/powerpoint/2010/main" val="888845023"/>
       </p:ext>
     </p:extLst>
   </p:cSld>

</xml_diff>

<commit_message>
Updated exercise slides with new Jupyter notebook names.
</commit_message>
<xml_diff>
--- a/presentations/02.1_neural_anatomy.pptx
+++ b/presentations/02.1_neural_anatomy.pptx
@@ -223,7 +223,7 @@
           <a:p>
             <a:fld id="{FD93C9B2-20F6-4DB1-B471-224337D0AC79}" type="datetimeFigureOut">
               <a:rPr lang="en-US" smtClean="0"/>
-              <a:t>3/28/2022</a:t>
+              <a:t>4/5/2022</a:t>
             </a:fld>
             <a:endParaRPr lang="en-US"/>
           </a:p>
@@ -4052,7 +4052,7 @@
           <a:p>
             <a:fld id="{C3F78080-8D0A-4BE8-A5B4-CB115102D524}" type="datetimeFigureOut">
               <a:rPr lang="en-US" smtClean="0"/>
-              <a:t>3/28/2022</a:t>
+              <a:t>4/5/2022</a:t>
             </a:fld>
             <a:endParaRPr lang="en-US"/>
           </a:p>
@@ -4250,7 +4250,7 @@
           <a:p>
             <a:fld id="{C3F78080-8D0A-4BE8-A5B4-CB115102D524}" type="datetimeFigureOut">
               <a:rPr lang="en-US" smtClean="0"/>
-              <a:t>3/28/2022</a:t>
+              <a:t>4/5/2022</a:t>
             </a:fld>
             <a:endParaRPr lang="en-US"/>
           </a:p>
@@ -4458,7 +4458,7 @@
           <a:p>
             <a:fld id="{C3F78080-8D0A-4BE8-A5B4-CB115102D524}" type="datetimeFigureOut">
               <a:rPr lang="en-US" smtClean="0"/>
-              <a:t>3/28/2022</a:t>
+              <a:t>4/5/2022</a:t>
             </a:fld>
             <a:endParaRPr lang="en-US"/>
           </a:p>
@@ -4656,7 +4656,7 @@
           <a:p>
             <a:fld id="{C3F78080-8D0A-4BE8-A5B4-CB115102D524}" type="datetimeFigureOut">
               <a:rPr lang="en-US" smtClean="0"/>
-              <a:t>3/28/2022</a:t>
+              <a:t>4/5/2022</a:t>
             </a:fld>
             <a:endParaRPr lang="en-US"/>
           </a:p>
@@ -4931,7 +4931,7 @@
           <a:p>
             <a:fld id="{C3F78080-8D0A-4BE8-A5B4-CB115102D524}" type="datetimeFigureOut">
               <a:rPr lang="en-US" smtClean="0"/>
-              <a:t>3/28/2022</a:t>
+              <a:t>4/5/2022</a:t>
             </a:fld>
             <a:endParaRPr lang="en-US"/>
           </a:p>
@@ -5196,7 +5196,7 @@
           <a:p>
             <a:fld id="{C3F78080-8D0A-4BE8-A5B4-CB115102D524}" type="datetimeFigureOut">
               <a:rPr lang="en-US" smtClean="0"/>
-              <a:t>3/28/2022</a:t>
+              <a:t>4/5/2022</a:t>
             </a:fld>
             <a:endParaRPr lang="en-US"/>
           </a:p>
@@ -5608,7 +5608,7 @@
           <a:p>
             <a:fld id="{C3F78080-8D0A-4BE8-A5B4-CB115102D524}" type="datetimeFigureOut">
               <a:rPr lang="en-US" smtClean="0"/>
-              <a:t>3/28/2022</a:t>
+              <a:t>4/5/2022</a:t>
             </a:fld>
             <a:endParaRPr lang="en-US"/>
           </a:p>
@@ -5749,7 +5749,7 @@
           <a:p>
             <a:fld id="{C3F78080-8D0A-4BE8-A5B4-CB115102D524}" type="datetimeFigureOut">
               <a:rPr lang="en-US" smtClean="0"/>
-              <a:t>3/28/2022</a:t>
+              <a:t>4/5/2022</a:t>
             </a:fld>
             <a:endParaRPr lang="en-US"/>
           </a:p>
@@ -5862,7 +5862,7 @@
           <a:p>
             <a:fld id="{C3F78080-8D0A-4BE8-A5B4-CB115102D524}" type="datetimeFigureOut">
               <a:rPr lang="en-US" smtClean="0"/>
-              <a:t>3/28/2022</a:t>
+              <a:t>4/5/2022</a:t>
             </a:fld>
             <a:endParaRPr lang="en-US"/>
           </a:p>
@@ -6173,7 +6173,7 @@
           <a:p>
             <a:fld id="{C3F78080-8D0A-4BE8-A5B4-CB115102D524}" type="datetimeFigureOut">
               <a:rPr lang="en-US" smtClean="0"/>
-              <a:t>3/28/2022</a:t>
+              <a:t>4/5/2022</a:t>
             </a:fld>
             <a:endParaRPr lang="en-US"/>
           </a:p>
@@ -6461,7 +6461,7 @@
           <a:p>
             <a:fld id="{C3F78080-8D0A-4BE8-A5B4-CB115102D524}" type="datetimeFigureOut">
               <a:rPr lang="en-US" smtClean="0"/>
-              <a:t>3/28/2022</a:t>
+              <a:t>4/5/2022</a:t>
             </a:fld>
             <a:endParaRPr lang="en-US"/>
           </a:p>
@@ -6702,7 +6702,7 @@
           <a:p>
             <a:fld id="{C3F78080-8D0A-4BE8-A5B4-CB115102D524}" type="datetimeFigureOut">
               <a:rPr lang="en-US" smtClean="0"/>
-              <a:t>3/28/2022</a:t>
+              <a:t>4/5/2022</a:t>
             </a:fld>
             <a:endParaRPr lang="en-US"/>
           </a:p>
@@ -7547,7 +7547,7 @@
           <a:graphicData uri="http://schemas.openxmlformats.org/presentationml/2006/ole">
             <mc:AlternateContent xmlns:mc="http://schemas.openxmlformats.org/markup-compatibility/2006">
               <mc:Choice xmlns:v="urn:schemas-microsoft-com:vml" Requires="v">
-                <p:oleObj spid="_x0000_s1102" name="Visio" r:id="rId8" imgW="2514945" imgH="1657350" progId="Visio.Drawing.15">
+                <p:oleObj spid="_x0000_s1105" name="Visio" r:id="rId8" imgW="2514945" imgH="1657350" progId="Visio.Drawing.15">
                   <p:embed/>
                 </p:oleObj>
               </mc:Choice>
@@ -9144,149 +9144,6 @@
       </p:grpSpPr>
       <p:sp>
         <p:nvSpPr>
-          <p:cNvPr id="2" name="Title 1">
-            <a:extLst>
-              <a:ext uri="{FF2B5EF4-FFF2-40B4-BE49-F238E27FC236}">
-                <a16:creationId xmlns:a16="http://schemas.microsoft.com/office/drawing/2014/main" id="{0F853981-B13F-4917-804F-EBF0D4819E7E}"/>
-              </a:ext>
-            </a:extLst>
-          </p:cNvPr>
-          <p:cNvSpPr>
-            <a:spLocks noGrp="1"/>
-          </p:cNvSpPr>
-          <p:nvPr>
-            <p:ph type="title"/>
-          </p:nvPr>
-        </p:nvSpPr>
-        <p:spPr>
-          <a:xfrm>
-            <a:off x="0" y="3099643"/>
-            <a:ext cx="12192000" cy="805143"/>
-          </a:xfrm>
-          <a:noFill/>
-        </p:spPr>
-        <p:txBody>
-          <a:bodyPr>
-            <a:noAutofit/>
-          </a:bodyPr>
-          <a:lstStyle/>
-          <a:p>
-            <a:pPr algn="ctr"/>
-            <a:br>
-              <a:rPr lang="en-US" sz="3600" dirty="0">
-                <a:solidFill>
-                  <a:schemeClr val="tx1">
-                    <a:lumMod val="65000"/>
-                    <a:lumOff val="35000"/>
-                  </a:schemeClr>
-                </a:solidFill>
-                <a:latin typeface="Palatino Linotype" panose="02040502050505030304" pitchFamily="18" charset="0"/>
-              </a:rPr>
-            </a:br>
-            <a:br>
-              <a:rPr lang="en-US" sz="3600" dirty="0">
-                <a:solidFill>
-                  <a:schemeClr val="tx1">
-                    <a:lumMod val="65000"/>
-                    <a:lumOff val="35000"/>
-                  </a:schemeClr>
-                </a:solidFill>
-                <a:latin typeface="Palatino Linotype" panose="02040502050505030304" pitchFamily="18" charset="0"/>
-              </a:rPr>
-            </a:br>
-            <a:br>
-              <a:rPr lang="en-US" sz="3600" dirty="0">
-                <a:solidFill>
-                  <a:schemeClr val="tx1">
-                    <a:lumMod val="65000"/>
-                    <a:lumOff val="35000"/>
-                  </a:schemeClr>
-                </a:solidFill>
-                <a:latin typeface="Palatino Linotype" panose="02040502050505030304" pitchFamily="18" charset="0"/>
-              </a:rPr>
-            </a:br>
-            <a:br>
-              <a:rPr lang="en-US" sz="3600" dirty="0">
-                <a:solidFill>
-                  <a:schemeClr val="tx1">
-                    <a:lumMod val="65000"/>
-                    <a:lumOff val="35000"/>
-                  </a:schemeClr>
-                </a:solidFill>
-                <a:latin typeface="Palatino Linotype" panose="02040502050505030304" pitchFamily="18" charset="0"/>
-              </a:rPr>
-            </a:br>
-            <a:br>
-              <a:rPr lang="en-US" sz="3600" dirty="0">
-                <a:solidFill>
-                  <a:schemeClr val="tx1">
-                    <a:lumMod val="65000"/>
-                    <a:lumOff val="35000"/>
-                  </a:schemeClr>
-                </a:solidFill>
-                <a:latin typeface="Palatino Linotype" panose="02040502050505030304" pitchFamily="18" charset="0"/>
-              </a:rPr>
-            </a:br>
-            <a:br>
-              <a:rPr lang="en-US" sz="3600" dirty="0">
-                <a:solidFill>
-                  <a:schemeClr val="tx1">
-                    <a:lumMod val="65000"/>
-                    <a:lumOff val="35000"/>
-                  </a:schemeClr>
-                </a:solidFill>
-                <a:latin typeface="Palatino Linotype" panose="02040502050505030304" pitchFamily="18" charset="0"/>
-              </a:rPr>
-            </a:br>
-            <a:br>
-              <a:rPr lang="en-US" sz="3600" dirty="0">
-                <a:solidFill>
-                  <a:schemeClr val="tx1">
-                    <a:lumMod val="65000"/>
-                    <a:lumOff val="35000"/>
-                  </a:schemeClr>
-                </a:solidFill>
-                <a:latin typeface="Palatino Linotype" panose="02040502050505030304" pitchFamily="18" charset="0"/>
-              </a:rPr>
-            </a:br>
-            <a:br>
-              <a:rPr lang="en-US" sz="3600" dirty="0">
-                <a:solidFill>
-                  <a:schemeClr val="tx1">
-                    <a:lumMod val="65000"/>
-                    <a:lumOff val="35000"/>
-                  </a:schemeClr>
-                </a:solidFill>
-                <a:latin typeface="Palatino Linotype" panose="02040502050505030304" pitchFamily="18" charset="0"/>
-              </a:rPr>
-            </a:br>
-            <a:r>
-              <a:rPr lang="en-US" sz="3600" dirty="0">
-                <a:solidFill>
-                  <a:schemeClr val="tx1">
-                    <a:lumMod val="65000"/>
-                    <a:lumOff val="35000"/>
-                  </a:schemeClr>
-                </a:solidFill>
-                <a:latin typeface="Palatino Linotype" panose="02040502050505030304" pitchFamily="18" charset="0"/>
-              </a:rPr>
-              <a:t>     2.01 (Perceptron Implementation)</a:t>
-            </a:r>
-            <a:endParaRPr lang="en-US" sz="3600" dirty="0">
-              <a:solidFill>
-                <a:schemeClr val="tx1">
-                  <a:lumMod val="65000"/>
-                  <a:lumOff val="35000"/>
-                </a:schemeClr>
-              </a:solidFill>
-              <a:latin typeface="Palatino Linotype" panose="02040502050505030304" pitchFamily="18" charset="0"/>
-              <a:cs typeface="Segoe UI Light" panose="020B0502040204020203" pitchFamily="34" charset="0"/>
-            </a:endParaRPr>
-          </a:p>
-        </p:txBody>
-      </p:sp>
-      <p:sp>
-        <p:nvSpPr>
           <p:cNvPr id="3" name="Text Placeholder 2">
             <a:extLst>
               <a:ext uri="{FF2B5EF4-FFF2-40B4-BE49-F238E27FC236}">
@@ -9374,6 +9231,206 @@
           </a:prstGeom>
         </p:spPr>
       </p:pic>
+      <p:sp>
+        <p:nvSpPr>
+          <p:cNvPr id="7" name="Title 1">
+            <a:extLst>
+              <a:ext uri="{FF2B5EF4-FFF2-40B4-BE49-F238E27FC236}">
+                <a16:creationId xmlns:a16="http://schemas.microsoft.com/office/drawing/2014/main" id="{E6A37720-E754-4A7F-B066-206AB0275CF9}"/>
+              </a:ext>
+            </a:extLst>
+          </p:cNvPr>
+          <p:cNvSpPr txBox="1">
+            <a:spLocks/>
+          </p:cNvSpPr>
+          <p:nvPr/>
+        </p:nvSpPr>
+        <p:spPr>
+          <a:xfrm>
+            <a:off x="0" y="2883665"/>
+            <a:ext cx="12192000" cy="1090669"/>
+          </a:xfrm>
+          <a:prstGeom prst="rect">
+            <a:avLst/>
+          </a:prstGeom>
+          <a:noFill/>
+        </p:spPr>
+        <p:txBody>
+          <a:bodyPr vert="horz" lIns="91440" tIns="45720" rIns="91440" bIns="45720" rtlCol="0" anchor="b">
+            <a:noAutofit/>
+          </a:bodyPr>
+          <a:lstStyle>
+            <a:lvl1pPr algn="l" defTabSz="914400" rtl="0" eaLnBrk="1" latinLnBrk="0" hangingPunct="1">
+              <a:lnSpc>
+                <a:spcPct val="90000"/>
+              </a:lnSpc>
+              <a:spcBef>
+                <a:spcPct val="0"/>
+              </a:spcBef>
+              <a:buNone/>
+              <a:defRPr sz="6000" kern="1200">
+                <a:solidFill>
+                  <a:schemeClr val="tx1"/>
+                </a:solidFill>
+                <a:latin typeface="+mj-lt"/>
+                <a:ea typeface="+mj-ea"/>
+                <a:cs typeface="+mj-cs"/>
+              </a:defRPr>
+            </a:lvl1pPr>
+          </a:lstStyle>
+          <a:p>
+            <a:pPr algn="ctr"/>
+            <a:br>
+              <a:rPr lang="en-US" sz="3600" dirty="0">
+                <a:solidFill>
+                  <a:schemeClr val="tx1">
+                    <a:lumMod val="65000"/>
+                    <a:lumOff val="35000"/>
+                  </a:schemeClr>
+                </a:solidFill>
+              </a:rPr>
+            </a:br>
+            <a:br>
+              <a:rPr lang="en-US" sz="3600" dirty="0">
+                <a:solidFill>
+                  <a:schemeClr val="tx1">
+                    <a:lumMod val="65000"/>
+                    <a:lumOff val="35000"/>
+                  </a:schemeClr>
+                </a:solidFill>
+              </a:rPr>
+            </a:br>
+            <a:br>
+              <a:rPr lang="en-US" sz="3600" dirty="0">
+                <a:solidFill>
+                  <a:schemeClr val="tx1">
+                    <a:lumMod val="65000"/>
+                    <a:lumOff val="35000"/>
+                  </a:schemeClr>
+                </a:solidFill>
+              </a:rPr>
+            </a:br>
+            <a:br>
+              <a:rPr lang="en-US" sz="3600" dirty="0">
+                <a:solidFill>
+                  <a:schemeClr val="tx1">
+                    <a:lumMod val="65000"/>
+                    <a:lumOff val="35000"/>
+                  </a:schemeClr>
+                </a:solidFill>
+              </a:rPr>
+            </a:br>
+            <a:br>
+              <a:rPr lang="en-US" sz="3600" dirty="0">
+                <a:solidFill>
+                  <a:schemeClr val="tx1">
+                    <a:lumMod val="65000"/>
+                    <a:lumOff val="35000"/>
+                  </a:schemeClr>
+                </a:solidFill>
+              </a:rPr>
+            </a:br>
+            <a:br>
+              <a:rPr lang="en-US" sz="3600" dirty="0">
+                <a:solidFill>
+                  <a:schemeClr val="tx1">
+                    <a:lumMod val="65000"/>
+                    <a:lumOff val="35000"/>
+                  </a:schemeClr>
+                </a:solidFill>
+              </a:rPr>
+            </a:br>
+            <a:br>
+              <a:rPr lang="en-US" sz="3600" dirty="0">
+                <a:solidFill>
+                  <a:schemeClr val="tx1">
+                    <a:lumMod val="65000"/>
+                    <a:lumOff val="35000"/>
+                  </a:schemeClr>
+                </a:solidFill>
+              </a:rPr>
+            </a:br>
+            <a:br>
+              <a:rPr lang="en-US" sz="3600" dirty="0">
+                <a:solidFill>
+                  <a:schemeClr val="tx1">
+                    <a:lumMod val="65000"/>
+                    <a:lumOff val="35000"/>
+                  </a:schemeClr>
+                </a:solidFill>
+              </a:rPr>
+            </a:br>
+            <a:r>
+              <a:rPr lang="en-US" sz="3600" dirty="0">
+                <a:solidFill>
+                  <a:schemeClr val="tx1">
+                    <a:lumMod val="65000"/>
+                    <a:lumOff val="35000"/>
+                  </a:schemeClr>
+                </a:solidFill>
+              </a:rPr>
+              <a:t>     </a:t>
+            </a:r>
+            <a:r>
+              <a:rPr lang="en-US" sz="3600" dirty="0">
+                <a:solidFill>
+                  <a:schemeClr val="tx1">
+                    <a:lumMod val="65000"/>
+                    <a:lumOff val="35000"/>
+                  </a:schemeClr>
+                </a:solidFill>
+                <a:latin typeface="Palatino Linotype" panose="02040502050505030304" pitchFamily="18" charset="0"/>
+              </a:rPr>
+              <a:t>(Rosenblatt’s Perceptron)</a:t>
+            </a:r>
+            <a:br>
+              <a:rPr lang="en-US" sz="3600" dirty="0">
+                <a:solidFill>
+                  <a:schemeClr val="tx1">
+                    <a:lumMod val="65000"/>
+                    <a:lumOff val="35000"/>
+                  </a:schemeClr>
+                </a:solidFill>
+                <a:latin typeface="Palatino Linotype" panose="02040502050505030304" pitchFamily="18" charset="0"/>
+              </a:rPr>
+            </a:br>
+            <a:r>
+              <a:rPr lang="en-US" sz="3600" dirty="0">
+                <a:solidFill>
+                  <a:schemeClr val="tx1">
+                    <a:lumMod val="65000"/>
+                    <a:lumOff val="35000"/>
+                  </a:schemeClr>
+                </a:solidFill>
+                <a:latin typeface="Palatino Linotype" panose="02040502050505030304" pitchFamily="18" charset="0"/>
+              </a:rPr>
+              <a:t>     </a:t>
+            </a:r>
+            <a:r>
+              <a:rPr lang="en-US" sz="2800" dirty="0">
+                <a:solidFill>
+                  <a:schemeClr val="tx1">
+                    <a:lumMod val="65000"/>
+                    <a:lumOff val="35000"/>
+                  </a:schemeClr>
+                </a:solidFill>
+                <a:latin typeface="Palatino Linotype" panose="02040502050505030304" pitchFamily="18" charset="0"/>
+              </a:rPr>
+              <a:t>02.1_perceptron.ipynb</a:t>
+            </a:r>
+            <a:endParaRPr lang="en-US" sz="2800" dirty="0">
+              <a:solidFill>
+                <a:schemeClr val="tx1">
+                  <a:lumMod val="65000"/>
+                  <a:lumOff val="35000"/>
+                </a:schemeClr>
+              </a:solidFill>
+              <a:latin typeface="Palatino Linotype" panose="02040502050505030304" pitchFamily="18" charset="0"/>
+              <a:cs typeface="Segoe UI Light" panose="020B0502040204020203" pitchFamily="34" charset="0"/>
+            </a:endParaRPr>
+          </a:p>
+        </p:txBody>
+      </p:sp>
     </p:spTree>
     <p:extLst>
       <p:ext uri="{BB962C8B-B14F-4D97-AF65-F5344CB8AC3E}">

</xml_diff>

<commit_message>
Updated neural presentation in response to 06.07.22 feedback.
</commit_message>
<xml_diff>
--- a/presentations/02.1_neural_anatomy.pptx
+++ b/presentations/02.1_neural_anatomy.pptx
@@ -5,7 +5,7 @@
     <p:sldMasterId id="2147483648" r:id="rId1"/>
   </p:sldMasterIdLst>
   <p:notesMasterIdLst>
-    <p:notesMasterId r:id="rId18"/>
+    <p:notesMasterId r:id="rId19"/>
   </p:notesMasterIdLst>
   <p:sldIdLst>
     <p:sldId id="322" r:id="rId2"/>
@@ -23,7 +23,8 @@
     <p:sldId id="302" r:id="rId14"/>
     <p:sldId id="309" r:id="rId15"/>
     <p:sldId id="307" r:id="rId16"/>
-    <p:sldId id="306" r:id="rId17"/>
+    <p:sldId id="329" r:id="rId17"/>
+    <p:sldId id="306" r:id="rId18"/>
   </p:sldIdLst>
   <p:sldSz cx="12192000" cy="6858000"/>
   <p:notesSz cx="6858000" cy="9144000"/>
@@ -223,7 +224,7 @@
           <a:p>
             <a:fld id="{FD93C9B2-20F6-4DB1-B471-224337D0AC79}" type="datetimeFigureOut">
               <a:rPr lang="en-US" smtClean="0"/>
-              <a:t>4/5/2022</a:t>
+              <a:t>6/8/2022</a:t>
             </a:fld>
             <a:endParaRPr lang="en-US"/>
           </a:p>
@@ -652,7 +653,7 @@
                 <a:ea typeface="+mn-ea"/>
                 <a:cs typeface="+mn-cs"/>
               </a:rPr>
-              <a:t>And finally, a fully connected layer (also called an FC, linear, or </a:t>
+              <a:t>Layers can be fully connected or partially connected.  In a fully connected layer  - the Keras API calls these </a:t>
             </a:r>
             <a:r>
               <a:rPr lang="en-US" sz="1200" b="1" i="0" kern="1200" dirty="0">
@@ -664,7 +665,7 @@
                 <a:ea typeface="+mn-ea"/>
                 <a:cs typeface="+mn-cs"/>
               </a:rPr>
-              <a:t>dense layer</a:t>
+              <a:t>dense layers</a:t>
             </a:r>
             <a:r>
               <a:rPr lang="en-US" sz="1200" b="0" i="0" kern="1200" dirty="0">
@@ -676,8 +677,60 @@
                 <a:ea typeface="+mn-ea"/>
                 <a:cs typeface="+mn-cs"/>
               </a:rPr>
-              <a:t>) is a set of neurons that each receive an input from every neuron in the previous layer. For example, if there are three neurons in a dense layer, and four neurons in the preceding layer (as pictured here), then each neuron in the dense layer has four inputs, one from each neuron in the preceding layer, for a total of 3 × 4 = 12 connections.</a:t>
-            </a:r>
+              <a:t> – every neuron in the layer receives an input from every neuron in the previous layer.  That is not the case in a </a:t>
+            </a:r>
+            <a:r>
+              <a:rPr lang="en-US" sz="1200" b="1" i="0" kern="1200" dirty="0">
+                <a:solidFill>
+                  <a:schemeClr val="tx1"/>
+                </a:solidFill>
+                <a:effectLst/>
+                <a:latin typeface="+mn-lt"/>
+                <a:ea typeface="+mn-ea"/>
+                <a:cs typeface="+mn-cs"/>
+              </a:rPr>
+              <a:t>partially connected </a:t>
+            </a:r>
+            <a:r>
+              <a:rPr lang="en-US" sz="1200" b="0" i="0" kern="1200" dirty="0">
+                <a:solidFill>
+                  <a:schemeClr val="tx1"/>
+                </a:solidFill>
+                <a:effectLst/>
+                <a:latin typeface="+mn-lt"/>
+                <a:ea typeface="+mn-ea"/>
+                <a:cs typeface="+mn-cs"/>
+              </a:rPr>
+              <a:t>network where some of the network connections are dropped.  Interestingly, model training with partially connected layers is often faster and more effective.</a:t>
+            </a:r>
+          </a:p>
+          <a:p>
+            <a:pPr marL="0" marR="0" lvl="0" indent="0" algn="l" defTabSz="914400" rtl="0" eaLnBrk="1" fontAlgn="auto" latinLnBrk="0" hangingPunct="1">
+              <a:lnSpc>
+                <a:spcPct val="100000"/>
+              </a:lnSpc>
+              <a:spcBef>
+                <a:spcPts val="0"/>
+              </a:spcBef>
+              <a:spcAft>
+                <a:spcPts val="0"/>
+              </a:spcAft>
+              <a:buClrTx/>
+              <a:buSzTx/>
+              <a:buFontTx/>
+              <a:buNone/>
+              <a:tabLst/>
+              <a:defRPr/>
+            </a:pPr>
+            <a:endParaRPr lang="en-US" sz="1200" b="0" i="0" kern="1200" dirty="0">
+              <a:solidFill>
+                <a:schemeClr val="tx1"/>
+              </a:solidFill>
+              <a:effectLst/>
+              <a:latin typeface="+mn-lt"/>
+              <a:ea typeface="+mn-ea"/>
+              <a:cs typeface="+mn-cs"/>
+            </a:endParaRPr>
           </a:p>
         </p:txBody>
       </p:sp>
@@ -2106,6 +2159,90 @@
           <a:bodyPr/>
           <a:lstStyle/>
           <a:p>
+            <a:endParaRPr lang="en-US" dirty="0"/>
+          </a:p>
+        </p:txBody>
+      </p:sp>
+      <p:sp>
+        <p:nvSpPr>
+          <p:cNvPr id="4" name="Slide Number Placeholder 3"/>
+          <p:cNvSpPr>
+            <a:spLocks noGrp="1"/>
+          </p:cNvSpPr>
+          <p:nvPr>
+            <p:ph type="sldNum" sz="quarter" idx="5"/>
+          </p:nvPr>
+        </p:nvSpPr>
+        <p:spPr/>
+        <p:txBody>
+          <a:bodyPr/>
+          <a:lstStyle/>
+          <a:p>
+            <a:fld id="{3148858F-F1DB-4027-9C85-CCA6849540DD}" type="slidenum">
+              <a:rPr lang="en-US" smtClean="0"/>
+              <a:t>16</a:t>
+            </a:fld>
+            <a:endParaRPr lang="en-US"/>
+          </a:p>
+        </p:txBody>
+      </p:sp>
+    </p:spTree>
+    <p:extLst>
+      <p:ext uri="{BB962C8B-B14F-4D97-AF65-F5344CB8AC3E}">
+        <p14:creationId xmlns:p14="http://schemas.microsoft.com/office/powerpoint/2010/main" val="4509810"/>
+      </p:ext>
+    </p:extLst>
+  </p:cSld>
+  <p:clrMapOvr>
+    <a:masterClrMapping/>
+  </p:clrMapOvr>
+</p:notes>
+</file>
+
+<file path=ppt/notesSlides/notesSlide17.xml><?xml version="1.0" encoding="utf-8"?>
+<p:notes xmlns:a="http://schemas.openxmlformats.org/drawingml/2006/main" xmlns:r="http://schemas.openxmlformats.org/officeDocument/2006/relationships" xmlns:p="http://schemas.openxmlformats.org/presentationml/2006/main">
+  <p:cSld>
+    <p:spTree>
+      <p:nvGrpSpPr>
+        <p:cNvPr id="1" name=""/>
+        <p:cNvGrpSpPr/>
+        <p:nvPr/>
+      </p:nvGrpSpPr>
+      <p:grpSpPr>
+        <a:xfrm>
+          <a:off x="0" y="0"/>
+          <a:ext cx="0" cy="0"/>
+          <a:chOff x="0" y="0"/>
+          <a:chExt cx="0" cy="0"/>
+        </a:xfrm>
+      </p:grpSpPr>
+      <p:sp>
+        <p:nvSpPr>
+          <p:cNvPr id="2" name="Slide Image Placeholder 1"/>
+          <p:cNvSpPr>
+            <a:spLocks noGrp="1" noRot="1" noChangeAspect="1"/>
+          </p:cNvSpPr>
+          <p:nvPr>
+            <p:ph type="sldImg"/>
+          </p:nvPr>
+        </p:nvSpPr>
+        <p:spPr/>
+      </p:sp>
+      <p:sp>
+        <p:nvSpPr>
+          <p:cNvPr id="3" name="Notes Placeholder 2"/>
+          <p:cNvSpPr>
+            <a:spLocks noGrp="1"/>
+          </p:cNvSpPr>
+          <p:nvPr>
+            <p:ph type="body" idx="1"/>
+          </p:nvPr>
+        </p:nvSpPr>
+        <p:spPr/>
+        <p:txBody>
+          <a:bodyPr/>
+          <a:lstStyle/>
+          <a:p>
             <a:pPr marL="0" marR="0" lvl="0" indent="0" algn="l" defTabSz="914400" rtl="0" eaLnBrk="1" fontAlgn="auto" latinLnBrk="0" hangingPunct="1">
               <a:lnSpc>
                 <a:spcPct val="100000"/>
@@ -2219,7 +2356,7 @@
           <a:p>
             <a:fld id="{3148858F-F1DB-4027-9C85-CCA6849540DD}" type="slidenum">
               <a:rPr lang="en-US" smtClean="0"/>
-              <a:t>16</a:t>
+              <a:t>17</a:t>
             </a:fld>
             <a:endParaRPr lang="en-US"/>
           </a:p>
@@ -2309,7 +2446,7 @@
                 <a:ea typeface="+mn-ea"/>
                 <a:cs typeface="+mn-cs"/>
               </a:rPr>
-              <a:t>The history of artificial neurons began in 1943, with the publication of a paper that presented a massively simplified abstraction of a neuron’s basic functions and described how multiple instances of this object could be connected into a network, or net.  The paper, written by McCulloch and Pitts in 1943, launched the field of neural networks.</a:t>
+              <a:t>Let’s begin with a little background…</a:t>
             </a:r>
           </a:p>
           <a:p>
@@ -2359,54 +2496,93 @@
               <a:defRPr/>
             </a:pPr>
             <a:r>
-              <a:rPr lang="en-US" b="0" i="0" dirty="0">
-                <a:solidFill>
-                  <a:srgbClr val="3D3B49"/>
+              <a:rPr lang="en-US" sz="1200" b="0" i="0" kern="1200" dirty="0">
+                <a:solidFill>
+                  <a:schemeClr val="tx1"/>
                 </a:solidFill>
                 <a:effectLst/>
                 <a:latin typeface="+mn-lt"/>
-              </a:rPr>
-              <a:t>In 1957 Frank Rosenblatt proposed the </a:t>
-            </a:r>
-            <a:r>
-              <a:rPr lang="en-US" b="0" i="1" dirty="0">
+                <a:ea typeface="+mn-ea"/>
+                <a:cs typeface="+mn-cs"/>
+              </a:rPr>
+              <a:t>The history of neural networks began in 1943, with the publication of a paper by McCulloch and Pitts.  In this article, they presented a massively simplified abstraction of a neuron’s basic functions and described how multiple instances of this object could be connected into a network, or net.  </a:t>
+            </a:r>
+          </a:p>
+          <a:p>
+            <a:pPr marL="0" marR="0" lvl="0" indent="0" algn="l" defTabSz="914400" rtl="0" eaLnBrk="1" fontAlgn="auto" latinLnBrk="0" hangingPunct="1">
+              <a:lnSpc>
+                <a:spcPct val="100000"/>
+              </a:lnSpc>
+              <a:spcBef>
+                <a:spcPts val="0"/>
+              </a:spcBef>
+              <a:spcAft>
+                <a:spcPts val="0"/>
+              </a:spcAft>
+              <a:buClrTx/>
+              <a:buSzTx/>
+              <a:buFontTx/>
+              <a:buNone/>
+              <a:tabLst/>
+              <a:defRPr/>
+            </a:pPr>
+            <a:endParaRPr lang="en-US" sz="1200" b="0" i="0" kern="1200" dirty="0">
+              <a:solidFill>
+                <a:schemeClr val="tx1"/>
+              </a:solidFill>
+              <a:effectLst/>
+              <a:latin typeface="+mn-lt"/>
+              <a:ea typeface="+mn-ea"/>
+              <a:cs typeface="+mn-cs"/>
+            </a:endParaRPr>
+          </a:p>
+          <a:p>
+            <a:pPr marL="0" marR="0" lvl="0" indent="0" algn="l" defTabSz="914400" rtl="0" eaLnBrk="1" fontAlgn="auto" latinLnBrk="0" hangingPunct="1">
+              <a:lnSpc>
+                <a:spcPct val="100000"/>
+              </a:lnSpc>
+              <a:spcBef>
+                <a:spcPts val="0"/>
+              </a:spcBef>
+              <a:spcAft>
+                <a:spcPts val="0"/>
+              </a:spcAft>
+              <a:buClrTx/>
+              <a:buSzTx/>
+              <a:buFontTx/>
+              <a:buNone/>
+              <a:tabLst/>
+              <a:defRPr/>
+            </a:pPr>
+            <a:r>
+              <a:rPr lang="en-US" b="0" i="0" dirty="0">
                 <a:solidFill>
                   <a:srgbClr val="3D3B49"/>
                 </a:solidFill>
                 <a:effectLst/>
                 <a:latin typeface="+mn-lt"/>
               </a:rPr>
-              <a:t>perceptron</a:t>
-            </a:r>
-            <a:r>
-              <a:rPr lang="en-US" b="0" i="0" dirty="0">
+              <a:t>In 1957 Frank Rosenblatt proposed the </a:t>
+            </a:r>
+            <a:r>
+              <a:rPr lang="en-US" b="0" i="1" dirty="0">
                 <a:solidFill>
                   <a:srgbClr val="3D3B49"/>
                 </a:solidFill>
                 <a:effectLst/>
                 <a:latin typeface="+mn-lt"/>
               </a:rPr>
-              <a:t> as a simplified mathematical model of a neuron (Rosenblatt 1962).  The following year (1958), a perceptron-based computer was built at Cornell University.  It was the size of a refrigerator and called the Mark I Perceptron (Wikipedia 2020c). The device was built to process images, using a grid of 400 photocells that could digitize an image at a resolution of 20 by 20 pixels (the word </a:t>
-            </a:r>
-            <a:r>
-              <a:rPr lang="en-US" b="0" i="1" dirty="0">
+              <a:t>perceptron</a:t>
+            </a:r>
+            <a:r>
+              <a:rPr lang="en-US" b="0" i="0" dirty="0">
                 <a:solidFill>
                   <a:srgbClr val="3D3B49"/>
                 </a:solidFill>
                 <a:effectLst/>
                 <a:latin typeface="+mn-lt"/>
               </a:rPr>
-              <a:t>pixel</a:t>
-            </a:r>
-            <a:r>
-              <a:rPr lang="en-US" b="0" i="0" dirty="0">
-                <a:solidFill>
-                  <a:srgbClr val="3D3B49"/>
-                </a:solidFill>
-                <a:effectLst/>
-                <a:latin typeface="+mn-lt"/>
-              </a:rPr>
-              <a:t> hadn’t yet been coined).  The weight applied to each input of the perceptron was set by turning a knob that controlled an electrical component called a potentiometer. To automate the learning process, electric motors were attached to the potentiometers so the device could literally turn its own knobs to adjust its weights and thereby change its calculations and output.  Although the Mark I Perceptron achieved some success, it proved difficult to generalize the technique to more complicated kinds of data.  </a:t>
+              <a:t> as a simplified mathematical model of a neuron (Rosenblatt 1962).  And the following year (1958), a perceptron-based computer was built at Cornell University.  It was the size of a refrigerator and called the Mark I Perceptron (Wikipedia 2020c). The device was built to process and classify simple images.  Its grid of 400 photocells could digitize an image at a resolution of 20 by 20 pixels.  Enthusiasm for the perceptron, however, was short lived. </a:t>
             </a:r>
           </a:p>
           <a:p>
@@ -2461,7 +2637,7 @@
                 <a:effectLst/>
                 <a:latin typeface="+mn-lt"/>
               </a:rPr>
-              <a:t>In 1969, Minsky and Papert wrote a book which proved that the original perceptron technique was fundamentally limited.  The lack of progress wasn’t due to a lack of imagination, but the result of theoretical limits built into the structure of a perceptron.  A popular consensus formed that the perceptron was a dead end.  Enthusiasm, interest, and funding all dried up.  The first </a:t>
+              <a:t>In 1969, Marvin Minsky and Seymour Papert wrote a book in which they argued that Rosenblatt’s perceptron technique was severely limited.  Soon, a popular consensus formed that neural networks were a dead end.  Enthusiasm, interest, and funding all dried up.  The first </a:t>
             </a:r>
             <a:r>
               <a:rPr lang="en-US" b="1" i="0" dirty="0">
@@ -2711,7 +2887,7 @@
                 <a:ea typeface="+mn-ea"/>
                 <a:cs typeface="+mn-cs"/>
               </a:rPr>
-              <a:t>So, what was the inspiration behind Rosenblatt’s perceptron?  It was the neuron.  A simplified image of a neuron is shown here.</a:t>
+              <a:t>Rosenblatt’s perceptron, of course, was inspired by the anatomy and workings of the human neuron.</a:t>
             </a:r>
           </a:p>
           <a:p>
@@ -2770,7 +2946,7 @@
                 <a:ea typeface="+mn-ea"/>
                 <a:cs typeface="+mn-cs"/>
               </a:rPr>
-              <a:t>A neuron is comprised of Dendrites, a cell body (labeled here as the Soma), and an extended Axon with multiple branches, tipped with Axon terminals.  The Axon terminals, in turn, connect to Dendrites from other neurons.  Hence, the flow of electrical impulses is from Dendrite to Soma to Axon and then to Axon terminal.  And finally, the strength of the electrical impulse sent to the Axon depends on the combined strength of impulses coming into the Soma. As we will soon see, neural networks operate in a similar manner.</a:t>
+              <a:t>As shown here, a neuron is comprised of Dendrites, a cell body (labeled here as the Soma), and an extended Axon with multiple branches, tipped with Axon terminals.  The Axon terminals, in turn, connect to Dendrites from other neurons.  Hence, the flow of electrical impulses is from Dendrite to Soma to Axon and then to Axon terminal.  And finally, the strength of the electrical impulse sent to the Axon depends on the combined strength of impulses coming into the Soma. As we will soon see, neural networks operate in a similar manner.</a:t>
             </a:r>
           </a:p>
           <a:p>
@@ -2922,7 +3098,7 @@
                 <a:ea typeface="+mn-ea"/>
                 <a:cs typeface="+mn-cs"/>
               </a:rPr>
-              <a:t>node</a:t>
+              <a:t>node or neuron</a:t>
             </a:r>
             <a:r>
               <a:rPr lang="en-US" sz="1200" b="0" i="0" kern="1200" dirty="0">
@@ -3493,7 +3669,7 @@
                 <a:ea typeface="+mn-ea"/>
                 <a:cs typeface="+mn-cs"/>
               </a:rPr>
-              <a:t>Even though we don’t usually draw the weights, it’s sometimes useful to refer to individual weights by name. A common convention used to identify specific weights is illustrated here.  Here we see six nodes or neurons.  For convenience, we’ve labeled each with a letter.  Each weight corresponds to how the output of one specific neuron is changed on its way to another specific neuron, shown as lines in this figure. To name a weight, we combine the name of the output neuron with the input neuron. For example, the weight that multiplies the output of A before it’s used by D is called AD.</a:t>
+              <a:t>Even though we don’t usually draw the weights, it’s sometimes useful to refer to individual weights by name. A common convention used to identify specific weights is illustrated here.  Here we see six nodes or neurons.  For convenience, we’ve labeled each with a letter.  Each weight corresponds to how the output of one specific neuron is changed on its way to another specific neuron, shown as lines. To name a weight, we combine the name of the output neuron with the input neuron. For example, the weight that multiplies the output of A before it’s used by D is called AD.</a:t>
             </a:r>
           </a:p>
         </p:txBody>
@@ -3745,7 +3921,7 @@
                 <a:ea typeface="+mn-ea"/>
                 <a:cs typeface="+mn-cs"/>
               </a:rPr>
-              <a:t>Consider a layered cake.  If we lay the cake on its side, with many layers side-by-side, we might call the network </a:t>
+              <a:t>Consider a layered cake.  If we lay the cake on its side, with many layers side-by-side, we say the network is </a:t>
             </a:r>
             <a:r>
               <a:rPr lang="en-US" sz="1200" b="0" i="0" u="sng" kern="1200" dirty="0">
@@ -3769,7 +3945,7 @@
                 <a:ea typeface="+mn-ea"/>
                 <a:cs typeface="+mn-cs"/>
               </a:rPr>
-              <a:t>.  But if we stand the cake up and look at it from above, we might call it </a:t>
+              <a:t>.  But if we stand the cake up and look at it from above, we say it is </a:t>
             </a:r>
             <a:r>
               <a:rPr lang="en-US" sz="1200" b="0" i="0" u="sng" kern="1200" dirty="0">
@@ -4052,7 +4228,7 @@
           <a:p>
             <a:fld id="{C3F78080-8D0A-4BE8-A5B4-CB115102D524}" type="datetimeFigureOut">
               <a:rPr lang="en-US" smtClean="0"/>
-              <a:t>4/5/2022</a:t>
+              <a:t>6/8/2022</a:t>
             </a:fld>
             <a:endParaRPr lang="en-US"/>
           </a:p>
@@ -4250,7 +4426,7 @@
           <a:p>
             <a:fld id="{C3F78080-8D0A-4BE8-A5B4-CB115102D524}" type="datetimeFigureOut">
               <a:rPr lang="en-US" smtClean="0"/>
-              <a:t>4/5/2022</a:t>
+              <a:t>6/8/2022</a:t>
             </a:fld>
             <a:endParaRPr lang="en-US"/>
           </a:p>
@@ -4458,7 +4634,7 @@
           <a:p>
             <a:fld id="{C3F78080-8D0A-4BE8-A5B4-CB115102D524}" type="datetimeFigureOut">
               <a:rPr lang="en-US" smtClean="0"/>
-              <a:t>4/5/2022</a:t>
+              <a:t>6/8/2022</a:t>
             </a:fld>
             <a:endParaRPr lang="en-US"/>
           </a:p>
@@ -4656,7 +4832,7 @@
           <a:p>
             <a:fld id="{C3F78080-8D0A-4BE8-A5B4-CB115102D524}" type="datetimeFigureOut">
               <a:rPr lang="en-US" smtClean="0"/>
-              <a:t>4/5/2022</a:t>
+              <a:t>6/8/2022</a:t>
             </a:fld>
             <a:endParaRPr lang="en-US"/>
           </a:p>
@@ -4931,7 +5107,7 @@
           <a:p>
             <a:fld id="{C3F78080-8D0A-4BE8-A5B4-CB115102D524}" type="datetimeFigureOut">
               <a:rPr lang="en-US" smtClean="0"/>
-              <a:t>4/5/2022</a:t>
+              <a:t>6/8/2022</a:t>
             </a:fld>
             <a:endParaRPr lang="en-US"/>
           </a:p>
@@ -5196,7 +5372,7 @@
           <a:p>
             <a:fld id="{C3F78080-8D0A-4BE8-A5B4-CB115102D524}" type="datetimeFigureOut">
               <a:rPr lang="en-US" smtClean="0"/>
-              <a:t>4/5/2022</a:t>
+              <a:t>6/8/2022</a:t>
             </a:fld>
             <a:endParaRPr lang="en-US"/>
           </a:p>
@@ -5608,7 +5784,7 @@
           <a:p>
             <a:fld id="{C3F78080-8D0A-4BE8-A5B4-CB115102D524}" type="datetimeFigureOut">
               <a:rPr lang="en-US" smtClean="0"/>
-              <a:t>4/5/2022</a:t>
+              <a:t>6/8/2022</a:t>
             </a:fld>
             <a:endParaRPr lang="en-US"/>
           </a:p>
@@ -5749,7 +5925,7 @@
           <a:p>
             <a:fld id="{C3F78080-8D0A-4BE8-A5B4-CB115102D524}" type="datetimeFigureOut">
               <a:rPr lang="en-US" smtClean="0"/>
-              <a:t>4/5/2022</a:t>
+              <a:t>6/8/2022</a:t>
             </a:fld>
             <a:endParaRPr lang="en-US"/>
           </a:p>
@@ -5862,7 +6038,7 @@
           <a:p>
             <a:fld id="{C3F78080-8D0A-4BE8-A5B4-CB115102D524}" type="datetimeFigureOut">
               <a:rPr lang="en-US" smtClean="0"/>
-              <a:t>4/5/2022</a:t>
+              <a:t>6/8/2022</a:t>
             </a:fld>
             <a:endParaRPr lang="en-US"/>
           </a:p>
@@ -6173,7 +6349,7 @@
           <a:p>
             <a:fld id="{C3F78080-8D0A-4BE8-A5B4-CB115102D524}" type="datetimeFigureOut">
               <a:rPr lang="en-US" smtClean="0"/>
-              <a:t>4/5/2022</a:t>
+              <a:t>6/8/2022</a:t>
             </a:fld>
             <a:endParaRPr lang="en-US"/>
           </a:p>
@@ -6461,7 +6637,7 @@
           <a:p>
             <a:fld id="{C3F78080-8D0A-4BE8-A5B4-CB115102D524}" type="datetimeFigureOut">
               <a:rPr lang="en-US" smtClean="0"/>
-              <a:t>4/5/2022</a:t>
+              <a:t>6/8/2022</a:t>
             </a:fld>
             <a:endParaRPr lang="en-US"/>
           </a:p>
@@ -6702,7 +6878,7 @@
           <a:p>
             <a:fld id="{C3F78080-8D0A-4BE8-A5B4-CB115102D524}" type="datetimeFigureOut">
               <a:rPr lang="en-US" smtClean="0"/>
-              <a:t>4/5/2022</a:t>
+              <a:t>6/8/2022</a:t>
             </a:fld>
             <a:endParaRPr lang="en-US"/>
           </a:p>
@@ -7233,12 +7409,42 @@
           <a:chExt cx="0" cy="0"/>
         </a:xfrm>
       </p:grpSpPr>
-      <p:sp>
-        <p:nvSpPr>
-          <p:cNvPr id="26" name="TextBox 25">
+      <p:pic>
+        <p:nvPicPr>
+          <p:cNvPr id="8" name="Picture 7">
             <a:extLst>
               <a:ext uri="{FF2B5EF4-FFF2-40B4-BE49-F238E27FC236}">
-                <a16:creationId xmlns:a16="http://schemas.microsoft.com/office/drawing/2014/main" id="{C53A25A6-F70B-4315-9230-0220EC84A470}"/>
+                <a16:creationId xmlns:a16="http://schemas.microsoft.com/office/drawing/2014/main" id="{0BC2C9EB-5233-41A5-B934-0CA3514C2BF6}"/>
+              </a:ext>
+            </a:extLst>
+          </p:cNvPr>
+          <p:cNvPicPr>
+            <a:picLocks noChangeAspect="1"/>
+          </p:cNvPicPr>
+          <p:nvPr/>
+        </p:nvPicPr>
+        <p:blipFill>
+          <a:blip r:embed="rId3"/>
+          <a:stretch>
+            <a:fillRect/>
+          </a:stretch>
+        </p:blipFill>
+        <p:spPr>
+          <a:xfrm>
+            <a:off x="2279026" y="2405527"/>
+            <a:ext cx="2543175" cy="2676525"/>
+          </a:xfrm>
+          <a:prstGeom prst="rect">
+            <a:avLst/>
+          </a:prstGeom>
+        </p:spPr>
+      </p:pic>
+      <p:sp>
+        <p:nvSpPr>
+          <p:cNvPr id="13" name="TextBox 12">
+            <a:extLst>
+              <a:ext uri="{FF2B5EF4-FFF2-40B4-BE49-F238E27FC236}">
+                <a16:creationId xmlns:a16="http://schemas.microsoft.com/office/drawing/2014/main" id="{DD34DF9A-124B-467D-9273-82F56149B705}"/>
               </a:ext>
             </a:extLst>
           </p:cNvPr>
@@ -7247,8 +7453,8 @@
         </p:nvSpPr>
         <p:spPr>
           <a:xfrm>
-            <a:off x="0" y="6550223"/>
-            <a:ext cx="12192000" cy="307777"/>
+            <a:off x="2400689" y="1288405"/>
+            <a:ext cx="2472152" cy="523220"/>
           </a:xfrm>
           <a:prstGeom prst="rect">
             <a:avLst/>
@@ -7256,83 +7462,63 @@
           <a:noFill/>
         </p:spPr>
         <p:txBody>
-          <a:bodyPr wrap="square" rtlCol="0">
+          <a:bodyPr wrap="none" rtlCol="0">
             <a:spAutoFit/>
           </a:bodyPr>
           <a:lstStyle/>
           <a:p>
             <a:r>
-              <a:rPr lang="en-US" sz="1400" dirty="0">
-                <a:solidFill>
-                  <a:schemeClr val="tx1">
-                    <a:lumMod val="65000"/>
-                    <a:lumOff val="35000"/>
-                  </a:schemeClr>
-                </a:solidFill>
-                <a:latin typeface="+mj-lt"/>
-                <a:ea typeface="Verdana" panose="020B0604030504040204" pitchFamily="34" charset="0"/>
-              </a:rPr>
-              <a:t>Source: Glassner, A. (2021). </a:t>
-            </a:r>
-            <a:r>
-              <a:rPr lang="en-US" sz="1400" i="1" dirty="0">
-                <a:solidFill>
-                  <a:schemeClr val="tx1">
-                    <a:lumMod val="65000"/>
-                    <a:lumOff val="35000"/>
-                  </a:schemeClr>
-                </a:solidFill>
-                <a:latin typeface="+mj-lt"/>
-                <a:ea typeface="Verdana" panose="020B0604030504040204" pitchFamily="34" charset="0"/>
-              </a:rPr>
-              <a:t>Deep learning: A visual approach</a:t>
-            </a:r>
-            <a:r>
-              <a:rPr lang="en-US" sz="1400" dirty="0">
-                <a:solidFill>
-                  <a:schemeClr val="tx1">
-                    <a:lumMod val="65000"/>
-                    <a:lumOff val="35000"/>
-                  </a:schemeClr>
-                </a:solidFill>
-                <a:latin typeface="+mj-lt"/>
-                <a:ea typeface="Verdana" panose="020B0604030504040204" pitchFamily="34" charset="0"/>
-              </a:rPr>
-              <a:t>. </a:t>
-            </a:r>
-            <a:r>
-              <a:rPr lang="en-US" sz="1400" b="0" i="0" dirty="0">
-                <a:solidFill>
-                  <a:schemeClr val="tx1">
-                    <a:lumMod val="65000"/>
-                    <a:lumOff val="35000"/>
-                  </a:schemeClr>
-                </a:solidFill>
-                <a:effectLst/>
-                <a:latin typeface="+mj-lt"/>
-                <a:ea typeface="Verdana" panose="020B0604030504040204" pitchFamily="34" charset="0"/>
-              </a:rPr>
-              <a:t>San Francisco, CA: No Starch Press. (Chapter 13)</a:t>
-            </a:r>
-            <a:endParaRPr lang="en-US" sz="1400" dirty="0">
-              <a:solidFill>
-                <a:schemeClr val="tx1">
-                  <a:lumMod val="65000"/>
-                  <a:lumOff val="35000"/>
-                </a:schemeClr>
-              </a:solidFill>
-              <a:latin typeface="+mj-lt"/>
-              <a:ea typeface="Verdana" panose="020B0604030504040204" pitchFamily="34" charset="0"/>
-            </a:endParaRPr>
+              <a:rPr lang="en-US" sz="2800" dirty="0">
+                <a:latin typeface="Garamond" panose="02020404030301010803" pitchFamily="18" charset="0"/>
+              </a:rPr>
+              <a:t>Fully Connected</a:t>
+            </a:r>
+          </a:p>
+        </p:txBody>
+      </p:sp>
+      <p:sp>
+        <p:nvSpPr>
+          <p:cNvPr id="14" name="TextBox 13">
+            <a:extLst>
+              <a:ext uri="{FF2B5EF4-FFF2-40B4-BE49-F238E27FC236}">
+                <a16:creationId xmlns:a16="http://schemas.microsoft.com/office/drawing/2014/main" id="{CBC5B7BD-0B23-4FEB-820A-12087997A899}"/>
+              </a:ext>
+            </a:extLst>
+          </p:cNvPr>
+          <p:cNvSpPr txBox="1"/>
+          <p:nvPr/>
+        </p:nvSpPr>
+        <p:spPr>
+          <a:xfrm>
+            <a:off x="7146486" y="1288404"/>
+            <a:ext cx="2889894" cy="523220"/>
+          </a:xfrm>
+          <a:prstGeom prst="rect">
+            <a:avLst/>
+          </a:prstGeom>
+          <a:noFill/>
+        </p:spPr>
+        <p:txBody>
+          <a:bodyPr wrap="none" rtlCol="0">
+            <a:spAutoFit/>
+          </a:bodyPr>
+          <a:lstStyle/>
+          <a:p>
+            <a:r>
+              <a:rPr lang="en-US" sz="2800" dirty="0">
+                <a:latin typeface="Garamond" panose="02020404030301010803" pitchFamily="18" charset="0"/>
+              </a:rPr>
+              <a:t>Partially Connected</a:t>
+            </a:r>
           </a:p>
         </p:txBody>
       </p:sp>
       <p:pic>
         <p:nvPicPr>
-          <p:cNvPr id="3" name="Picture 2" descr="A picture containing diagram&#10;&#10;Description automatically generated">
+          <p:cNvPr id="15" name="Picture 14">
             <a:extLst>
               <a:ext uri="{FF2B5EF4-FFF2-40B4-BE49-F238E27FC236}">
-                <a16:creationId xmlns:a16="http://schemas.microsoft.com/office/drawing/2014/main" id="{0FC5C259-97A3-4400-A831-7D1728FF5396}"/>
+                <a16:creationId xmlns:a16="http://schemas.microsoft.com/office/drawing/2014/main" id="{AD52A652-B6B1-44E0-B87A-3600B5AE3B0D}"/>
               </a:ext>
             </a:extLst>
           </p:cNvPr>
@@ -7342,21 +7528,15 @@
           <p:nvPr/>
         </p:nvPicPr>
         <p:blipFill>
-          <a:blip r:embed="rId3">
-            <a:extLst>
-              <a:ext uri="{28A0092B-C50C-407E-A947-70E740481C1C}">
-                <a14:useLocalDpi xmlns:a14="http://schemas.microsoft.com/office/drawing/2010/main" val="0"/>
-              </a:ext>
-            </a:extLst>
-          </a:blip>
+          <a:blip r:embed="rId4"/>
           <a:stretch>
             <a:fillRect/>
           </a:stretch>
         </p:blipFill>
         <p:spPr>
           <a:xfrm>
-            <a:off x="3987126" y="1969953"/>
-            <a:ext cx="4217748" cy="2918094"/>
+            <a:off x="7238883" y="2255552"/>
+            <a:ext cx="2705100" cy="2790825"/>
           </a:xfrm>
           <a:prstGeom prst="rect">
             <a:avLst/>
@@ -7385,6 +7565,127 @@
       </p:transition>
     </mc:Fallback>
   </mc:AlternateContent>
+  <p:timing>
+    <p:tnLst>
+      <p:par>
+        <p:cTn id="1" dur="indefinite" restart="never" nodeType="tmRoot">
+          <p:childTnLst>
+            <p:seq concurrent="1" nextAc="seek">
+              <p:cTn id="2" dur="indefinite" nodeType="mainSeq">
+                <p:childTnLst>
+                  <p:par>
+                    <p:cTn id="3" fill="hold">
+                      <p:stCondLst>
+                        <p:cond delay="indefinite"/>
+                      </p:stCondLst>
+                      <p:childTnLst>
+                        <p:par>
+                          <p:cTn id="4" fill="hold">
+                            <p:stCondLst>
+                              <p:cond delay="0"/>
+                            </p:stCondLst>
+                            <p:childTnLst>
+                              <p:par>
+                                <p:cTn id="5" presetID="10" presetClass="entr" presetSubtype="0" fill="hold" nodeType="clickEffect">
+                                  <p:stCondLst>
+                                    <p:cond delay="0"/>
+                                  </p:stCondLst>
+                                  <p:childTnLst>
+                                    <p:set>
+                                      <p:cBhvr>
+                                        <p:cTn id="6" dur="1" fill="hold">
+                                          <p:stCondLst>
+                                            <p:cond delay="0"/>
+                                          </p:stCondLst>
+                                        </p:cTn>
+                                        <p:tgtEl>
+                                          <p:spTgt spid="15"/>
+                                        </p:tgtEl>
+                                        <p:attrNameLst>
+                                          <p:attrName>style.visibility</p:attrName>
+                                        </p:attrNameLst>
+                                      </p:cBhvr>
+                                      <p:to>
+                                        <p:strVal val="visible"/>
+                                      </p:to>
+                                    </p:set>
+                                    <p:animEffect transition="in" filter="fade">
+                                      <p:cBhvr>
+                                        <p:cTn id="7" dur="500"/>
+                                        <p:tgtEl>
+                                          <p:spTgt spid="15"/>
+                                        </p:tgtEl>
+                                      </p:cBhvr>
+                                    </p:animEffect>
+                                  </p:childTnLst>
+                                </p:cTn>
+                              </p:par>
+                              <p:par>
+                                <p:cTn id="8" presetID="10" presetClass="entr" presetSubtype="0" fill="hold" grpId="0" nodeType="withEffect">
+                                  <p:stCondLst>
+                                    <p:cond delay="0"/>
+                                  </p:stCondLst>
+                                  <p:childTnLst>
+                                    <p:set>
+                                      <p:cBhvr>
+                                        <p:cTn id="9" dur="1" fill="hold">
+                                          <p:stCondLst>
+                                            <p:cond delay="0"/>
+                                          </p:stCondLst>
+                                        </p:cTn>
+                                        <p:tgtEl>
+                                          <p:spTgt spid="14"/>
+                                        </p:tgtEl>
+                                        <p:attrNameLst>
+                                          <p:attrName>style.visibility</p:attrName>
+                                        </p:attrNameLst>
+                                      </p:cBhvr>
+                                      <p:to>
+                                        <p:strVal val="visible"/>
+                                      </p:to>
+                                    </p:set>
+                                    <p:animEffect transition="in" filter="fade">
+                                      <p:cBhvr>
+                                        <p:cTn id="10" dur="500"/>
+                                        <p:tgtEl>
+                                          <p:spTgt spid="14"/>
+                                        </p:tgtEl>
+                                      </p:cBhvr>
+                                    </p:animEffect>
+                                  </p:childTnLst>
+                                </p:cTn>
+                              </p:par>
+                            </p:childTnLst>
+                          </p:cTn>
+                        </p:par>
+                      </p:childTnLst>
+                    </p:cTn>
+                  </p:par>
+                </p:childTnLst>
+              </p:cTn>
+              <p:prevCondLst>
+                <p:cond evt="onPrev" delay="0">
+                  <p:tgtEl>
+                    <p:sldTgt/>
+                  </p:tgtEl>
+                </p:cond>
+              </p:prevCondLst>
+              <p:nextCondLst>
+                <p:cond evt="onNext" delay="0">
+                  <p:tgtEl>
+                    <p:sldTgt/>
+                  </p:tgtEl>
+                </p:cond>
+              </p:nextCondLst>
+            </p:seq>
+          </p:childTnLst>
+        </p:cTn>
+      </p:par>
+    </p:tnLst>
+    <p:bldLst>
+      <p:bldP spid="14" grpId="0"/>
+    </p:bldLst>
+  </p:timing>
 </p:sld>
 </file>
 
@@ -7547,7 +7848,7 @@
           <a:graphicData uri="http://schemas.openxmlformats.org/presentationml/2006/ole">
             <mc:AlternateContent xmlns:mc="http://schemas.openxmlformats.org/markup-compatibility/2006">
               <mc:Choice xmlns:v="urn:schemas-microsoft-com:vml" Requires="v">
-                <p:oleObj spid="_x0000_s1105" name="Visio" r:id="rId8" imgW="2514945" imgH="1657350" progId="Visio.Drawing.15">
+                <p:oleObj spid="_x0000_s1127" name="Visio" r:id="rId8" imgW="2514945" imgH="1657350" progId="Visio.Drawing.15">
                   <p:embed/>
                 </p:oleObj>
               </mc:Choice>
@@ -9532,31 +9833,6 @@
           </a:p>
         </p:txBody>
       </p:sp>
-      <p:sp>
-        <p:nvSpPr>
-          <p:cNvPr id="5" name="Title 4">
-            <a:extLst>
-              <a:ext uri="{FF2B5EF4-FFF2-40B4-BE49-F238E27FC236}">
-                <a16:creationId xmlns:a16="http://schemas.microsoft.com/office/drawing/2014/main" id="{3C32FCF1-F4B6-4101-AEA5-EC96D932B98D}"/>
-              </a:ext>
-            </a:extLst>
-          </p:cNvPr>
-          <p:cNvSpPr>
-            <a:spLocks noGrp="1"/>
-          </p:cNvSpPr>
-          <p:nvPr>
-            <p:ph type="title"/>
-          </p:nvPr>
-        </p:nvSpPr>
-        <p:spPr/>
-        <p:txBody>
-          <a:bodyPr/>
-          <a:lstStyle/>
-          <a:p>
-            <a:endParaRPr lang="en-US"/>
-          </a:p>
-        </p:txBody>
-      </p:sp>
     </p:spTree>
     <p:extLst>
       <p:ext uri="{BB962C8B-B14F-4D97-AF65-F5344CB8AC3E}">
@@ -9583,6 +9859,143 @@
 </file>
 
 <file path=ppt/slides/slide16.xml><?xml version="1.0" encoding="utf-8"?>
+<p:sld xmlns:a="http://schemas.openxmlformats.org/drawingml/2006/main" xmlns:r="http://schemas.openxmlformats.org/officeDocument/2006/relationships" xmlns:p="http://schemas.openxmlformats.org/presentationml/2006/main">
+  <p:cSld>
+    <p:spTree>
+      <p:nvGrpSpPr>
+        <p:cNvPr id="1" name=""/>
+        <p:cNvGrpSpPr/>
+        <p:nvPr/>
+      </p:nvGrpSpPr>
+      <p:grpSpPr>
+        <a:xfrm>
+          <a:off x="0" y="0"/>
+          <a:ext cx="0" cy="0"/>
+          <a:chOff x="0" y="0"/>
+          <a:chExt cx="0" cy="0"/>
+        </a:xfrm>
+      </p:grpSpPr>
+      <p:sp>
+        <p:nvSpPr>
+          <p:cNvPr id="3" name="Text Placeholder 2">
+            <a:extLst>
+              <a:ext uri="{FF2B5EF4-FFF2-40B4-BE49-F238E27FC236}">
+                <a16:creationId xmlns:a16="http://schemas.microsoft.com/office/drawing/2014/main" id="{098BC2D2-CCF7-4C63-8489-B46BF394FCA2}"/>
+              </a:ext>
+            </a:extLst>
+          </p:cNvPr>
+          <p:cNvSpPr>
+            <a:spLocks noGrp="1"/>
+          </p:cNvSpPr>
+          <p:nvPr>
+            <p:ph type="body" idx="1"/>
+          </p:nvPr>
+        </p:nvSpPr>
+        <p:spPr>
+          <a:xfrm>
+            <a:off x="0" y="4285400"/>
+            <a:ext cx="12192000" cy="518830"/>
+          </a:xfrm>
+        </p:spPr>
+        <p:txBody>
+          <a:bodyPr>
+            <a:normAutofit/>
+          </a:bodyPr>
+          <a:lstStyle/>
+          <a:p>
+            <a:endParaRPr lang="en-US" dirty="0">
+              <a:latin typeface="Palatino Linotype" panose="02040502050505030304" pitchFamily="18" charset="0"/>
+              <a:cs typeface="Segoe UI" panose="020B0502040204020203" pitchFamily="34" charset="0"/>
+            </a:endParaRPr>
+          </a:p>
+          <a:p>
+            <a:endParaRPr lang="en-US" dirty="0">
+              <a:latin typeface="Palatino Linotype" panose="02040502050505030304" pitchFamily="18" charset="0"/>
+              <a:cs typeface="Segoe UI" panose="020B0502040204020203" pitchFamily="34" charset="0"/>
+            </a:endParaRPr>
+          </a:p>
+          <a:p>
+            <a:endParaRPr lang="en-US" dirty="0">
+              <a:latin typeface="Palatino Linotype" panose="02040502050505030304" pitchFamily="18" charset="0"/>
+              <a:cs typeface="Segoe UI" panose="020B0502040204020203" pitchFamily="34" charset="0"/>
+            </a:endParaRPr>
+          </a:p>
+          <a:p>
+            <a:endParaRPr lang="en-US" dirty="0">
+              <a:latin typeface="Palatino Linotype" panose="02040502050505030304" pitchFamily="18" charset="0"/>
+              <a:cs typeface="Segoe UI" panose="020B0502040204020203" pitchFamily="34" charset="0"/>
+            </a:endParaRPr>
+          </a:p>
+          <a:p>
+            <a:endParaRPr lang="en-US" dirty="0">
+              <a:latin typeface="Palatino Linotype" panose="02040502050505030304" pitchFamily="18" charset="0"/>
+              <a:cs typeface="Segoe UI" panose="020B0502040204020203" pitchFamily="34" charset="0"/>
+            </a:endParaRPr>
+          </a:p>
+        </p:txBody>
+      </p:sp>
+      <p:pic>
+        <p:nvPicPr>
+          <p:cNvPr id="4" name="Picture 3" descr="A picture containing diagram&#10;&#10;Description automatically generated">
+            <a:extLst>
+              <a:ext uri="{FF2B5EF4-FFF2-40B4-BE49-F238E27FC236}">
+                <a16:creationId xmlns:a16="http://schemas.microsoft.com/office/drawing/2014/main" id="{ABE2EEC6-C3BB-448E-8156-81B69DBF38E1}"/>
+              </a:ext>
+            </a:extLst>
+          </p:cNvPr>
+          <p:cNvPicPr>
+            <a:picLocks noChangeAspect="1"/>
+          </p:cNvPicPr>
+          <p:nvPr/>
+        </p:nvPicPr>
+        <p:blipFill>
+          <a:blip r:embed="rId3">
+            <a:extLst>
+              <a:ext uri="{28A0092B-C50C-407E-A947-70E740481C1C}">
+                <a14:useLocalDpi xmlns:a14="http://schemas.microsoft.com/office/drawing/2010/main" val="0"/>
+              </a:ext>
+            </a:extLst>
+          </a:blip>
+          <a:stretch>
+            <a:fillRect/>
+          </a:stretch>
+        </p:blipFill>
+        <p:spPr>
+          <a:xfrm>
+            <a:off x="3987126" y="1969953"/>
+            <a:ext cx="4217748" cy="2918094"/>
+          </a:xfrm>
+          <a:prstGeom prst="rect">
+            <a:avLst/>
+          </a:prstGeom>
+        </p:spPr>
+      </p:pic>
+    </p:spTree>
+    <p:extLst>
+      <p:ext uri="{BB962C8B-B14F-4D97-AF65-F5344CB8AC3E}">
+        <p14:creationId xmlns:p14="http://schemas.microsoft.com/office/powerpoint/2010/main" val="1456040871"/>
+      </p:ext>
+    </p:extLst>
+  </p:cSld>
+  <p:clrMapOvr>
+    <a:masterClrMapping/>
+  </p:clrMapOvr>
+  <mc:AlternateContent xmlns:mc="http://schemas.openxmlformats.org/markup-compatibility/2006" xmlns:p14="http://schemas.microsoft.com/office/powerpoint/2010/main">
+    <mc:Choice Requires="p14">
+      <p:transition spd="med" p14:dur="700">
+        <p:fade/>
+      </p:transition>
+    </mc:Choice>
+    <mc:Fallback xmlns="">
+      <p:transition spd="med">
+        <p:fade/>
+      </p:transition>
+    </mc:Fallback>
+  </mc:AlternateContent>
+</p:sld>
+</file>
+
+<file path=ppt/slides/slide17.xml><?xml version="1.0" encoding="utf-8"?>
 <p:sld xmlns:a="http://schemas.openxmlformats.org/drawingml/2006/main" xmlns:r="http://schemas.openxmlformats.org/officeDocument/2006/relationships" xmlns:p="http://schemas.openxmlformats.org/presentationml/2006/main">
   <p:cSld>
     <p:bg>
@@ -11472,6 +11885,162 @@
       </p:transition>
     </mc:Fallback>
   </mc:AlternateContent>
+  <p:timing>
+    <p:tnLst>
+      <p:par>
+        <p:cTn id="1" dur="indefinite" restart="never" nodeType="tmRoot">
+          <p:childTnLst>
+            <p:seq concurrent="1" nextAc="seek">
+              <p:cTn id="2" dur="indefinite" nodeType="mainSeq">
+                <p:childTnLst>
+                  <p:par>
+                    <p:cTn id="3" fill="hold">
+                      <p:stCondLst>
+                        <p:cond delay="indefinite"/>
+                      </p:stCondLst>
+                      <p:childTnLst>
+                        <p:par>
+                          <p:cTn id="4" fill="hold">
+                            <p:stCondLst>
+                              <p:cond delay="0"/>
+                            </p:stCondLst>
+                            <p:childTnLst>
+                              <p:par>
+                                <p:cTn id="5" presetID="10" presetClass="entr" presetSubtype="0" fill="hold" nodeType="clickEffect">
+                                  <p:stCondLst>
+                                    <p:cond delay="0"/>
+                                  </p:stCondLst>
+                                  <p:childTnLst>
+                                    <p:set>
+                                      <p:cBhvr>
+                                        <p:cTn id="6" dur="1" fill="hold">
+                                          <p:stCondLst>
+                                            <p:cond delay="0"/>
+                                          </p:stCondLst>
+                                        </p:cTn>
+                                        <p:tgtEl>
+                                          <p:spTgt spid="7"/>
+                                        </p:tgtEl>
+                                        <p:attrNameLst>
+                                          <p:attrName>style.visibility</p:attrName>
+                                        </p:attrNameLst>
+                                      </p:cBhvr>
+                                      <p:to>
+                                        <p:strVal val="visible"/>
+                                      </p:to>
+                                    </p:set>
+                                    <p:animEffect transition="in" filter="fade">
+                                      <p:cBhvr>
+                                        <p:cTn id="7" dur="500"/>
+                                        <p:tgtEl>
+                                          <p:spTgt spid="7"/>
+                                        </p:tgtEl>
+                                      </p:cBhvr>
+                                    </p:animEffect>
+                                  </p:childTnLst>
+                                </p:cTn>
+                              </p:par>
+                              <p:par>
+                                <p:cTn id="8" presetID="10" presetClass="entr" presetSubtype="0" fill="hold" nodeType="withEffect">
+                                  <p:stCondLst>
+                                    <p:cond delay="0"/>
+                                  </p:stCondLst>
+                                  <p:childTnLst>
+                                    <p:set>
+                                      <p:cBhvr>
+                                        <p:cTn id="9" dur="1" fill="hold">
+                                          <p:stCondLst>
+                                            <p:cond delay="0"/>
+                                          </p:stCondLst>
+                                        </p:cTn>
+                                        <p:tgtEl>
+                                          <p:spTgt spid="8"/>
+                                        </p:tgtEl>
+                                        <p:attrNameLst>
+                                          <p:attrName>style.visibility</p:attrName>
+                                        </p:attrNameLst>
+                                      </p:cBhvr>
+                                      <p:to>
+                                        <p:strVal val="visible"/>
+                                      </p:to>
+                                    </p:set>
+                                    <p:animEffect transition="in" filter="fade">
+                                      <p:cBhvr>
+                                        <p:cTn id="10" dur="500"/>
+                                        <p:tgtEl>
+                                          <p:spTgt spid="8"/>
+                                        </p:tgtEl>
+                                      </p:cBhvr>
+                                    </p:animEffect>
+                                  </p:childTnLst>
+                                </p:cTn>
+                              </p:par>
+                              <p:par>
+                                <p:cTn id="11" presetID="10" presetClass="entr" presetSubtype="0" fill="hold" grpId="0" nodeType="withEffect">
+                                  <p:stCondLst>
+                                    <p:cond delay="0"/>
+                                  </p:stCondLst>
+                                  <p:childTnLst>
+                                    <p:set>
+                                      <p:cBhvr>
+                                        <p:cTn id="12" dur="1" fill="hold">
+                                          <p:stCondLst>
+                                            <p:cond delay="0"/>
+                                          </p:stCondLst>
+                                        </p:cTn>
+                                        <p:tgtEl>
+                                          <p:spTgt spid="13"/>
+                                        </p:tgtEl>
+                                        <p:attrNameLst>
+                                          <p:attrName>style.visibility</p:attrName>
+                                        </p:attrNameLst>
+                                      </p:cBhvr>
+                                      <p:to>
+                                        <p:strVal val="visible"/>
+                                      </p:to>
+                                    </p:set>
+                                    <p:animEffect transition="in" filter="fade">
+                                      <p:cBhvr>
+                                        <p:cTn id="13" dur="500"/>
+                                        <p:tgtEl>
+                                          <p:spTgt spid="13"/>
+                                        </p:tgtEl>
+                                      </p:cBhvr>
+                                    </p:animEffect>
+                                  </p:childTnLst>
+                                </p:cTn>
+                              </p:par>
+                            </p:childTnLst>
+                          </p:cTn>
+                        </p:par>
+                      </p:childTnLst>
+                    </p:cTn>
+                  </p:par>
+                </p:childTnLst>
+              </p:cTn>
+              <p:prevCondLst>
+                <p:cond evt="onPrev" delay="0">
+                  <p:tgtEl>
+                    <p:sldTgt/>
+                  </p:tgtEl>
+                </p:cond>
+              </p:prevCondLst>
+              <p:nextCondLst>
+                <p:cond evt="onNext" delay="0">
+                  <p:tgtEl>
+                    <p:sldTgt/>
+                  </p:tgtEl>
+                </p:cond>
+              </p:nextCondLst>
+            </p:seq>
+          </p:childTnLst>
+        </p:cTn>
+      </p:par>
+    </p:tnLst>
+    <p:bldLst>
+      <p:bldP spid="13" grpId="0"/>
+    </p:bldLst>
+  </p:timing>
 </p:sld>
 </file>
 

</xml_diff>

<commit_message>
Updated presentations for July 20-23 (2022) workshop.
</commit_message>
<xml_diff>
--- a/presentations/02.1_neural_anatomy.pptx
+++ b/presentations/02.1_neural_anatomy.pptx
@@ -224,7 +224,7 @@
           <a:p>
             <a:fld id="{FD93C9B2-20F6-4DB1-B471-224337D0AC79}" type="datetimeFigureOut">
               <a:rPr lang="en-US" smtClean="0"/>
-              <a:t>6/8/2022</a:t>
+              <a:t>6/13/2022</a:t>
             </a:fld>
             <a:endParaRPr lang="en-US"/>
           </a:p>
@@ -4228,7 +4228,7 @@
           <a:p>
             <a:fld id="{C3F78080-8D0A-4BE8-A5B4-CB115102D524}" type="datetimeFigureOut">
               <a:rPr lang="en-US" smtClean="0"/>
-              <a:t>6/8/2022</a:t>
+              <a:t>6/13/2022</a:t>
             </a:fld>
             <a:endParaRPr lang="en-US"/>
           </a:p>
@@ -4426,7 +4426,7 @@
           <a:p>
             <a:fld id="{C3F78080-8D0A-4BE8-A5B4-CB115102D524}" type="datetimeFigureOut">
               <a:rPr lang="en-US" smtClean="0"/>
-              <a:t>6/8/2022</a:t>
+              <a:t>6/13/2022</a:t>
             </a:fld>
             <a:endParaRPr lang="en-US"/>
           </a:p>
@@ -4634,7 +4634,7 @@
           <a:p>
             <a:fld id="{C3F78080-8D0A-4BE8-A5B4-CB115102D524}" type="datetimeFigureOut">
               <a:rPr lang="en-US" smtClean="0"/>
-              <a:t>6/8/2022</a:t>
+              <a:t>6/13/2022</a:t>
             </a:fld>
             <a:endParaRPr lang="en-US"/>
           </a:p>
@@ -4832,7 +4832,7 @@
           <a:p>
             <a:fld id="{C3F78080-8D0A-4BE8-A5B4-CB115102D524}" type="datetimeFigureOut">
               <a:rPr lang="en-US" smtClean="0"/>
-              <a:t>6/8/2022</a:t>
+              <a:t>6/13/2022</a:t>
             </a:fld>
             <a:endParaRPr lang="en-US"/>
           </a:p>
@@ -5107,7 +5107,7 @@
           <a:p>
             <a:fld id="{C3F78080-8D0A-4BE8-A5B4-CB115102D524}" type="datetimeFigureOut">
               <a:rPr lang="en-US" smtClean="0"/>
-              <a:t>6/8/2022</a:t>
+              <a:t>6/13/2022</a:t>
             </a:fld>
             <a:endParaRPr lang="en-US"/>
           </a:p>
@@ -5372,7 +5372,7 @@
           <a:p>
             <a:fld id="{C3F78080-8D0A-4BE8-A5B4-CB115102D524}" type="datetimeFigureOut">
               <a:rPr lang="en-US" smtClean="0"/>
-              <a:t>6/8/2022</a:t>
+              <a:t>6/13/2022</a:t>
             </a:fld>
             <a:endParaRPr lang="en-US"/>
           </a:p>
@@ -5784,7 +5784,7 @@
           <a:p>
             <a:fld id="{C3F78080-8D0A-4BE8-A5B4-CB115102D524}" type="datetimeFigureOut">
               <a:rPr lang="en-US" smtClean="0"/>
-              <a:t>6/8/2022</a:t>
+              <a:t>6/13/2022</a:t>
             </a:fld>
             <a:endParaRPr lang="en-US"/>
           </a:p>
@@ -5925,7 +5925,7 @@
           <a:p>
             <a:fld id="{C3F78080-8D0A-4BE8-A5B4-CB115102D524}" type="datetimeFigureOut">
               <a:rPr lang="en-US" smtClean="0"/>
-              <a:t>6/8/2022</a:t>
+              <a:t>6/13/2022</a:t>
             </a:fld>
             <a:endParaRPr lang="en-US"/>
           </a:p>
@@ -6038,7 +6038,7 @@
           <a:p>
             <a:fld id="{C3F78080-8D0A-4BE8-A5B4-CB115102D524}" type="datetimeFigureOut">
               <a:rPr lang="en-US" smtClean="0"/>
-              <a:t>6/8/2022</a:t>
+              <a:t>6/13/2022</a:t>
             </a:fld>
             <a:endParaRPr lang="en-US"/>
           </a:p>
@@ -6349,7 +6349,7 @@
           <a:p>
             <a:fld id="{C3F78080-8D0A-4BE8-A5B4-CB115102D524}" type="datetimeFigureOut">
               <a:rPr lang="en-US" smtClean="0"/>
-              <a:t>6/8/2022</a:t>
+              <a:t>6/13/2022</a:t>
             </a:fld>
             <a:endParaRPr lang="en-US"/>
           </a:p>
@@ -6637,7 +6637,7 @@
           <a:p>
             <a:fld id="{C3F78080-8D0A-4BE8-A5B4-CB115102D524}" type="datetimeFigureOut">
               <a:rPr lang="en-US" smtClean="0"/>
-              <a:t>6/8/2022</a:t>
+              <a:t>6/13/2022</a:t>
             </a:fld>
             <a:endParaRPr lang="en-US"/>
           </a:p>
@@ -6878,7 +6878,7 @@
           <a:p>
             <a:fld id="{C3F78080-8D0A-4BE8-A5B4-CB115102D524}" type="datetimeFigureOut">
               <a:rPr lang="en-US" smtClean="0"/>
-              <a:t>6/8/2022</a:t>
+              <a:t>6/13/2022</a:t>
             </a:fld>
             <a:endParaRPr lang="en-US"/>
           </a:p>
@@ -7848,7 +7848,7 @@
           <a:graphicData uri="http://schemas.openxmlformats.org/presentationml/2006/ole">
             <mc:AlternateContent xmlns:mc="http://schemas.openxmlformats.org/markup-compatibility/2006">
               <mc:Choice xmlns:v="urn:schemas-microsoft-com:vml" Requires="v">
-                <p:oleObj spid="_x0000_s1127" name="Visio" r:id="rId8" imgW="2514945" imgH="1657350" progId="Visio.Drawing.15">
+                <p:oleObj spid="_x0000_s1129" name="Visio" r:id="rId8" imgW="2514945" imgH="1657350" progId="Visio.Drawing.15">
                   <p:embed/>
                 </p:oleObj>
               </mc:Choice>
@@ -7979,36 +7979,6 @@
           </a:prstGeom>
         </p:spPr>
       </p:pic>
-      <p:pic>
-        <p:nvPicPr>
-          <p:cNvPr id="30" name="Picture 29">
-            <a:extLst>
-              <a:ext uri="{FF2B5EF4-FFF2-40B4-BE49-F238E27FC236}">
-                <a16:creationId xmlns:a16="http://schemas.microsoft.com/office/drawing/2014/main" id="{DB6A52BC-34E3-46C9-9FEA-AA4C9679C04F}"/>
-              </a:ext>
-            </a:extLst>
-          </p:cNvPr>
-          <p:cNvPicPr>
-            <a:picLocks noChangeAspect="1"/>
-          </p:cNvPicPr>
-          <p:nvPr/>
-        </p:nvPicPr>
-        <p:blipFill>
-          <a:blip r:embed="rId13"/>
-          <a:stretch>
-            <a:fillRect/>
-          </a:stretch>
-        </p:blipFill>
-        <p:spPr>
-          <a:xfrm>
-            <a:off x="8619830" y="5121254"/>
-            <a:ext cx="1569409" cy="576337"/>
-          </a:xfrm>
-          <a:prstGeom prst="rect">
-            <a:avLst/>
-          </a:prstGeom>
-        </p:spPr>
-      </p:pic>
       <mc:AlternateContent xmlns:mc="http://schemas.openxmlformats.org/markup-compatibility/2006" xmlns:pslz="http://schemas.microsoft.com/office/powerpoint/2016/slidezoom">
         <mc:Choice Requires="pslz">
           <p:graphicFrame>
@@ -8041,7 +8011,7 @@
                   <pslz:sldZmObj sldId="306" cId="393684128">
                     <pslz:zmPr id="{7A9708FB-B45F-465C-87C1-AD945A46CB97}" returnToParent="0" transitionDur="1000">
                       <p166:blipFill xmlns:p166="http://schemas.microsoft.com/office/powerpoint/2016/6/main">
-                        <a:blip r:embed="rId14"/>
+                        <a:blip r:embed="rId13"/>
                         <a:stretch>
                           <a:fillRect/>
                         </a:stretch>
@@ -8102,6 +8072,36 @@
           </p:pic>
         </mc:Fallback>
       </mc:AlternateContent>
+      <p:pic>
+        <p:nvPicPr>
+          <p:cNvPr id="12" name="Picture 11">
+            <a:extLst>
+              <a:ext uri="{FF2B5EF4-FFF2-40B4-BE49-F238E27FC236}">
+                <a16:creationId xmlns:a16="http://schemas.microsoft.com/office/drawing/2014/main" id="{EFA26DE7-828F-4802-9AFA-A768FFD1578A}"/>
+              </a:ext>
+            </a:extLst>
+          </p:cNvPr>
+          <p:cNvPicPr>
+            <a:picLocks noChangeAspect="1"/>
+          </p:cNvPicPr>
+          <p:nvPr/>
+        </p:nvPicPr>
+        <p:blipFill>
+          <a:blip r:embed="rId17"/>
+          <a:stretch>
+            <a:fillRect/>
+          </a:stretch>
+        </p:blipFill>
+        <p:spPr>
+          <a:xfrm>
+            <a:off x="8209552" y="5121254"/>
+            <a:ext cx="2216408" cy="600277"/>
+          </a:xfrm>
+          <a:prstGeom prst="rect">
+            <a:avLst/>
+          </a:prstGeom>
+        </p:spPr>
+      </p:pic>
     </p:spTree>
     <p:extLst>
       <p:ext uri="{BB962C8B-B14F-4D97-AF65-F5344CB8AC3E}">
@@ -8420,41 +8420,6 @@
                                         <p:cTn id="30" dur="500"/>
                                         <p:tgtEl>
                                           <p:spTgt spid="28"/>
-                                        </p:tgtEl>
-                                      </p:cBhvr>
-                                    </p:animEffect>
-                                  </p:childTnLst>
-                                </p:cTn>
-                              </p:par>
-                              <p:par>
-                                <p:cTn id="31" presetID="10" presetClass="entr" presetSubtype="0" fill="hold" nodeType="withEffect">
-                                  <p:stCondLst>
-                                    <p:cond delay="0"/>
-                                  </p:stCondLst>
-                                  <p:childTnLst>
-                                    <p:set>
-                                      <p:cBhvr>
-                                        <p:cTn id="32" dur="1" fill="hold">
-                                          <p:stCondLst>
-                                            <p:cond delay="0"/>
-                                          </p:stCondLst>
-                                        </p:cTn>
-                                        <p:tgtEl>
-                                          <p:spTgt spid="30"/>
-                                        </p:tgtEl>
-                                        <p:attrNameLst>
-                                          <p:attrName>style.visibility</p:attrName>
-                                        </p:attrNameLst>
-                                      </p:cBhvr>
-                                      <p:to>
-                                        <p:strVal val="visible"/>
-                                      </p:to>
-                                    </p:set>
-                                    <p:animEffect transition="in" filter="fade">
-                                      <p:cBhvr>
-                                        <p:cTn id="33" dur="500"/>
-                                        <p:tgtEl>
-                                          <p:spTgt spid="30"/>
                                         </p:tgtEl>
                                       </p:cBhvr>
                                     </p:animEffect>

</xml_diff>

<commit_message>
Notebook & presentation updates in response to workshop feedback (06.24.22).
</commit_message>
<xml_diff>
--- a/presentations/02.1_neural_anatomy.pptx
+++ b/presentations/02.1_neural_anatomy.pptx
@@ -5,7 +5,7 @@
     <p:sldMasterId id="2147483648" r:id="rId1"/>
   </p:sldMasterIdLst>
   <p:notesMasterIdLst>
-    <p:notesMasterId r:id="rId19"/>
+    <p:notesMasterId r:id="rId20"/>
   </p:notesMasterIdLst>
   <p:sldIdLst>
     <p:sldId id="322" r:id="rId2"/>
@@ -23,8 +23,9 @@
     <p:sldId id="302" r:id="rId14"/>
     <p:sldId id="309" r:id="rId15"/>
     <p:sldId id="307" r:id="rId16"/>
-    <p:sldId id="329" r:id="rId17"/>
-    <p:sldId id="306" r:id="rId18"/>
+    <p:sldId id="323" r:id="rId17"/>
+    <p:sldId id="329" r:id="rId18"/>
+    <p:sldId id="306" r:id="rId19"/>
   </p:sldIdLst>
   <p:sldSz cx="12192000" cy="6858000"/>
   <p:notesSz cx="6858000" cy="9144000"/>
@@ -224,7 +225,7 @@
           <a:p>
             <a:fld id="{FD93C9B2-20F6-4DB1-B471-224337D0AC79}" type="datetimeFigureOut">
               <a:rPr lang="en-US" smtClean="0"/>
-              <a:t>6/13/2022</a:t>
+              <a:t>6/22/2022</a:t>
             </a:fld>
             <a:endParaRPr lang="en-US"/>
           </a:p>
@@ -2159,7 +2160,209 @@
           <a:bodyPr/>
           <a:lstStyle/>
           <a:p>
-            <a:endParaRPr lang="en-US" dirty="0"/>
+            <a:pPr marL="0" marR="0" lvl="0" indent="0" algn="l" defTabSz="914400" rtl="0" eaLnBrk="1" fontAlgn="auto" latinLnBrk="0" hangingPunct="1">
+              <a:lnSpc>
+                <a:spcPct val="100000"/>
+              </a:lnSpc>
+              <a:spcBef>
+                <a:spcPts val="0"/>
+              </a:spcBef>
+              <a:spcAft>
+                <a:spcPts val="0"/>
+              </a:spcAft>
+              <a:buClrTx/>
+              <a:buSzTx/>
+              <a:buFontTx/>
+              <a:buNone/>
+              <a:tabLst/>
+              <a:defRPr/>
+            </a:pPr>
+            <a:r>
+              <a:rPr lang="en-US" sz="1200" dirty="0">
+                <a:solidFill>
+                  <a:schemeClr val="tx1">
+                    <a:lumMod val="65000"/>
+                    <a:lumOff val="35000"/>
+                  </a:schemeClr>
+                </a:solidFill>
+                <a:latin typeface="+mj-lt"/>
+                <a:ea typeface="Verdana" panose="020B0604030504040204" pitchFamily="34" charset="0"/>
+              </a:rPr>
+              <a:t>Link: </a:t>
+            </a:r>
+            <a:r>
+              <a:rPr lang="en-US" sz="1200" dirty="0">
+                <a:solidFill>
+                  <a:schemeClr val="tx1">
+                    <a:lumMod val="65000"/>
+                    <a:lumOff val="35000"/>
+                  </a:schemeClr>
+                </a:solidFill>
+                <a:latin typeface="+mj-lt"/>
+                <a:ea typeface="Verdana" panose="020B0604030504040204" pitchFamily="34" charset="0"/>
+                <a:hlinkClick r:id="rId3"/>
+              </a:rPr>
+              <a:t>https://teachablemachine.withgoogle.com</a:t>
+            </a:r>
+            <a:r>
+              <a:rPr lang="en-US" sz="1200" dirty="0">
+                <a:solidFill>
+                  <a:schemeClr val="tx1">
+                    <a:lumMod val="65000"/>
+                    <a:lumOff val="35000"/>
+                  </a:schemeClr>
+                </a:solidFill>
+                <a:latin typeface="+mj-lt"/>
+                <a:ea typeface="Verdana" panose="020B0604030504040204" pitchFamily="34" charset="0"/>
+              </a:rPr>
+              <a:t> </a:t>
+            </a:r>
+          </a:p>
+          <a:p>
+            <a:pPr marL="0" marR="0" lvl="0" indent="0" algn="l" defTabSz="914400" rtl="0" eaLnBrk="1" fontAlgn="auto" latinLnBrk="0" hangingPunct="1">
+              <a:lnSpc>
+                <a:spcPct val="100000"/>
+              </a:lnSpc>
+              <a:spcBef>
+                <a:spcPts val="0"/>
+              </a:spcBef>
+              <a:spcAft>
+                <a:spcPts val="0"/>
+              </a:spcAft>
+              <a:buClrTx/>
+              <a:buSzTx/>
+              <a:buFontTx/>
+              <a:buNone/>
+              <a:tabLst/>
+              <a:defRPr/>
+            </a:pPr>
+            <a:r>
+              <a:rPr lang="en-US" sz="1200" dirty="0">
+                <a:solidFill>
+                  <a:schemeClr val="tx1">
+                    <a:lumMod val="65000"/>
+                    <a:lumOff val="35000"/>
+                  </a:schemeClr>
+                </a:solidFill>
+                <a:latin typeface="+mj-lt"/>
+                <a:ea typeface="Verdana" panose="020B0604030504040204" pitchFamily="34" charset="0"/>
+              </a:rPr>
+              <a:t>Link: https://developers.google.com/machine-learning/glossary#e</a:t>
+            </a:r>
+          </a:p>
+          <a:p>
+            <a:pPr marL="0" marR="0" lvl="0" indent="0" algn="l" defTabSz="914400" rtl="0" eaLnBrk="1" fontAlgn="auto" latinLnBrk="0" hangingPunct="1">
+              <a:lnSpc>
+                <a:spcPct val="100000"/>
+              </a:lnSpc>
+              <a:spcBef>
+                <a:spcPts val="0"/>
+              </a:spcBef>
+              <a:spcAft>
+                <a:spcPts val="0"/>
+              </a:spcAft>
+              <a:buClrTx/>
+              <a:buSzTx/>
+              <a:buFontTx/>
+              <a:buNone/>
+              <a:tabLst/>
+              <a:defRPr/>
+            </a:pPr>
+            <a:endParaRPr lang="en-US" sz="1200" dirty="0">
+              <a:solidFill>
+                <a:schemeClr val="tx1">
+                  <a:lumMod val="65000"/>
+                  <a:lumOff val="35000"/>
+                </a:schemeClr>
+              </a:solidFill>
+              <a:latin typeface="+mj-lt"/>
+              <a:ea typeface="Verdana" panose="020B0604030504040204" pitchFamily="34" charset="0"/>
+            </a:endParaRPr>
+          </a:p>
+          <a:p>
+            <a:pPr marL="0" marR="0" lvl="0" indent="0" algn="l" defTabSz="914400" rtl="0" eaLnBrk="1" fontAlgn="auto" latinLnBrk="0" hangingPunct="1">
+              <a:lnSpc>
+                <a:spcPct val="100000"/>
+              </a:lnSpc>
+              <a:spcBef>
+                <a:spcPts val="0"/>
+              </a:spcBef>
+              <a:spcAft>
+                <a:spcPts val="0"/>
+              </a:spcAft>
+              <a:buClrTx/>
+              <a:buSzTx/>
+              <a:buFontTx/>
+              <a:buNone/>
+              <a:tabLst/>
+              <a:defRPr/>
+            </a:pPr>
+            <a:endParaRPr lang="en-US" sz="1200" dirty="0">
+              <a:solidFill>
+                <a:schemeClr val="tx1">
+                  <a:lumMod val="65000"/>
+                  <a:lumOff val="35000"/>
+                </a:schemeClr>
+              </a:solidFill>
+              <a:latin typeface="+mj-lt"/>
+              <a:ea typeface="Verdana" panose="020B0604030504040204" pitchFamily="34" charset="0"/>
+            </a:endParaRPr>
+          </a:p>
+          <a:p>
+            <a:pPr marL="0" marR="0" lvl="0" indent="0" algn="l" defTabSz="914400" rtl="0" eaLnBrk="1" fontAlgn="auto" latinLnBrk="0" hangingPunct="1">
+              <a:lnSpc>
+                <a:spcPct val="100000"/>
+              </a:lnSpc>
+              <a:spcBef>
+                <a:spcPts val="0"/>
+              </a:spcBef>
+              <a:spcAft>
+                <a:spcPts val="0"/>
+              </a:spcAft>
+              <a:buClrTx/>
+              <a:buSzTx/>
+              <a:buFontTx/>
+              <a:buNone/>
+              <a:tabLst/>
+              <a:defRPr/>
+            </a:pPr>
+            <a:endParaRPr lang="en-US" sz="1200" dirty="0">
+              <a:solidFill>
+                <a:schemeClr val="tx1">
+                  <a:lumMod val="65000"/>
+                  <a:lumOff val="35000"/>
+                </a:schemeClr>
+              </a:solidFill>
+              <a:latin typeface="Palatino Linotype" panose="02040502050505030304" pitchFamily="18" charset="0"/>
+            </a:endParaRPr>
+          </a:p>
+          <a:p>
+            <a:pPr marL="0" marR="0" lvl="0" indent="0" algn="l" defTabSz="914400" rtl="0" eaLnBrk="1" fontAlgn="auto" latinLnBrk="0" hangingPunct="1">
+              <a:lnSpc>
+                <a:spcPct val="100000"/>
+              </a:lnSpc>
+              <a:spcBef>
+                <a:spcPts val="0"/>
+              </a:spcBef>
+              <a:spcAft>
+                <a:spcPts val="0"/>
+              </a:spcAft>
+              <a:buClrTx/>
+              <a:buSzTx/>
+              <a:buFontTx/>
+              <a:buNone/>
+              <a:tabLst/>
+              <a:defRPr/>
+            </a:pPr>
+            <a:endParaRPr lang="en-US" sz="1200" dirty="0">
+              <a:solidFill>
+                <a:schemeClr val="tx1">
+                  <a:lumMod val="65000"/>
+                  <a:lumOff val="35000"/>
+                </a:schemeClr>
+              </a:solidFill>
+              <a:latin typeface="Palatino Linotype" panose="02040502050505030304" pitchFamily="18" charset="0"/>
+            </a:endParaRPr>
           </a:p>
         </p:txBody>
       </p:sp>
@@ -2189,7 +2392,7 @@
     </p:spTree>
     <p:extLst>
       <p:ext uri="{BB962C8B-B14F-4D97-AF65-F5344CB8AC3E}">
-        <p14:creationId xmlns:p14="http://schemas.microsoft.com/office/powerpoint/2010/main" val="4509810"/>
+        <p14:creationId xmlns:p14="http://schemas.microsoft.com/office/powerpoint/2010/main" val="1404376956"/>
       </p:ext>
     </p:extLst>
   </p:cSld>
@@ -2243,6 +2446,90 @@
           <a:bodyPr/>
           <a:lstStyle/>
           <a:p>
+            <a:endParaRPr lang="en-US" dirty="0"/>
+          </a:p>
+        </p:txBody>
+      </p:sp>
+      <p:sp>
+        <p:nvSpPr>
+          <p:cNvPr id="4" name="Slide Number Placeholder 3"/>
+          <p:cNvSpPr>
+            <a:spLocks noGrp="1"/>
+          </p:cNvSpPr>
+          <p:nvPr>
+            <p:ph type="sldNum" sz="quarter" idx="5"/>
+          </p:nvPr>
+        </p:nvSpPr>
+        <p:spPr/>
+        <p:txBody>
+          <a:bodyPr/>
+          <a:lstStyle/>
+          <a:p>
+            <a:fld id="{3148858F-F1DB-4027-9C85-CCA6849540DD}" type="slidenum">
+              <a:rPr lang="en-US" smtClean="0"/>
+              <a:t>17</a:t>
+            </a:fld>
+            <a:endParaRPr lang="en-US"/>
+          </a:p>
+        </p:txBody>
+      </p:sp>
+    </p:spTree>
+    <p:extLst>
+      <p:ext uri="{BB962C8B-B14F-4D97-AF65-F5344CB8AC3E}">
+        <p14:creationId xmlns:p14="http://schemas.microsoft.com/office/powerpoint/2010/main" val="4509810"/>
+      </p:ext>
+    </p:extLst>
+  </p:cSld>
+  <p:clrMapOvr>
+    <a:masterClrMapping/>
+  </p:clrMapOvr>
+</p:notes>
+</file>
+
+<file path=ppt/notesSlides/notesSlide18.xml><?xml version="1.0" encoding="utf-8"?>
+<p:notes xmlns:a="http://schemas.openxmlformats.org/drawingml/2006/main" xmlns:r="http://schemas.openxmlformats.org/officeDocument/2006/relationships" xmlns:p="http://schemas.openxmlformats.org/presentationml/2006/main">
+  <p:cSld>
+    <p:spTree>
+      <p:nvGrpSpPr>
+        <p:cNvPr id="1" name=""/>
+        <p:cNvGrpSpPr/>
+        <p:nvPr/>
+      </p:nvGrpSpPr>
+      <p:grpSpPr>
+        <a:xfrm>
+          <a:off x="0" y="0"/>
+          <a:ext cx="0" cy="0"/>
+          <a:chOff x="0" y="0"/>
+          <a:chExt cx="0" cy="0"/>
+        </a:xfrm>
+      </p:grpSpPr>
+      <p:sp>
+        <p:nvSpPr>
+          <p:cNvPr id="2" name="Slide Image Placeholder 1"/>
+          <p:cNvSpPr>
+            <a:spLocks noGrp="1" noRot="1" noChangeAspect="1"/>
+          </p:cNvSpPr>
+          <p:nvPr>
+            <p:ph type="sldImg"/>
+          </p:nvPr>
+        </p:nvSpPr>
+        <p:spPr/>
+      </p:sp>
+      <p:sp>
+        <p:nvSpPr>
+          <p:cNvPr id="3" name="Notes Placeholder 2"/>
+          <p:cNvSpPr>
+            <a:spLocks noGrp="1"/>
+          </p:cNvSpPr>
+          <p:nvPr>
+            <p:ph type="body" idx="1"/>
+          </p:nvPr>
+        </p:nvSpPr>
+        <p:spPr/>
+        <p:txBody>
+          <a:bodyPr/>
+          <a:lstStyle/>
+          <a:p>
             <a:pPr marL="0" marR="0" lvl="0" indent="0" algn="l" defTabSz="914400" rtl="0" eaLnBrk="1" fontAlgn="auto" latinLnBrk="0" hangingPunct="1">
               <a:lnSpc>
                 <a:spcPct val="100000"/>
@@ -2356,7 +2643,7 @@
           <a:p>
             <a:fld id="{3148858F-F1DB-4027-9C85-CCA6849540DD}" type="slidenum">
               <a:rPr lang="en-US" smtClean="0"/>
-              <a:t>17</a:t>
+              <a:t>18</a:t>
             </a:fld>
             <a:endParaRPr lang="en-US"/>
           </a:p>
@@ -4228,7 +4515,7 @@
           <a:p>
             <a:fld id="{C3F78080-8D0A-4BE8-A5B4-CB115102D524}" type="datetimeFigureOut">
               <a:rPr lang="en-US" smtClean="0"/>
-              <a:t>6/13/2022</a:t>
+              <a:t>6/22/2022</a:t>
             </a:fld>
             <a:endParaRPr lang="en-US"/>
           </a:p>
@@ -4426,7 +4713,7 @@
           <a:p>
             <a:fld id="{C3F78080-8D0A-4BE8-A5B4-CB115102D524}" type="datetimeFigureOut">
               <a:rPr lang="en-US" smtClean="0"/>
-              <a:t>6/13/2022</a:t>
+              <a:t>6/22/2022</a:t>
             </a:fld>
             <a:endParaRPr lang="en-US"/>
           </a:p>
@@ -4634,7 +4921,7 @@
           <a:p>
             <a:fld id="{C3F78080-8D0A-4BE8-A5B4-CB115102D524}" type="datetimeFigureOut">
               <a:rPr lang="en-US" smtClean="0"/>
-              <a:t>6/13/2022</a:t>
+              <a:t>6/22/2022</a:t>
             </a:fld>
             <a:endParaRPr lang="en-US"/>
           </a:p>
@@ -4832,7 +5119,7 @@
           <a:p>
             <a:fld id="{C3F78080-8D0A-4BE8-A5B4-CB115102D524}" type="datetimeFigureOut">
               <a:rPr lang="en-US" smtClean="0"/>
-              <a:t>6/13/2022</a:t>
+              <a:t>6/22/2022</a:t>
             </a:fld>
             <a:endParaRPr lang="en-US"/>
           </a:p>
@@ -5107,7 +5394,7 @@
           <a:p>
             <a:fld id="{C3F78080-8D0A-4BE8-A5B4-CB115102D524}" type="datetimeFigureOut">
               <a:rPr lang="en-US" smtClean="0"/>
-              <a:t>6/13/2022</a:t>
+              <a:t>6/22/2022</a:t>
             </a:fld>
             <a:endParaRPr lang="en-US"/>
           </a:p>
@@ -5372,7 +5659,7 @@
           <a:p>
             <a:fld id="{C3F78080-8D0A-4BE8-A5B4-CB115102D524}" type="datetimeFigureOut">
               <a:rPr lang="en-US" smtClean="0"/>
-              <a:t>6/13/2022</a:t>
+              <a:t>6/22/2022</a:t>
             </a:fld>
             <a:endParaRPr lang="en-US"/>
           </a:p>
@@ -5784,7 +6071,7 @@
           <a:p>
             <a:fld id="{C3F78080-8D0A-4BE8-A5B4-CB115102D524}" type="datetimeFigureOut">
               <a:rPr lang="en-US" smtClean="0"/>
-              <a:t>6/13/2022</a:t>
+              <a:t>6/22/2022</a:t>
             </a:fld>
             <a:endParaRPr lang="en-US"/>
           </a:p>
@@ -5925,7 +6212,7 @@
           <a:p>
             <a:fld id="{C3F78080-8D0A-4BE8-A5B4-CB115102D524}" type="datetimeFigureOut">
               <a:rPr lang="en-US" smtClean="0"/>
-              <a:t>6/13/2022</a:t>
+              <a:t>6/22/2022</a:t>
             </a:fld>
             <a:endParaRPr lang="en-US"/>
           </a:p>
@@ -6038,7 +6325,7 @@
           <a:p>
             <a:fld id="{C3F78080-8D0A-4BE8-A5B4-CB115102D524}" type="datetimeFigureOut">
               <a:rPr lang="en-US" smtClean="0"/>
-              <a:t>6/13/2022</a:t>
+              <a:t>6/22/2022</a:t>
             </a:fld>
             <a:endParaRPr lang="en-US"/>
           </a:p>
@@ -6349,7 +6636,7 @@
           <a:p>
             <a:fld id="{C3F78080-8D0A-4BE8-A5B4-CB115102D524}" type="datetimeFigureOut">
               <a:rPr lang="en-US" smtClean="0"/>
-              <a:t>6/13/2022</a:t>
+              <a:t>6/22/2022</a:t>
             </a:fld>
             <a:endParaRPr lang="en-US"/>
           </a:p>
@@ -6637,7 +6924,7 @@
           <a:p>
             <a:fld id="{C3F78080-8D0A-4BE8-A5B4-CB115102D524}" type="datetimeFigureOut">
               <a:rPr lang="en-US" smtClean="0"/>
-              <a:t>6/13/2022</a:t>
+              <a:t>6/22/2022</a:t>
             </a:fld>
             <a:endParaRPr lang="en-US"/>
           </a:p>
@@ -6878,7 +7165,7 @@
           <a:p>
             <a:fld id="{C3F78080-8D0A-4BE8-A5B4-CB115102D524}" type="datetimeFigureOut">
               <a:rPr lang="en-US" smtClean="0"/>
-              <a:t>6/13/2022</a:t>
+              <a:t>6/22/2022</a:t>
             </a:fld>
             <a:endParaRPr lang="en-US"/>
           </a:p>
@@ -7848,7 +8135,7 @@
           <a:graphicData uri="http://schemas.openxmlformats.org/presentationml/2006/ole">
             <mc:AlternateContent xmlns:mc="http://schemas.openxmlformats.org/markup-compatibility/2006">
               <mc:Choice xmlns:v="urn:schemas-microsoft-com:vml" Requires="v">
-                <p:oleObj spid="_x0000_s1129" name="Visio" r:id="rId8" imgW="2514945" imgH="1657350" progId="Visio.Drawing.15">
+                <p:oleObj spid="_x0000_s1138" name="Visio" r:id="rId8" imgW="2514945" imgH="1657350" progId="Visio.Drawing.15">
                   <p:embed/>
                 </p:oleObj>
               </mc:Choice>
@@ -9840,6 +10127,130 @@
           <a:chExt cx="0" cy="0"/>
         </a:xfrm>
       </p:grpSpPr>
+      <p:pic>
+        <p:nvPicPr>
+          <p:cNvPr id="4" name="Picture 3">
+            <a:extLst>
+              <a:ext uri="{FF2B5EF4-FFF2-40B4-BE49-F238E27FC236}">
+                <a16:creationId xmlns:a16="http://schemas.microsoft.com/office/drawing/2014/main" id="{76E66F2E-C91C-4311-B65A-B61BFBC7CF8F}"/>
+              </a:ext>
+            </a:extLst>
+          </p:cNvPr>
+          <p:cNvPicPr>
+            <a:picLocks noChangeAspect="1"/>
+          </p:cNvPicPr>
+          <p:nvPr/>
+        </p:nvPicPr>
+        <p:blipFill>
+          <a:blip r:embed="rId3">
+            <a:extLst>
+              <a:ext uri="{28A0092B-C50C-407E-A947-70E740481C1C}">
+                <a14:useLocalDpi xmlns:a14="http://schemas.microsoft.com/office/drawing/2010/main"/>
+              </a:ext>
+            </a:extLst>
+          </a:blip>
+          <a:stretch>
+            <a:fillRect/>
+          </a:stretch>
+        </p:blipFill>
+        <p:spPr>
+          <a:xfrm>
+            <a:off x="0" y="365760"/>
+            <a:ext cx="3233668" cy="805144"/>
+          </a:xfrm>
+          <a:prstGeom prst="rect">
+            <a:avLst/>
+          </a:prstGeom>
+        </p:spPr>
+      </p:pic>
+      <p:pic>
+        <p:nvPicPr>
+          <p:cNvPr id="3" name="Picture 2">
+            <a:extLst>
+              <a:ext uri="{FF2B5EF4-FFF2-40B4-BE49-F238E27FC236}">
+                <a16:creationId xmlns:a16="http://schemas.microsoft.com/office/drawing/2014/main" id="{6818FEE8-D9DB-43B3-A9CB-DD82942AF9ED}"/>
+              </a:ext>
+            </a:extLst>
+          </p:cNvPr>
+          <p:cNvPicPr>
+            <a:picLocks noChangeAspect="1"/>
+          </p:cNvPicPr>
+          <p:nvPr/>
+        </p:nvPicPr>
+        <p:blipFill>
+          <a:blip r:embed="rId4">
+            <a:clrChange>
+              <a:clrFrom>
+                <a:srgbClr val="F8F9FA"/>
+              </a:clrFrom>
+              <a:clrTo>
+                <a:srgbClr val="F8F9FA">
+                  <a:alpha val="0"/>
+                </a:srgbClr>
+              </a:clrTo>
+            </a:clrChange>
+            <a:extLst>
+              <a:ext uri="{28A0092B-C50C-407E-A947-70E740481C1C}">
+                <a14:useLocalDpi xmlns:a14="http://schemas.microsoft.com/office/drawing/2010/main"/>
+              </a:ext>
+            </a:extLst>
+          </a:blip>
+          <a:stretch>
+            <a:fillRect/>
+          </a:stretch>
+        </p:blipFill>
+        <p:spPr>
+          <a:xfrm>
+            <a:off x="3767137" y="2524125"/>
+            <a:ext cx="4657725" cy="1809750"/>
+          </a:xfrm>
+          <a:prstGeom prst="rect">
+            <a:avLst/>
+          </a:prstGeom>
+        </p:spPr>
+      </p:pic>
+    </p:spTree>
+    <p:extLst>
+      <p:ext uri="{BB962C8B-B14F-4D97-AF65-F5344CB8AC3E}">
+        <p14:creationId xmlns:p14="http://schemas.microsoft.com/office/powerpoint/2010/main" val="4119545744"/>
+      </p:ext>
+    </p:extLst>
+  </p:cSld>
+  <p:clrMapOvr>
+    <a:masterClrMapping/>
+  </p:clrMapOvr>
+  <mc:AlternateContent xmlns:mc="http://schemas.openxmlformats.org/markup-compatibility/2006" xmlns:p14="http://schemas.microsoft.com/office/powerpoint/2010/main">
+    <mc:Choice Requires="p14">
+      <p:transition spd="med" p14:dur="700">
+        <p:fade/>
+      </p:transition>
+    </mc:Choice>
+    <mc:Fallback xmlns="">
+      <p:transition spd="med">
+        <p:fade/>
+      </p:transition>
+    </mc:Fallback>
+  </mc:AlternateContent>
+</p:sld>
+</file>
+
+<file path=ppt/slides/slide17.xml><?xml version="1.0" encoding="utf-8"?>
+<p:sld xmlns:a="http://schemas.openxmlformats.org/drawingml/2006/main" xmlns:r="http://schemas.openxmlformats.org/officeDocument/2006/relationships" xmlns:p="http://schemas.openxmlformats.org/presentationml/2006/main">
+  <p:cSld>
+    <p:spTree>
+      <p:nvGrpSpPr>
+        <p:cNvPr id="1" name=""/>
+        <p:cNvGrpSpPr/>
+        <p:nvPr/>
+      </p:nvGrpSpPr>
+      <p:grpSpPr>
+        <a:xfrm>
+          <a:off x="0" y="0"/>
+          <a:ext cx="0" cy="0"/>
+          <a:chOff x="0" y="0"/>
+          <a:chExt cx="0" cy="0"/>
+        </a:xfrm>
+      </p:grpSpPr>
       <p:sp>
         <p:nvSpPr>
           <p:cNvPr id="3" name="Text Placeholder 2">
@@ -9960,7 +10371,7 @@
 </p:sld>
 </file>
 
-<file path=ppt/slides/slide17.xml><?xml version="1.0" encoding="utf-8"?>
+<file path=ppt/slides/slide18.xml><?xml version="1.0" encoding="utf-8"?>
 <p:sld xmlns:a="http://schemas.openxmlformats.org/drawingml/2006/main" xmlns:r="http://schemas.openxmlformats.org/officeDocument/2006/relationships" xmlns:p="http://schemas.openxmlformats.org/presentationml/2006/main">
   <p:cSld>
     <p:bg>

</xml_diff>

<commit_message>
Added new iris image to multi_classifier notebook & other edits.
</commit_message>
<xml_diff>
--- a/presentations/02.1_neural_anatomy.pptx
+++ b/presentations/02.1_neural_anatomy.pptx
@@ -5,7 +5,7 @@
     <p:sldMasterId id="2147483648" r:id="rId1"/>
   </p:sldMasterIdLst>
   <p:notesMasterIdLst>
-    <p:notesMasterId r:id="rId20"/>
+    <p:notesMasterId r:id="rId19"/>
   </p:notesMasterIdLst>
   <p:sldIdLst>
     <p:sldId id="322" r:id="rId2"/>
@@ -24,8 +24,7 @@
     <p:sldId id="309" r:id="rId15"/>
     <p:sldId id="307" r:id="rId16"/>
     <p:sldId id="323" r:id="rId17"/>
-    <p:sldId id="329" r:id="rId18"/>
-    <p:sldId id="306" r:id="rId19"/>
+    <p:sldId id="306" r:id="rId18"/>
   </p:sldIdLst>
   <p:sldSz cx="12192000" cy="6858000"/>
   <p:notesSz cx="6858000" cy="9144000"/>
@@ -225,7 +224,7 @@
           <a:p>
             <a:fld id="{FD93C9B2-20F6-4DB1-B471-224337D0AC79}" type="datetimeFigureOut">
               <a:rPr lang="en-US" smtClean="0"/>
-              <a:t>6/22/2022</a:t>
+              <a:t>11/14/2022</a:t>
             </a:fld>
             <a:endParaRPr lang="en-US"/>
           </a:p>
@@ -2446,90 +2445,6 @@
           <a:bodyPr/>
           <a:lstStyle/>
           <a:p>
-            <a:endParaRPr lang="en-US" dirty="0"/>
-          </a:p>
-        </p:txBody>
-      </p:sp>
-      <p:sp>
-        <p:nvSpPr>
-          <p:cNvPr id="4" name="Slide Number Placeholder 3"/>
-          <p:cNvSpPr>
-            <a:spLocks noGrp="1"/>
-          </p:cNvSpPr>
-          <p:nvPr>
-            <p:ph type="sldNum" sz="quarter" idx="5"/>
-          </p:nvPr>
-        </p:nvSpPr>
-        <p:spPr/>
-        <p:txBody>
-          <a:bodyPr/>
-          <a:lstStyle/>
-          <a:p>
-            <a:fld id="{3148858F-F1DB-4027-9C85-CCA6849540DD}" type="slidenum">
-              <a:rPr lang="en-US" smtClean="0"/>
-              <a:t>17</a:t>
-            </a:fld>
-            <a:endParaRPr lang="en-US"/>
-          </a:p>
-        </p:txBody>
-      </p:sp>
-    </p:spTree>
-    <p:extLst>
-      <p:ext uri="{BB962C8B-B14F-4D97-AF65-F5344CB8AC3E}">
-        <p14:creationId xmlns:p14="http://schemas.microsoft.com/office/powerpoint/2010/main" val="4509810"/>
-      </p:ext>
-    </p:extLst>
-  </p:cSld>
-  <p:clrMapOvr>
-    <a:masterClrMapping/>
-  </p:clrMapOvr>
-</p:notes>
-</file>
-
-<file path=ppt/notesSlides/notesSlide18.xml><?xml version="1.0" encoding="utf-8"?>
-<p:notes xmlns:a="http://schemas.openxmlformats.org/drawingml/2006/main" xmlns:r="http://schemas.openxmlformats.org/officeDocument/2006/relationships" xmlns:p="http://schemas.openxmlformats.org/presentationml/2006/main">
-  <p:cSld>
-    <p:spTree>
-      <p:nvGrpSpPr>
-        <p:cNvPr id="1" name=""/>
-        <p:cNvGrpSpPr/>
-        <p:nvPr/>
-      </p:nvGrpSpPr>
-      <p:grpSpPr>
-        <a:xfrm>
-          <a:off x="0" y="0"/>
-          <a:ext cx="0" cy="0"/>
-          <a:chOff x="0" y="0"/>
-          <a:chExt cx="0" cy="0"/>
-        </a:xfrm>
-      </p:grpSpPr>
-      <p:sp>
-        <p:nvSpPr>
-          <p:cNvPr id="2" name="Slide Image Placeholder 1"/>
-          <p:cNvSpPr>
-            <a:spLocks noGrp="1" noRot="1" noChangeAspect="1"/>
-          </p:cNvSpPr>
-          <p:nvPr>
-            <p:ph type="sldImg"/>
-          </p:nvPr>
-        </p:nvSpPr>
-        <p:spPr/>
-      </p:sp>
-      <p:sp>
-        <p:nvSpPr>
-          <p:cNvPr id="3" name="Notes Placeholder 2"/>
-          <p:cNvSpPr>
-            <a:spLocks noGrp="1"/>
-          </p:cNvSpPr>
-          <p:nvPr>
-            <p:ph type="body" idx="1"/>
-          </p:nvPr>
-        </p:nvSpPr>
-        <p:spPr/>
-        <p:txBody>
-          <a:bodyPr/>
-          <a:lstStyle/>
-          <a:p>
             <a:pPr marL="0" marR="0" lvl="0" indent="0" algn="l" defTabSz="914400" rtl="0" eaLnBrk="1" fontAlgn="auto" latinLnBrk="0" hangingPunct="1">
               <a:lnSpc>
                 <a:spcPct val="100000"/>
@@ -2643,7 +2558,7 @@
           <a:p>
             <a:fld id="{3148858F-F1DB-4027-9C85-CCA6849540DD}" type="slidenum">
               <a:rPr lang="en-US" smtClean="0"/>
-              <a:t>18</a:t>
+              <a:t>17</a:t>
             </a:fld>
             <a:endParaRPr lang="en-US"/>
           </a:p>
@@ -3676,7 +3591,7 @@
                 <a:ea typeface="+mn-ea"/>
                 <a:cs typeface="+mn-cs"/>
               </a:rPr>
-              <a:t>The biological underpinnings have now disappeared, though we still see our 4 inputs on the left, with the addition of a bias value.  Each input value is multiplied by its associated weight before it is fed into the net input function.  And from there, the net input function’s output is passed to an activation function.  We will talk more about these two functions shortly.   Of course, the number of inputs coming into a node is not limited to four.  We can have as many as we like.  </a:t>
+              <a:t>The biological underpinnings have now disappeared, though we still see our 4 inputs on the left, with the addition of a bias value.  Each input value is multiplied by its associated weight before it is fed into the net input function.  And from there, the net input function’s output is passed to an activation function.  We will talk more about these two functions shortly.   Note: the number of inputs coming into a node is not limited to four.  We can have as many as we like.  </a:t>
             </a:r>
           </a:p>
           <a:p>
@@ -4515,7 +4430,7 @@
           <a:p>
             <a:fld id="{C3F78080-8D0A-4BE8-A5B4-CB115102D524}" type="datetimeFigureOut">
               <a:rPr lang="en-US" smtClean="0"/>
-              <a:t>6/22/2022</a:t>
+              <a:t>11/14/2022</a:t>
             </a:fld>
             <a:endParaRPr lang="en-US"/>
           </a:p>
@@ -4713,7 +4628,7 @@
           <a:p>
             <a:fld id="{C3F78080-8D0A-4BE8-A5B4-CB115102D524}" type="datetimeFigureOut">
               <a:rPr lang="en-US" smtClean="0"/>
-              <a:t>6/22/2022</a:t>
+              <a:t>11/14/2022</a:t>
             </a:fld>
             <a:endParaRPr lang="en-US"/>
           </a:p>
@@ -4921,7 +4836,7 @@
           <a:p>
             <a:fld id="{C3F78080-8D0A-4BE8-A5B4-CB115102D524}" type="datetimeFigureOut">
               <a:rPr lang="en-US" smtClean="0"/>
-              <a:t>6/22/2022</a:t>
+              <a:t>11/14/2022</a:t>
             </a:fld>
             <a:endParaRPr lang="en-US"/>
           </a:p>
@@ -5119,7 +5034,7 @@
           <a:p>
             <a:fld id="{C3F78080-8D0A-4BE8-A5B4-CB115102D524}" type="datetimeFigureOut">
               <a:rPr lang="en-US" smtClean="0"/>
-              <a:t>6/22/2022</a:t>
+              <a:t>11/14/2022</a:t>
             </a:fld>
             <a:endParaRPr lang="en-US"/>
           </a:p>
@@ -5394,7 +5309,7 @@
           <a:p>
             <a:fld id="{C3F78080-8D0A-4BE8-A5B4-CB115102D524}" type="datetimeFigureOut">
               <a:rPr lang="en-US" smtClean="0"/>
-              <a:t>6/22/2022</a:t>
+              <a:t>11/14/2022</a:t>
             </a:fld>
             <a:endParaRPr lang="en-US"/>
           </a:p>
@@ -5659,7 +5574,7 @@
           <a:p>
             <a:fld id="{C3F78080-8D0A-4BE8-A5B4-CB115102D524}" type="datetimeFigureOut">
               <a:rPr lang="en-US" smtClean="0"/>
-              <a:t>6/22/2022</a:t>
+              <a:t>11/14/2022</a:t>
             </a:fld>
             <a:endParaRPr lang="en-US"/>
           </a:p>
@@ -6071,7 +5986,7 @@
           <a:p>
             <a:fld id="{C3F78080-8D0A-4BE8-A5B4-CB115102D524}" type="datetimeFigureOut">
               <a:rPr lang="en-US" smtClean="0"/>
-              <a:t>6/22/2022</a:t>
+              <a:t>11/14/2022</a:t>
             </a:fld>
             <a:endParaRPr lang="en-US"/>
           </a:p>
@@ -6212,7 +6127,7 @@
           <a:p>
             <a:fld id="{C3F78080-8D0A-4BE8-A5B4-CB115102D524}" type="datetimeFigureOut">
               <a:rPr lang="en-US" smtClean="0"/>
-              <a:t>6/22/2022</a:t>
+              <a:t>11/14/2022</a:t>
             </a:fld>
             <a:endParaRPr lang="en-US"/>
           </a:p>
@@ -6325,7 +6240,7 @@
           <a:p>
             <a:fld id="{C3F78080-8D0A-4BE8-A5B4-CB115102D524}" type="datetimeFigureOut">
               <a:rPr lang="en-US" smtClean="0"/>
-              <a:t>6/22/2022</a:t>
+              <a:t>11/14/2022</a:t>
             </a:fld>
             <a:endParaRPr lang="en-US"/>
           </a:p>
@@ -6636,7 +6551,7 @@
           <a:p>
             <a:fld id="{C3F78080-8D0A-4BE8-A5B4-CB115102D524}" type="datetimeFigureOut">
               <a:rPr lang="en-US" smtClean="0"/>
-              <a:t>6/22/2022</a:t>
+              <a:t>11/14/2022</a:t>
             </a:fld>
             <a:endParaRPr lang="en-US"/>
           </a:p>
@@ -6924,7 +6839,7 @@
           <a:p>
             <a:fld id="{C3F78080-8D0A-4BE8-A5B4-CB115102D524}" type="datetimeFigureOut">
               <a:rPr lang="en-US" smtClean="0"/>
-              <a:t>6/22/2022</a:t>
+              <a:t>11/14/2022</a:t>
             </a:fld>
             <a:endParaRPr lang="en-US"/>
           </a:p>
@@ -7165,7 +7080,7 @@
           <a:p>
             <a:fld id="{C3F78080-8D0A-4BE8-A5B4-CB115102D524}" type="datetimeFigureOut">
               <a:rPr lang="en-US" smtClean="0"/>
-              <a:t>6/22/2022</a:t>
+              <a:t>11/14/2022</a:t>
             </a:fld>
             <a:endParaRPr lang="en-US"/>
           </a:p>
@@ -8008,7 +7923,7 @@
           <p:nvPr/>
         </p:nvPicPr>
         <p:blipFill>
-          <a:blip r:embed="rId4"/>
+          <a:blip r:embed="rId3"/>
           <a:stretch>
             <a:fillRect/>
           </a:stretch>
@@ -8038,7 +7953,7 @@
           <p:nvPr/>
         </p:nvPicPr>
         <p:blipFill>
-          <a:blip r:embed="rId5"/>
+          <a:blip r:embed="rId4"/>
           <a:stretch>
             <a:fillRect/>
           </a:stretch>
@@ -8068,7 +7983,7 @@
           <p:nvPr/>
         </p:nvPicPr>
         <p:blipFill>
-          <a:blip r:embed="rId6"/>
+          <a:blip r:embed="rId5"/>
           <a:stretch>
             <a:fillRect/>
           </a:stretch>
@@ -8098,7 +8013,7 @@
           <p:nvPr/>
         </p:nvPicPr>
         <p:blipFill>
-          <a:blip r:embed="rId7"/>
+          <a:blip r:embed="rId6"/>
           <a:stretch>
             <a:fillRect/>
           </a:stretch>
@@ -8135,12 +8050,12 @@
           <a:graphicData uri="http://schemas.openxmlformats.org/presentationml/2006/ole">
             <mc:AlternateContent xmlns:mc="http://schemas.openxmlformats.org/markup-compatibility/2006">
               <mc:Choice xmlns:v="urn:schemas-microsoft-com:vml" Requires="v">
-                <p:oleObj spid="_x0000_s1138" name="Visio" r:id="rId8" imgW="2514945" imgH="1657350" progId="Visio.Drawing.15">
+                <p:oleObj name="Visio" r:id="rId7" imgW="2514945" imgH="1657350" progId="Visio.Drawing.15">
                   <p:embed/>
                 </p:oleObj>
               </mc:Choice>
               <mc:Fallback>
-                <p:oleObj name="Visio" r:id="rId8" imgW="2514945" imgH="1657350" progId="Visio.Drawing.15">
+                <p:oleObj name="Visio" r:id="rId7" imgW="2514945" imgH="1657350" progId="Visio.Drawing.15">
                   <p:embed/>
                   <p:pic>
                     <p:nvPicPr>
@@ -8155,7 +8070,7 @@
                       <p:nvPr/>
                     </p:nvPicPr>
                     <p:blipFill>
-                      <a:blip r:embed="rId9"/>
+                      <a:blip r:embed="rId8"/>
                       <a:stretch>
                         <a:fillRect/>
                       </a:stretch>
@@ -8191,7 +8106,7 @@
           <p:nvPr/>
         </p:nvPicPr>
         <p:blipFill>
-          <a:blip r:embed="rId10"/>
+          <a:blip r:embed="rId9"/>
           <a:stretch>
             <a:fillRect/>
           </a:stretch>
@@ -8221,7 +8136,7 @@
           <p:nvPr/>
         </p:nvPicPr>
         <p:blipFill>
-          <a:blip r:embed="rId11"/>
+          <a:blip r:embed="rId10"/>
           <a:stretch>
             <a:fillRect/>
           </a:stretch>
@@ -8251,7 +8166,7 @@
           <p:nvPr/>
         </p:nvPicPr>
         <p:blipFill>
-          <a:blip r:embed="rId12"/>
+          <a:blip r:embed="rId11"/>
           <a:stretch>
             <a:fillRect/>
           </a:stretch>
@@ -8298,7 +8213,7 @@
                   <pslz:sldZmObj sldId="306" cId="393684128">
                     <pslz:zmPr id="{7A9708FB-B45F-465C-87C1-AD945A46CB97}" returnToParent="0" transitionDur="1000">
                       <p166:blipFill xmlns:p166="http://schemas.microsoft.com/office/powerpoint/2016/6/main">
-                        <a:blip r:embed="rId13"/>
+                        <a:blip r:embed="rId12"/>
                         <a:stretch>
                           <a:fillRect/>
                         </a:stretch>
@@ -9934,7 +9849,7 @@
                 </a:solidFill>
                 <a:latin typeface="Palatino Linotype" panose="02040502050505030304" pitchFamily="18" charset="0"/>
               </a:rPr>
-              <a:t>(Rosenblatt’s Perceptron)</a:t>
+              <a:t>(Amelia’s Perceptron)</a:t>
             </a:r>
             <a:br>
               <a:rPr lang="en-US" sz="3600" dirty="0">
@@ -10235,143 +10150,6 @@
 </file>
 
 <file path=ppt/slides/slide17.xml><?xml version="1.0" encoding="utf-8"?>
-<p:sld xmlns:a="http://schemas.openxmlformats.org/drawingml/2006/main" xmlns:r="http://schemas.openxmlformats.org/officeDocument/2006/relationships" xmlns:p="http://schemas.openxmlformats.org/presentationml/2006/main">
-  <p:cSld>
-    <p:spTree>
-      <p:nvGrpSpPr>
-        <p:cNvPr id="1" name=""/>
-        <p:cNvGrpSpPr/>
-        <p:nvPr/>
-      </p:nvGrpSpPr>
-      <p:grpSpPr>
-        <a:xfrm>
-          <a:off x="0" y="0"/>
-          <a:ext cx="0" cy="0"/>
-          <a:chOff x="0" y="0"/>
-          <a:chExt cx="0" cy="0"/>
-        </a:xfrm>
-      </p:grpSpPr>
-      <p:sp>
-        <p:nvSpPr>
-          <p:cNvPr id="3" name="Text Placeholder 2">
-            <a:extLst>
-              <a:ext uri="{FF2B5EF4-FFF2-40B4-BE49-F238E27FC236}">
-                <a16:creationId xmlns:a16="http://schemas.microsoft.com/office/drawing/2014/main" id="{098BC2D2-CCF7-4C63-8489-B46BF394FCA2}"/>
-              </a:ext>
-            </a:extLst>
-          </p:cNvPr>
-          <p:cNvSpPr>
-            <a:spLocks noGrp="1"/>
-          </p:cNvSpPr>
-          <p:nvPr>
-            <p:ph type="body" idx="1"/>
-          </p:nvPr>
-        </p:nvSpPr>
-        <p:spPr>
-          <a:xfrm>
-            <a:off x="0" y="4285400"/>
-            <a:ext cx="12192000" cy="518830"/>
-          </a:xfrm>
-        </p:spPr>
-        <p:txBody>
-          <a:bodyPr>
-            <a:normAutofit/>
-          </a:bodyPr>
-          <a:lstStyle/>
-          <a:p>
-            <a:endParaRPr lang="en-US" dirty="0">
-              <a:latin typeface="Palatino Linotype" panose="02040502050505030304" pitchFamily="18" charset="0"/>
-              <a:cs typeface="Segoe UI" panose="020B0502040204020203" pitchFamily="34" charset="0"/>
-            </a:endParaRPr>
-          </a:p>
-          <a:p>
-            <a:endParaRPr lang="en-US" dirty="0">
-              <a:latin typeface="Palatino Linotype" panose="02040502050505030304" pitchFamily="18" charset="0"/>
-              <a:cs typeface="Segoe UI" panose="020B0502040204020203" pitchFamily="34" charset="0"/>
-            </a:endParaRPr>
-          </a:p>
-          <a:p>
-            <a:endParaRPr lang="en-US" dirty="0">
-              <a:latin typeface="Palatino Linotype" panose="02040502050505030304" pitchFamily="18" charset="0"/>
-              <a:cs typeface="Segoe UI" panose="020B0502040204020203" pitchFamily="34" charset="0"/>
-            </a:endParaRPr>
-          </a:p>
-          <a:p>
-            <a:endParaRPr lang="en-US" dirty="0">
-              <a:latin typeface="Palatino Linotype" panose="02040502050505030304" pitchFamily="18" charset="0"/>
-              <a:cs typeface="Segoe UI" panose="020B0502040204020203" pitchFamily="34" charset="0"/>
-            </a:endParaRPr>
-          </a:p>
-          <a:p>
-            <a:endParaRPr lang="en-US" dirty="0">
-              <a:latin typeface="Palatino Linotype" panose="02040502050505030304" pitchFamily="18" charset="0"/>
-              <a:cs typeface="Segoe UI" panose="020B0502040204020203" pitchFamily="34" charset="0"/>
-            </a:endParaRPr>
-          </a:p>
-        </p:txBody>
-      </p:sp>
-      <p:pic>
-        <p:nvPicPr>
-          <p:cNvPr id="4" name="Picture 3" descr="A picture containing diagram&#10;&#10;Description automatically generated">
-            <a:extLst>
-              <a:ext uri="{FF2B5EF4-FFF2-40B4-BE49-F238E27FC236}">
-                <a16:creationId xmlns:a16="http://schemas.microsoft.com/office/drawing/2014/main" id="{ABE2EEC6-C3BB-448E-8156-81B69DBF38E1}"/>
-              </a:ext>
-            </a:extLst>
-          </p:cNvPr>
-          <p:cNvPicPr>
-            <a:picLocks noChangeAspect="1"/>
-          </p:cNvPicPr>
-          <p:nvPr/>
-        </p:nvPicPr>
-        <p:blipFill>
-          <a:blip r:embed="rId3">
-            <a:extLst>
-              <a:ext uri="{28A0092B-C50C-407E-A947-70E740481C1C}">
-                <a14:useLocalDpi xmlns:a14="http://schemas.microsoft.com/office/drawing/2010/main" val="0"/>
-              </a:ext>
-            </a:extLst>
-          </a:blip>
-          <a:stretch>
-            <a:fillRect/>
-          </a:stretch>
-        </p:blipFill>
-        <p:spPr>
-          <a:xfrm>
-            <a:off x="3987126" y="1969953"/>
-            <a:ext cx="4217748" cy="2918094"/>
-          </a:xfrm>
-          <a:prstGeom prst="rect">
-            <a:avLst/>
-          </a:prstGeom>
-        </p:spPr>
-      </p:pic>
-    </p:spTree>
-    <p:extLst>
-      <p:ext uri="{BB962C8B-B14F-4D97-AF65-F5344CB8AC3E}">
-        <p14:creationId xmlns:p14="http://schemas.microsoft.com/office/powerpoint/2010/main" val="1456040871"/>
-      </p:ext>
-    </p:extLst>
-  </p:cSld>
-  <p:clrMapOvr>
-    <a:masterClrMapping/>
-  </p:clrMapOvr>
-  <mc:AlternateContent xmlns:mc="http://schemas.openxmlformats.org/markup-compatibility/2006" xmlns:p14="http://schemas.microsoft.com/office/powerpoint/2010/main">
-    <mc:Choice Requires="p14">
-      <p:transition spd="med" p14:dur="700">
-        <p:fade/>
-      </p:transition>
-    </mc:Choice>
-    <mc:Fallback xmlns="">
-      <p:transition spd="med">
-        <p:fade/>
-      </p:transition>
-    </mc:Fallback>
-  </mc:AlternateContent>
-</p:sld>
-</file>
-
-<file path=ppt/slides/slide18.xml><?xml version="1.0" encoding="utf-8"?>
 <p:sld xmlns:a="http://schemas.openxmlformats.org/drawingml/2006/main" xmlns:r="http://schemas.openxmlformats.org/officeDocument/2006/relationships" xmlns:p="http://schemas.openxmlformats.org/presentationml/2006/main">
   <p:cSld>
     <p:bg>

</xml_diff>